<commit_message>
Vault backup: 30/01/24 18:57:38 ASUS
Affected files:
.obsidian/workspace.json
Backlog_0124.md
WIR/Wirtschaft/Zeitungsartikel.pptx
</commit_message>
<xml_diff>
--- a/WIR/Wirtschaft/Zeitungsartikel.pptx
+++ b/WIR/Wirtschaft/Zeitungsartikel.pptx
@@ -4,9 +4,15 @@
   <p:sldMasterIdLst>
     <p:sldMasterId id="2147483648" r:id="rId1"/>
   </p:sldMasterIdLst>
+  <p:notesMasterIdLst>
+    <p:notesMasterId r:id="rId7"/>
+  </p:notesMasterIdLst>
   <p:sldIdLst>
     <p:sldId id="256" r:id="rId2"/>
     <p:sldId id="257" r:id="rId3"/>
+    <p:sldId id="258" r:id="rId4"/>
+    <p:sldId id="259" r:id="rId5"/>
+    <p:sldId id="260" r:id="rId6"/>
   </p:sldIdLst>
   <p:sldSz cx="12192000" cy="6858000"/>
   <p:notesSz cx="6858000" cy="9144000"/>
@@ -105,7 +111,466 @@
       </a:defRPr>
     </a:lvl9pPr>
   </p:defaultTextStyle>
+  <p:extLst>
+    <p:ext uri="{EFAFB233-063F-42B5-8137-9DF3F51BA10A}">
+      <p15:sldGuideLst xmlns:p15="http://schemas.microsoft.com/office/powerpoint/2012/main"/>
+    </p:ext>
+  </p:extLst>
 </p:presentation>
+</file>
+
+<file path=ppt/notesMasters/notesMaster1.xml><?xml version="1.0" encoding="utf-8"?>
+<p:notesMaster xmlns:a="http://schemas.openxmlformats.org/drawingml/2006/main" xmlns:r="http://schemas.openxmlformats.org/officeDocument/2006/relationships" xmlns:p="http://schemas.openxmlformats.org/presentationml/2006/main">
+  <p:cSld>
+    <p:bg>
+      <p:bgRef idx="1001">
+        <a:schemeClr val="bg1"/>
+      </p:bgRef>
+    </p:bg>
+    <p:spTree>
+      <p:nvGrpSpPr>
+        <p:cNvPr id="1" name=""/>
+        <p:cNvGrpSpPr/>
+        <p:nvPr/>
+      </p:nvGrpSpPr>
+      <p:grpSpPr>
+        <a:xfrm>
+          <a:off x="0" y="0"/>
+          <a:ext cx="0" cy="0"/>
+          <a:chOff x="0" y="0"/>
+          <a:chExt cx="0" cy="0"/>
+        </a:xfrm>
+      </p:grpSpPr>
+      <p:sp>
+        <p:nvSpPr>
+          <p:cNvPr id="2" name="Header Placeholder 1"/>
+          <p:cNvSpPr>
+            <a:spLocks noGrp="1"/>
+          </p:cNvSpPr>
+          <p:nvPr>
+            <p:ph type="hdr" sz="quarter"/>
+          </p:nvPr>
+        </p:nvSpPr>
+        <p:spPr>
+          <a:xfrm>
+            <a:off x="0" y="0"/>
+            <a:ext cx="2971800" cy="458788"/>
+          </a:xfrm>
+          <a:prstGeom prst="rect">
+            <a:avLst/>
+          </a:prstGeom>
+        </p:spPr>
+        <p:txBody>
+          <a:bodyPr vert="horz" lIns="91440" tIns="45720" rIns="91440" bIns="45720" rtlCol="0"/>
+          <a:lstStyle>
+            <a:lvl1pPr algn="l">
+              <a:defRPr sz="1200"/>
+            </a:lvl1pPr>
+          </a:lstStyle>
+          <a:p>
+            <a:endParaRPr lang="de-AT"/>
+          </a:p>
+        </p:txBody>
+      </p:sp>
+      <p:sp>
+        <p:nvSpPr>
+          <p:cNvPr id="3" name="Date Placeholder 2"/>
+          <p:cNvSpPr>
+            <a:spLocks noGrp="1"/>
+          </p:cNvSpPr>
+          <p:nvPr>
+            <p:ph type="dt" idx="1"/>
+          </p:nvPr>
+        </p:nvSpPr>
+        <p:spPr>
+          <a:xfrm>
+            <a:off x="3884613" y="0"/>
+            <a:ext cx="2971800" cy="458788"/>
+          </a:xfrm>
+          <a:prstGeom prst="rect">
+            <a:avLst/>
+          </a:prstGeom>
+        </p:spPr>
+        <p:txBody>
+          <a:bodyPr vert="horz" lIns="91440" tIns="45720" rIns="91440" bIns="45720" rtlCol="0"/>
+          <a:lstStyle>
+            <a:lvl1pPr algn="r">
+              <a:defRPr sz="1200"/>
+            </a:lvl1pPr>
+          </a:lstStyle>
+          <a:p>
+            <a:fld id="{1A0E60E8-6D16-4AF2-82C7-F3560A7839F6}" type="datetimeFigureOut">
+              <a:rPr lang="de-AT" smtClean="0"/>
+              <a:t>30.01.2024</a:t>
+            </a:fld>
+            <a:endParaRPr lang="de-AT"/>
+          </a:p>
+        </p:txBody>
+      </p:sp>
+      <p:sp>
+        <p:nvSpPr>
+          <p:cNvPr id="4" name="Slide Image Placeholder 3"/>
+          <p:cNvSpPr>
+            <a:spLocks noGrp="1" noRot="1" noChangeAspect="1"/>
+          </p:cNvSpPr>
+          <p:nvPr>
+            <p:ph type="sldImg" idx="2"/>
+          </p:nvPr>
+        </p:nvSpPr>
+        <p:spPr>
+          <a:xfrm>
+            <a:off x="685800" y="1143000"/>
+            <a:ext cx="5486400" cy="3086100"/>
+          </a:xfrm>
+          <a:prstGeom prst="rect">
+            <a:avLst/>
+          </a:prstGeom>
+          <a:noFill/>
+          <a:ln w="12700">
+            <a:solidFill>
+              <a:prstClr val="black"/>
+            </a:solidFill>
+          </a:ln>
+        </p:spPr>
+        <p:txBody>
+          <a:bodyPr vert="horz" lIns="91440" tIns="45720" rIns="91440" bIns="45720" rtlCol="0" anchor="ctr"/>
+          <a:lstStyle/>
+          <a:p>
+            <a:endParaRPr lang="de-AT"/>
+          </a:p>
+        </p:txBody>
+      </p:sp>
+      <p:sp>
+        <p:nvSpPr>
+          <p:cNvPr id="5" name="Notes Placeholder 4"/>
+          <p:cNvSpPr>
+            <a:spLocks noGrp="1"/>
+          </p:cNvSpPr>
+          <p:nvPr>
+            <p:ph type="body" sz="quarter" idx="3"/>
+          </p:nvPr>
+        </p:nvSpPr>
+        <p:spPr>
+          <a:xfrm>
+            <a:off x="685800" y="4400550"/>
+            <a:ext cx="5486400" cy="3600450"/>
+          </a:xfrm>
+          <a:prstGeom prst="rect">
+            <a:avLst/>
+          </a:prstGeom>
+        </p:spPr>
+        <p:txBody>
+          <a:bodyPr vert="horz" lIns="91440" tIns="45720" rIns="91440" bIns="45720" rtlCol="0"/>
+          <a:lstStyle/>
+          <a:p>
+            <a:pPr lvl="0"/>
+            <a:r>
+              <a:rPr lang="en-GB"/>
+              <a:t>Click to edit Master text styles</a:t>
+            </a:r>
+          </a:p>
+          <a:p>
+            <a:pPr lvl="1"/>
+            <a:r>
+              <a:rPr lang="en-GB"/>
+              <a:t>Second level</a:t>
+            </a:r>
+          </a:p>
+          <a:p>
+            <a:pPr lvl="2"/>
+            <a:r>
+              <a:rPr lang="en-GB"/>
+              <a:t>Third level</a:t>
+            </a:r>
+          </a:p>
+          <a:p>
+            <a:pPr lvl="3"/>
+            <a:r>
+              <a:rPr lang="en-GB"/>
+              <a:t>Fourth level</a:t>
+            </a:r>
+          </a:p>
+          <a:p>
+            <a:pPr lvl="4"/>
+            <a:r>
+              <a:rPr lang="en-GB"/>
+              <a:t>Fifth level</a:t>
+            </a:r>
+            <a:endParaRPr lang="de-AT"/>
+          </a:p>
+        </p:txBody>
+      </p:sp>
+      <p:sp>
+        <p:nvSpPr>
+          <p:cNvPr id="6" name="Footer Placeholder 5"/>
+          <p:cNvSpPr>
+            <a:spLocks noGrp="1"/>
+          </p:cNvSpPr>
+          <p:nvPr>
+            <p:ph type="ftr" sz="quarter" idx="4"/>
+          </p:nvPr>
+        </p:nvSpPr>
+        <p:spPr>
+          <a:xfrm>
+            <a:off x="0" y="8685213"/>
+            <a:ext cx="2971800" cy="458787"/>
+          </a:xfrm>
+          <a:prstGeom prst="rect">
+            <a:avLst/>
+          </a:prstGeom>
+        </p:spPr>
+        <p:txBody>
+          <a:bodyPr vert="horz" lIns="91440" tIns="45720" rIns="91440" bIns="45720" rtlCol="0" anchor="b"/>
+          <a:lstStyle>
+            <a:lvl1pPr algn="l">
+              <a:defRPr sz="1200"/>
+            </a:lvl1pPr>
+          </a:lstStyle>
+          <a:p>
+            <a:endParaRPr lang="de-AT"/>
+          </a:p>
+        </p:txBody>
+      </p:sp>
+      <p:sp>
+        <p:nvSpPr>
+          <p:cNvPr id="7" name="Slide Number Placeholder 6"/>
+          <p:cNvSpPr>
+            <a:spLocks noGrp="1"/>
+          </p:cNvSpPr>
+          <p:nvPr>
+            <p:ph type="sldNum" sz="quarter" idx="5"/>
+          </p:nvPr>
+        </p:nvSpPr>
+        <p:spPr>
+          <a:xfrm>
+            <a:off x="3884613" y="8685213"/>
+            <a:ext cx="2971800" cy="458787"/>
+          </a:xfrm>
+          <a:prstGeom prst="rect">
+            <a:avLst/>
+          </a:prstGeom>
+        </p:spPr>
+        <p:txBody>
+          <a:bodyPr vert="horz" lIns="91440" tIns="45720" rIns="91440" bIns="45720" rtlCol="0" anchor="b"/>
+          <a:lstStyle>
+            <a:lvl1pPr algn="r">
+              <a:defRPr sz="1200"/>
+            </a:lvl1pPr>
+          </a:lstStyle>
+          <a:p>
+            <a:fld id="{E3149BBE-474E-4122-8657-31F7BB1071B1}" type="slidenum">
+              <a:rPr lang="de-AT" smtClean="0"/>
+              <a:t>‹#›</a:t>
+            </a:fld>
+            <a:endParaRPr lang="de-AT"/>
+          </a:p>
+        </p:txBody>
+      </p:sp>
+    </p:spTree>
+    <p:extLst>
+      <p:ext uri="{BB962C8B-B14F-4D97-AF65-F5344CB8AC3E}">
+        <p14:creationId xmlns:p14="http://schemas.microsoft.com/office/powerpoint/2010/main" val="1450640320"/>
+      </p:ext>
+    </p:extLst>
+  </p:cSld>
+  <p:clrMap bg1="lt1" tx1="dk1" bg2="lt2" tx2="dk2" accent1="accent1" accent2="accent2" accent3="accent3" accent4="accent4" accent5="accent5" accent6="accent6" hlink="hlink" folHlink="folHlink"/>
+  <p:notesStyle>
+    <a:lvl1pPr marL="0" algn="l" defTabSz="914400" rtl="0" eaLnBrk="1" latinLnBrk="0" hangingPunct="1">
+      <a:defRPr sz="1200" kern="1200">
+        <a:solidFill>
+          <a:schemeClr val="tx1"/>
+        </a:solidFill>
+        <a:latin typeface="+mn-lt"/>
+        <a:ea typeface="+mn-ea"/>
+        <a:cs typeface="+mn-cs"/>
+      </a:defRPr>
+    </a:lvl1pPr>
+    <a:lvl2pPr marL="457200" algn="l" defTabSz="914400" rtl="0" eaLnBrk="1" latinLnBrk="0" hangingPunct="1">
+      <a:defRPr sz="1200" kern="1200">
+        <a:solidFill>
+          <a:schemeClr val="tx1"/>
+        </a:solidFill>
+        <a:latin typeface="+mn-lt"/>
+        <a:ea typeface="+mn-ea"/>
+        <a:cs typeface="+mn-cs"/>
+      </a:defRPr>
+    </a:lvl2pPr>
+    <a:lvl3pPr marL="914400" algn="l" defTabSz="914400" rtl="0" eaLnBrk="1" latinLnBrk="0" hangingPunct="1">
+      <a:defRPr sz="1200" kern="1200">
+        <a:solidFill>
+          <a:schemeClr val="tx1"/>
+        </a:solidFill>
+        <a:latin typeface="+mn-lt"/>
+        <a:ea typeface="+mn-ea"/>
+        <a:cs typeface="+mn-cs"/>
+      </a:defRPr>
+    </a:lvl3pPr>
+    <a:lvl4pPr marL="1371600" algn="l" defTabSz="914400" rtl="0" eaLnBrk="1" latinLnBrk="0" hangingPunct="1">
+      <a:defRPr sz="1200" kern="1200">
+        <a:solidFill>
+          <a:schemeClr val="tx1"/>
+        </a:solidFill>
+        <a:latin typeface="+mn-lt"/>
+        <a:ea typeface="+mn-ea"/>
+        <a:cs typeface="+mn-cs"/>
+      </a:defRPr>
+    </a:lvl4pPr>
+    <a:lvl5pPr marL="1828800" algn="l" defTabSz="914400" rtl="0" eaLnBrk="1" latinLnBrk="0" hangingPunct="1">
+      <a:defRPr sz="1200" kern="1200">
+        <a:solidFill>
+          <a:schemeClr val="tx1"/>
+        </a:solidFill>
+        <a:latin typeface="+mn-lt"/>
+        <a:ea typeface="+mn-ea"/>
+        <a:cs typeface="+mn-cs"/>
+      </a:defRPr>
+    </a:lvl5pPr>
+    <a:lvl6pPr marL="2286000" algn="l" defTabSz="914400" rtl="0" eaLnBrk="1" latinLnBrk="0" hangingPunct="1">
+      <a:defRPr sz="1200" kern="1200">
+        <a:solidFill>
+          <a:schemeClr val="tx1"/>
+        </a:solidFill>
+        <a:latin typeface="+mn-lt"/>
+        <a:ea typeface="+mn-ea"/>
+        <a:cs typeface="+mn-cs"/>
+      </a:defRPr>
+    </a:lvl6pPr>
+    <a:lvl7pPr marL="2743200" algn="l" defTabSz="914400" rtl="0" eaLnBrk="1" latinLnBrk="0" hangingPunct="1">
+      <a:defRPr sz="1200" kern="1200">
+        <a:solidFill>
+          <a:schemeClr val="tx1"/>
+        </a:solidFill>
+        <a:latin typeface="+mn-lt"/>
+        <a:ea typeface="+mn-ea"/>
+        <a:cs typeface="+mn-cs"/>
+      </a:defRPr>
+    </a:lvl7pPr>
+    <a:lvl8pPr marL="3200400" algn="l" defTabSz="914400" rtl="0" eaLnBrk="1" latinLnBrk="0" hangingPunct="1">
+      <a:defRPr sz="1200" kern="1200">
+        <a:solidFill>
+          <a:schemeClr val="tx1"/>
+        </a:solidFill>
+        <a:latin typeface="+mn-lt"/>
+        <a:ea typeface="+mn-ea"/>
+        <a:cs typeface="+mn-cs"/>
+      </a:defRPr>
+    </a:lvl8pPr>
+    <a:lvl9pPr marL="3657600" algn="l" defTabSz="914400" rtl="0" eaLnBrk="1" latinLnBrk="0" hangingPunct="1">
+      <a:defRPr sz="1200" kern="1200">
+        <a:solidFill>
+          <a:schemeClr val="tx1"/>
+        </a:solidFill>
+        <a:latin typeface="+mn-lt"/>
+        <a:ea typeface="+mn-ea"/>
+        <a:cs typeface="+mn-cs"/>
+      </a:defRPr>
+    </a:lvl9pPr>
+  </p:notesStyle>
+</p:notesMaster>
+</file>
+
+<file path=ppt/notesSlides/notesSlide1.xml><?xml version="1.0" encoding="utf-8"?>
+<p:notes xmlns:a="http://schemas.openxmlformats.org/drawingml/2006/main" xmlns:r="http://schemas.openxmlformats.org/officeDocument/2006/relationships" xmlns:p="http://schemas.openxmlformats.org/presentationml/2006/main">
+  <p:cSld>
+    <p:spTree>
+      <p:nvGrpSpPr>
+        <p:cNvPr id="1" name=""/>
+        <p:cNvGrpSpPr/>
+        <p:nvPr/>
+      </p:nvGrpSpPr>
+      <p:grpSpPr>
+        <a:xfrm>
+          <a:off x="0" y="0"/>
+          <a:ext cx="0" cy="0"/>
+          <a:chOff x="0" y="0"/>
+          <a:chExt cx="0" cy="0"/>
+        </a:xfrm>
+      </p:grpSpPr>
+      <p:sp>
+        <p:nvSpPr>
+          <p:cNvPr id="2" name="Slide Image Placeholder 1"/>
+          <p:cNvSpPr>
+            <a:spLocks noGrp="1" noRot="1" noChangeAspect="1"/>
+          </p:cNvSpPr>
+          <p:nvPr>
+            <p:ph type="sldImg"/>
+          </p:nvPr>
+        </p:nvSpPr>
+        <p:spPr/>
+      </p:sp>
+      <p:sp>
+        <p:nvSpPr>
+          <p:cNvPr id="3" name="Notes Placeholder 2"/>
+          <p:cNvSpPr>
+            <a:spLocks noGrp="1"/>
+          </p:cNvSpPr>
+          <p:nvPr>
+            <p:ph type="body" idx="1"/>
+          </p:nvPr>
+        </p:nvSpPr>
+        <p:spPr/>
+        <p:txBody>
+          <a:bodyPr/>
+          <a:lstStyle/>
+          <a:p>
+            <a:r>
+              <a:rPr lang="de-AT" dirty="0"/>
+              <a:t>Tuvalu = Pazifischer Inselstaat</a:t>
+            </a:r>
+            <a:br>
+              <a:rPr lang="de-AT" dirty="0"/>
+            </a:br>
+            <a:br>
+              <a:rPr lang="de-AT" dirty="0"/>
+            </a:br>
+            <a:r>
+              <a:rPr lang="de-AT" b="0" i="0" dirty="0">
+                <a:solidFill>
+                  <a:srgbClr val="212121"/>
+                </a:solidFill>
+                <a:effectLst/>
+                <a:latin typeface="STMatilda Text Variable"/>
+              </a:rPr>
+              <a:t>pro-taiwanesische Regierungschef Kausea Natano NICHT wieder ins Parlament gewählt wurde</a:t>
+            </a:r>
+            <a:endParaRPr lang="de-AT" dirty="0"/>
+          </a:p>
+        </p:txBody>
+      </p:sp>
+      <p:sp>
+        <p:nvSpPr>
+          <p:cNvPr id="4" name="Slide Number Placeholder 3"/>
+          <p:cNvSpPr>
+            <a:spLocks noGrp="1"/>
+          </p:cNvSpPr>
+          <p:nvPr>
+            <p:ph type="sldNum" sz="quarter" idx="5"/>
+          </p:nvPr>
+        </p:nvSpPr>
+        <p:spPr/>
+        <p:txBody>
+          <a:bodyPr/>
+          <a:lstStyle/>
+          <a:p>
+            <a:fld id="{E3149BBE-474E-4122-8657-31F7BB1071B1}" type="slidenum">
+              <a:rPr lang="de-AT" smtClean="0"/>
+              <a:t>3</a:t>
+            </a:fld>
+            <a:endParaRPr lang="de-AT"/>
+          </a:p>
+        </p:txBody>
+      </p:sp>
+    </p:spTree>
+    <p:extLst>
+      <p:ext uri="{BB962C8B-B14F-4D97-AF65-F5344CB8AC3E}">
+        <p14:creationId xmlns:p14="http://schemas.microsoft.com/office/powerpoint/2010/main" val="3125964008"/>
+      </p:ext>
+    </p:extLst>
+  </p:cSld>
+  <p:clrMapOvr>
+    <a:masterClrMapping/>
+  </p:clrMapOvr>
+</p:notes>
 </file>
 
 <file path=ppt/slideLayouts/slideLayout1.xml><?xml version="1.0" encoding="utf-8"?>
@@ -257,7 +722,7 @@
           <a:p>
             <a:fld id="{1AFA06BB-4104-4307-946B-E81C1DB31FA5}" type="datetimeFigureOut">
               <a:rPr lang="en-AU" smtClean="0"/>
-              <a:t>28/01/2024</a:t>
+              <a:t>30/01/2024</a:t>
             </a:fld>
             <a:endParaRPr lang="en-AU"/>
           </a:p>
@@ -457,7 +922,7 @@
           <a:p>
             <a:fld id="{1AFA06BB-4104-4307-946B-E81C1DB31FA5}" type="datetimeFigureOut">
               <a:rPr lang="en-AU" smtClean="0"/>
-              <a:t>28/01/2024</a:t>
+              <a:t>30/01/2024</a:t>
             </a:fld>
             <a:endParaRPr lang="en-AU"/>
           </a:p>
@@ -667,7 +1132,7 @@
           <a:p>
             <a:fld id="{1AFA06BB-4104-4307-946B-E81C1DB31FA5}" type="datetimeFigureOut">
               <a:rPr lang="en-AU" smtClean="0"/>
-              <a:t>28/01/2024</a:t>
+              <a:t>30/01/2024</a:t>
             </a:fld>
             <a:endParaRPr lang="en-AU"/>
           </a:p>
@@ -867,7 +1332,7 @@
           <a:p>
             <a:fld id="{1AFA06BB-4104-4307-946B-E81C1DB31FA5}" type="datetimeFigureOut">
               <a:rPr lang="en-AU" smtClean="0"/>
-              <a:t>28/01/2024</a:t>
+              <a:t>30/01/2024</a:t>
             </a:fld>
             <a:endParaRPr lang="en-AU"/>
           </a:p>
@@ -1143,7 +1608,7 @@
           <a:p>
             <a:fld id="{1AFA06BB-4104-4307-946B-E81C1DB31FA5}" type="datetimeFigureOut">
               <a:rPr lang="en-AU" smtClean="0"/>
-              <a:t>28/01/2024</a:t>
+              <a:t>30/01/2024</a:t>
             </a:fld>
             <a:endParaRPr lang="en-AU"/>
           </a:p>
@@ -1411,7 +1876,7 @@
           <a:p>
             <a:fld id="{1AFA06BB-4104-4307-946B-E81C1DB31FA5}" type="datetimeFigureOut">
               <a:rPr lang="en-AU" smtClean="0"/>
-              <a:t>28/01/2024</a:t>
+              <a:t>30/01/2024</a:t>
             </a:fld>
             <a:endParaRPr lang="en-AU"/>
           </a:p>
@@ -1826,7 +2291,7 @@
           <a:p>
             <a:fld id="{1AFA06BB-4104-4307-946B-E81C1DB31FA5}" type="datetimeFigureOut">
               <a:rPr lang="en-AU" smtClean="0"/>
-              <a:t>28/01/2024</a:t>
+              <a:t>30/01/2024</a:t>
             </a:fld>
             <a:endParaRPr lang="en-AU"/>
           </a:p>
@@ -1968,7 +2433,7 @@
           <a:p>
             <a:fld id="{1AFA06BB-4104-4307-946B-E81C1DB31FA5}" type="datetimeFigureOut">
               <a:rPr lang="en-AU" smtClean="0"/>
-              <a:t>28/01/2024</a:t>
+              <a:t>30/01/2024</a:t>
             </a:fld>
             <a:endParaRPr lang="en-AU"/>
           </a:p>
@@ -2081,7 +2546,7 @@
           <a:p>
             <a:fld id="{1AFA06BB-4104-4307-946B-E81C1DB31FA5}" type="datetimeFigureOut">
               <a:rPr lang="en-AU" smtClean="0"/>
-              <a:t>28/01/2024</a:t>
+              <a:t>30/01/2024</a:t>
             </a:fld>
             <a:endParaRPr lang="en-AU"/>
           </a:p>
@@ -2394,7 +2859,7 @@
           <a:p>
             <a:fld id="{1AFA06BB-4104-4307-946B-E81C1DB31FA5}" type="datetimeFigureOut">
               <a:rPr lang="en-AU" smtClean="0"/>
-              <a:t>28/01/2024</a:t>
+              <a:t>30/01/2024</a:t>
             </a:fld>
             <a:endParaRPr lang="en-AU"/>
           </a:p>
@@ -2683,7 +3148,7 @@
           <a:p>
             <a:fld id="{1AFA06BB-4104-4307-946B-E81C1DB31FA5}" type="datetimeFigureOut">
               <a:rPr lang="en-AU" smtClean="0"/>
-              <a:t>28/01/2024</a:t>
+              <a:t>30/01/2024</a:t>
             </a:fld>
             <a:endParaRPr lang="en-AU"/>
           </a:p>
@@ -2926,7 +3391,7 @@
           <a:p>
             <a:fld id="{1AFA06BB-4104-4307-946B-E81C1DB31FA5}" type="datetimeFigureOut">
               <a:rPr lang="en-AU" smtClean="0"/>
-              <a:t>28/01/2024</a:t>
+              <a:t>30/01/2024</a:t>
             </a:fld>
             <a:endParaRPr lang="en-AU"/>
           </a:p>
@@ -3332,7 +3797,7 @@
     <p:bg>
       <p:bgPr>
         <a:solidFill>
-          <a:srgbClr val="000000"/>
+          <a:schemeClr val="bg1"/>
         </a:solidFill>
         <a:effectLst/>
       </p:bgPr>
@@ -3351,12 +3816,12 @@
           <a:chExt cx="0" cy="0"/>
         </a:xfrm>
       </p:grpSpPr>
-      <p:sp>
-        <p:nvSpPr>
-          <p:cNvPr id="1031" name="Rectangle 1030">
-            <a:extLst>
-              <a:ext uri="{FF2B5EF4-FFF2-40B4-BE49-F238E27FC236}">
-                <a16:creationId xmlns:a16="http://schemas.microsoft.com/office/drawing/2014/main" id="{71B2258F-86CA-4D4D-8270-BC05FCDEBFB3}"/>
+      <p:sp useBgFill="1">
+        <p:nvSpPr>
+          <p:cNvPr id="1041" name="Rectangle 1040">
+            <a:extLst>
+              <a:ext uri="{FF2B5EF4-FFF2-40B4-BE49-F238E27FC236}">
+                <a16:creationId xmlns:a16="http://schemas.microsoft.com/office/drawing/2014/main" id="{C1DD1A8A-57D5-4A81-AD04-532B043C5611}"/>
               </a:ext>
               <a:ext uri="{C183D7F6-B498-43B3-948B-1728B52AA6E4}">
                 <adec:decorative xmlns:adec="http://schemas.microsoft.com/office/drawing/2017/decorative" val="1"/>
@@ -3376,15 +3841,12 @@
         </p:nvSpPr>
         <p:spPr>
           <a:xfrm>
-            <a:off x="0" y="0"/>
-            <a:ext cx="12192000" cy="6857999"/>
+            <a:off x="-1" y="0"/>
+            <a:ext cx="12188952" cy="6858000"/>
           </a:xfrm>
           <a:prstGeom prst="rect">
             <a:avLst/>
           </a:prstGeom>
-          <a:solidFill>
-            <a:srgbClr val="000000"/>
-          </a:solidFill>
           <a:ln>
             <a:noFill/>
           </a:ln>
@@ -3416,10 +3878,10 @@
       </p:sp>
       <p:pic>
         <p:nvPicPr>
-          <p:cNvPr id="1026" name="Picture 2" descr="Worth knowing about the Taiwan-China conflict | Faculty of Humanities | UiB">
-            <a:extLst>
-              <a:ext uri="{FF2B5EF4-FFF2-40B4-BE49-F238E27FC236}">
-                <a16:creationId xmlns:a16="http://schemas.microsoft.com/office/drawing/2014/main" id="{44361C55-22EC-D892-5907-5D14AF3079FB}"/>
+          <p:cNvPr id="4" name="Picture 2" descr="China's growing military confidence puts Taiwan at risk">
+            <a:extLst>
+              <a:ext uri="{FF2B5EF4-FFF2-40B4-BE49-F238E27FC236}">
+                <a16:creationId xmlns:a16="http://schemas.microsoft.com/office/drawing/2014/main" id="{9BF98612-8D46-F574-B722-B434703F7604}"/>
               </a:ext>
             </a:extLst>
           </p:cNvPr>
@@ -3430,20 +3892,28 @@
         </p:nvPicPr>
         <p:blipFill rotWithShape="1">
           <a:blip r:embed="rId2">
-            <a:alphaModFix amt="50000"/>
-            <a:extLst>
+            <a:extLst>
+              <a:ext uri="{BEBA8EAE-BF5A-486C-A8C5-ECC9F3942E4B}">
+                <a14:imgProps xmlns:a14="http://schemas.microsoft.com/office/drawing/2010/main">
+                  <a14:imgLayer r:embed="rId3">
+                    <a14:imgEffect>
+                      <a14:brightnessContrast bright="-40000" contrast="-40000"/>
+                    </a14:imgEffect>
+                  </a14:imgLayer>
+                </a14:imgProps>
+              </a:ext>
               <a:ext uri="{28A0092B-C50C-407E-A947-70E740481C1C}">
                 <a14:useLocalDpi xmlns:a14="http://schemas.microsoft.com/office/drawing/2010/main" val="0"/>
               </a:ext>
             </a:extLst>
           </a:blip>
-          <a:srcRect t="14606" b="1124"/>
+          <a:srcRect t="10449" b="6613"/>
           <a:stretch/>
         </p:blipFill>
         <p:spPr bwMode="auto">
           <a:xfrm>
-            <a:off x="20" y="1"/>
-            <a:ext cx="12191980" cy="6857999"/>
+            <a:off x="0" y="0"/>
+            <a:ext cx="12193702" cy="6858000"/>
           </a:xfrm>
           <a:prstGeom prst="rect">
             <a:avLst/>
@@ -3462,6 +3932,97 @@
       </p:pic>
       <p:sp>
         <p:nvSpPr>
+          <p:cNvPr id="1043" name="Rectangle 1042">
+            <a:extLst>
+              <a:ext uri="{FF2B5EF4-FFF2-40B4-BE49-F238E27FC236}">
+                <a16:creationId xmlns:a16="http://schemas.microsoft.com/office/drawing/2014/main" id="{007891EC-4501-44ED-A8C8-B11B6DB767AB}"/>
+              </a:ext>
+              <a:ext uri="{C183D7F6-B498-43B3-948B-1728B52AA6E4}">
+                <adec:decorative xmlns:adec="http://schemas.microsoft.com/office/drawing/2017/decorative" val="1"/>
+              </a:ext>
+            </a:extLst>
+          </p:cNvPr>
+          <p:cNvSpPr>
+            <a:spLocks noGrp="1" noRot="1" noChangeAspect="1" noMove="1" noResize="1" noEditPoints="1" noAdjustHandles="1" noChangeArrowheads="1" noChangeShapeType="1" noTextEdit="1"/>
+          </p:cNvSpPr>
+          <p:nvPr>
+            <p:extLst>
+              <p:ext uri="{386F3935-93C4-4BCD-93E2-E3B085C9AB24}">
+                <p16:designElem xmlns:p16="http://schemas.microsoft.com/office/powerpoint/2015/main" val="1"/>
+              </p:ext>
+            </p:extLst>
+          </p:nvPr>
+        </p:nvSpPr>
+        <p:spPr>
+          <a:xfrm>
+            <a:off x="0" y="2207602"/>
+            <a:ext cx="12191999" cy="3162146"/>
+          </a:xfrm>
+          <a:prstGeom prst="rect">
+            <a:avLst/>
+          </a:prstGeom>
+          <a:gradFill flip="none" rotWithShape="1">
+            <a:gsLst>
+              <a:gs pos="0">
+                <a:srgbClr val="000000">
+                  <a:alpha val="0"/>
+                </a:srgbClr>
+              </a:gs>
+              <a:gs pos="25000">
+                <a:srgbClr val="000000">
+                  <a:alpha val="15000"/>
+                </a:srgbClr>
+              </a:gs>
+              <a:gs pos="75000">
+                <a:srgbClr val="000000">
+                  <a:alpha val="15000"/>
+                </a:srgbClr>
+              </a:gs>
+              <a:gs pos="50000">
+                <a:srgbClr val="000000">
+                  <a:alpha val="30000"/>
+                </a:srgbClr>
+              </a:gs>
+              <a:gs pos="100000">
+                <a:srgbClr val="000000">
+                  <a:alpha val="0"/>
+                </a:srgbClr>
+              </a:gs>
+            </a:gsLst>
+            <a:lin ang="16200000" scaled="1"/>
+            <a:tileRect/>
+          </a:gradFill>
+          <a:ln>
+            <a:noFill/>
+          </a:ln>
+        </p:spPr>
+        <p:style>
+          <a:lnRef idx="2">
+            <a:schemeClr val="accent1">
+              <a:shade val="50000"/>
+            </a:schemeClr>
+          </a:lnRef>
+          <a:fillRef idx="1">
+            <a:schemeClr val="accent1"/>
+          </a:fillRef>
+          <a:effectRef idx="0">
+            <a:schemeClr val="accent1"/>
+          </a:effectRef>
+          <a:fontRef idx="minor">
+            <a:schemeClr val="lt1"/>
+          </a:fontRef>
+        </p:style>
+        <p:txBody>
+          <a:bodyPr rtlCol="0" anchor="ctr"/>
+          <a:lstStyle/>
+          <a:p>
+            <a:pPr algn="ctr"/>
+            <a:endParaRPr lang="en-US"/>
+          </a:p>
+        </p:txBody>
+      </p:sp>
+      <p:sp>
+        <p:nvSpPr>
           <p:cNvPr id="2" name="Title 1">
             <a:extLst>
               <a:ext uri="{FF2B5EF4-FFF2-40B4-BE49-F238E27FC236}">
@@ -3478,9 +4039,16 @@
         </p:nvSpPr>
         <p:spPr>
           <a:xfrm>
-            <a:off x="1524000" y="1122362"/>
-            <a:ext cx="9144000" cy="2900518"/>
+            <a:off x="1097280" y="325550"/>
+            <a:ext cx="10058400" cy="3574778"/>
           </a:xfrm>
+          <a:effectLst>
+            <a:outerShdw blurRad="50800" dist="38100" dir="2700000" algn="tl" rotWithShape="0">
+              <a:prstClr val="black">
+                <a:alpha val="40000"/>
+              </a:prstClr>
+            </a:outerShdw>
+          </a:effectLst>
         </p:spPr>
         <p:txBody>
           <a:bodyPr>
@@ -3489,10 +4057,11 @@
           <a:lstStyle/>
           <a:p>
             <a:r>
-              <a:rPr lang="de-AT">
+              <a:rPr lang="de-AT" sz="5200" dirty="0">
                 <a:solidFill>
                   <a:srgbClr val="FFFFFF"/>
                 </a:solidFill>
+                <a:latin typeface="Segoe UI Variable Display Semil" pitchFamily="2" charset="0"/>
               </a:rPr>
               <a:t>Zeitungsartikel</a:t>
             </a:r>
@@ -3517,9 +4086,16 @@
         </p:nvSpPr>
         <p:spPr>
           <a:xfrm>
-            <a:off x="1524000" y="4159404"/>
-            <a:ext cx="9144000" cy="1098395"/>
+            <a:off x="1100051" y="4072043"/>
+            <a:ext cx="10058400" cy="1282707"/>
           </a:xfrm>
+          <a:effectLst>
+            <a:outerShdw blurRad="50800" dist="38100" dir="2700000" algn="tl" rotWithShape="0">
+              <a:prstClr val="black">
+                <a:alpha val="40000"/>
+              </a:prstClr>
+            </a:outerShdw>
+          </a:effectLst>
         </p:spPr>
         <p:txBody>
           <a:bodyPr>
@@ -3528,13 +4104,29 @@
           <a:lstStyle/>
           <a:p>
             <a:r>
-              <a:rPr lang="en-AU">
+              <a:rPr lang="en-AU" dirty="0">
                 <a:solidFill>
                   <a:srgbClr val="FFFFFF"/>
                 </a:solidFill>
+                <a:latin typeface="Segoe UI Variable Display Semil" pitchFamily="2" charset="0"/>
               </a:rPr>
-              <a:t>Hrbek Thienel</a:t>
-            </a:r>
+              <a:t>Hrbek &amp; </a:t>
+            </a:r>
+            <a:r>
+              <a:rPr lang="en-AU" dirty="0" err="1">
+                <a:solidFill>
+                  <a:srgbClr val="FFFFFF"/>
+                </a:solidFill>
+                <a:latin typeface="Segoe UI Variable Display Semil" pitchFamily="2" charset="0"/>
+              </a:rPr>
+              <a:t>Thienel</a:t>
+            </a:r>
+            <a:endParaRPr lang="en-AU" dirty="0">
+              <a:solidFill>
+                <a:srgbClr val="FFFFFF"/>
+              </a:solidFill>
+              <a:latin typeface="Segoe UI Variable Display Semil" pitchFamily="2" charset="0"/>
+            </a:endParaRPr>
           </a:p>
         </p:txBody>
       </p:sp>
@@ -3546,147 +4138,8 @@
     </p:extLst>
   </p:cSld>
   <p:clrMapOvr>
-    <a:overrideClrMapping bg1="dk1" tx1="lt1" bg2="dk2" tx2="lt2" accent1="accent1" accent2="accent2" accent3="accent3" accent4="accent4" accent5="accent5" accent6="accent6" hlink="hlink" folHlink="folHlink"/>
+    <a:masterClrMapping/>
   </p:clrMapOvr>
-  <p:timing>
-    <p:tnLst>
-      <p:par>
-        <p:cTn id="1" dur="indefinite" restart="never" nodeType="tmRoot">
-          <p:childTnLst>
-            <p:seq concurrent="1" nextAc="seek">
-              <p:cTn id="2" dur="indefinite" nodeType="mainSeq">
-                <p:childTnLst>
-                  <p:par>
-                    <p:cTn id="3" fill="hold">
-                      <p:stCondLst>
-                        <p:cond delay="indefinite"/>
-                        <p:cond evt="onBegin" delay="0">
-                          <p:tn val="2"/>
-                        </p:cond>
-                      </p:stCondLst>
-                      <p:childTnLst>
-                        <p:par>
-                          <p:cTn id="4" fill="hold">
-                            <p:stCondLst>
-                              <p:cond delay="0"/>
-                            </p:stCondLst>
-                            <p:childTnLst>
-                              <p:par>
-                                <p:cTn id="5" presetID="10" presetClass="entr" presetSubtype="0" fill="hold" grpId="0" nodeType="withEffect">
-                                  <p:stCondLst>
-                                    <p:cond delay="1000"/>
-                                  </p:stCondLst>
-                                  <p:iterate>
-                                    <p:tmPct val="10000"/>
-                                  </p:iterate>
-                                  <p:childTnLst>
-                                    <p:set>
-                                      <p:cBhvr>
-                                        <p:cTn id="6" dur="1" fill="hold">
-                                          <p:stCondLst>
-                                            <p:cond delay="0"/>
-                                          </p:stCondLst>
-                                        </p:cTn>
-                                        <p:tgtEl>
-                                          <p:spTgt spid="2"/>
-                                        </p:tgtEl>
-                                        <p:attrNameLst>
-                                          <p:attrName>style.visibility</p:attrName>
-                                        </p:attrNameLst>
-                                      </p:cBhvr>
-                                      <p:to>
-                                        <p:strVal val="visible"/>
-                                      </p:to>
-                                    </p:set>
-                                    <p:animEffect transition="in" filter="fade">
-                                      <p:cBhvr>
-                                        <p:cTn id="7" dur="700"/>
-                                        <p:tgtEl>
-                                          <p:spTgt spid="2"/>
-                                        </p:tgtEl>
-                                      </p:cBhvr>
-                                    </p:animEffect>
-                                  </p:childTnLst>
-                                </p:cTn>
-                              </p:par>
-                              <p:par>
-                                <p:cTn id="8" presetID="10" presetClass="entr" presetSubtype="0" fill="hold" grpId="0" nodeType="withEffect">
-                                  <p:stCondLst>
-                                    <p:cond delay="1500"/>
-                                  </p:stCondLst>
-                                  <p:iterate>
-                                    <p:tmPct val="10000"/>
-                                  </p:iterate>
-                                  <p:childTnLst>
-                                    <p:set>
-                                      <p:cBhvr>
-                                        <p:cTn id="9" dur="1" fill="hold">
-                                          <p:stCondLst>
-                                            <p:cond delay="0"/>
-                                          </p:stCondLst>
-                                        </p:cTn>
-                                        <p:tgtEl>
-                                          <p:spTgt spid="3">
-                                            <p:txEl>
-                                              <p:pRg st="0" end="0"/>
-                                            </p:txEl>
-                                          </p:spTgt>
-                                        </p:tgtEl>
-                                        <p:attrNameLst>
-                                          <p:attrName>style.visibility</p:attrName>
-                                        </p:attrNameLst>
-                                      </p:cBhvr>
-                                      <p:to>
-                                        <p:strVal val="visible"/>
-                                      </p:to>
-                                    </p:set>
-                                    <p:animEffect transition="in" filter="fade">
-                                      <p:cBhvr>
-                                        <p:cTn id="10" dur="700"/>
-                                        <p:tgtEl>
-                                          <p:spTgt spid="3">
-                                            <p:txEl>
-                                              <p:pRg st="0" end="0"/>
-                                            </p:txEl>
-                                          </p:spTgt>
-                                        </p:tgtEl>
-                                      </p:cBhvr>
-                                    </p:animEffect>
-                                  </p:childTnLst>
-                                </p:cTn>
-                              </p:par>
-                            </p:childTnLst>
-                          </p:cTn>
-                        </p:par>
-                      </p:childTnLst>
-                    </p:cTn>
-                  </p:par>
-                </p:childTnLst>
-              </p:cTn>
-              <p:prevCondLst>
-                <p:cond evt="onPrev" delay="0">
-                  <p:tgtEl>
-                    <p:sldTgt/>
-                  </p:tgtEl>
-                </p:cond>
-              </p:prevCondLst>
-              <p:nextCondLst>
-                <p:cond evt="onNext" delay="0">
-                  <p:tgtEl>
-                    <p:sldTgt/>
-                  </p:tgtEl>
-                </p:cond>
-              </p:nextCondLst>
-            </p:seq>
-          </p:childTnLst>
-        </p:cTn>
-      </p:par>
-    </p:tnLst>
-    <p:bldLst>
-      <p:bldP spid="2" grpId="0"/>
-      <p:bldP spid="3" grpId="0" build="p"/>
-    </p:bldLst>
-  </p:timing>
 </p:sld>
 </file>
 
@@ -3721,8 +4174,9 @@
           </p:cNvPicPr>
           <p:nvPr/>
         </p:nvPicPr>
-        <p:blipFill>
+        <p:blipFill rotWithShape="1">
           <a:blip r:embed="rId2">
+            <a:alphaModFix/>
             <a:extLst>
               <a:ext uri="{BEBA8EAE-BF5A-486C-A8C5-ECC9F3942E4B}">
                 <a14:imgProps xmlns:a14="http://schemas.microsoft.com/office/drawing/2010/main">
@@ -3738,15 +4192,13 @@
               </a:ext>
             </a:extLst>
           </a:blip>
-          <a:srcRect/>
-          <a:stretch>
-            <a:fillRect/>
-          </a:stretch>
+          <a:srcRect t="10450" b="6601"/>
+          <a:stretch/>
         </p:blipFill>
         <p:spPr bwMode="auto">
           <a:xfrm>
-            <a:off x="-622300" y="-1125956"/>
-            <a:ext cx="13436599" cy="9110988"/>
+            <a:off x="0" y="1"/>
+            <a:ext cx="12193200" cy="6858000"/>
           </a:xfrm>
           <a:prstGeom prst="rect">
             <a:avLst/>
@@ -3777,10 +4229,10 @@
         </p:nvGrpSpPr>
         <p:grpSpPr>
           <a:xfrm>
-            <a:off x="-2684654" y="219410"/>
-            <a:ext cx="10753293" cy="6140943"/>
-            <a:chOff x="-2684654" y="219410"/>
-            <a:chExt cx="10753293" cy="6140943"/>
+            <a:off x="-971752" y="847024"/>
+            <a:ext cx="8021948" cy="4133803"/>
+            <a:chOff x="-898267" y="971809"/>
+            <a:chExt cx="8021948" cy="4133803"/>
           </a:xfrm>
         </p:grpSpPr>
         <p:sp>
@@ -3796,9 +4248,9 @@
             <p:nvPr/>
           </p:nvSpPr>
           <p:spPr>
-            <a:xfrm rot="19800000">
-              <a:off x="-2684654" y="219410"/>
-              <a:ext cx="10753293" cy="6140943"/>
+            <a:xfrm rot="20700000">
+              <a:off x="-898267" y="971809"/>
+              <a:ext cx="8021948" cy="4133803"/>
             </a:xfrm>
             <a:prstGeom prst="rect">
               <a:avLst/>
@@ -3849,8 +4301,8 @@
           </p:nvSpPr>
           <p:spPr>
             <a:xfrm>
-              <a:off x="969462" y="1951672"/>
-              <a:ext cx="4748461" cy="1477328"/>
+              <a:off x="1132603" y="1720219"/>
+              <a:ext cx="4748461" cy="3139321"/>
             </a:xfrm>
             <a:prstGeom prst="rect">
               <a:avLst/>
@@ -3864,7 +4316,7 @@
             <a:lstStyle/>
             <a:p>
               <a:r>
-                <a:rPr lang="de-DE" sz="2400" b="1" i="0" dirty="0">
+                <a:rPr lang="de-DE" sz="3600" b="1" i="0" dirty="0">
                   <a:solidFill>
                     <a:schemeClr val="bg1"/>
                   </a:solidFill>
@@ -3879,12 +4331,612 @@
             </a:p>
           </p:txBody>
         </p:sp>
+      </p:grpSp>
+      <p:sp>
+        <p:nvSpPr>
+          <p:cNvPr id="3" name="Rectangle: Diagonal Corners Snipped 2">
+            <a:extLst>
+              <a:ext uri="{FF2B5EF4-FFF2-40B4-BE49-F238E27FC236}">
+                <a16:creationId xmlns:a16="http://schemas.microsoft.com/office/drawing/2014/main" id="{794A614A-8B9C-35ED-394D-0474680D5347}"/>
+              </a:ext>
+            </a:extLst>
+          </p:cNvPr>
+          <p:cNvSpPr/>
+          <p:nvPr/>
+        </p:nvSpPr>
+        <p:spPr>
+          <a:xfrm rot="20700000">
+            <a:off x="3816352" y="2234513"/>
+            <a:ext cx="9414214" cy="4811232"/>
+          </a:xfrm>
+          <a:prstGeom prst="snip2DiagRect">
+            <a:avLst/>
+          </a:prstGeom>
+          <a:blipFill>
+            <a:blip r:embed="rId4">
+              <a:extLst>
+                <a:ext uri="{BEBA8EAE-BF5A-486C-A8C5-ECC9F3942E4B}">
+                  <a14:imgProps xmlns:a14="http://schemas.microsoft.com/office/drawing/2010/main">
+                    <a14:imgLayer r:embed="rId5">
+                      <a14:imgEffect>
+                        <a14:backgroundRemoval t="9576" b="89663" l="6817" r="93401">
+                          <a14:foregroundMark x1="10080" y1="38303" x2="4423" y2="40588"/>
+                          <a14:foregroundMark x1="4423" y1="40588" x2="9862" y2="46681"/>
+                          <a14:foregroundMark x1="9862" y1="46681" x2="10152" y2="38629"/>
+                          <a14:foregroundMark x1="7179" y1="39391" x2="6817" y2="39608"/>
+                          <a14:foregroundMark x1="89775" y1="58651" x2="90573" y2="59304"/>
+                          <a14:foregroundMark x1="93256" y1="58868" x2="93401" y2="60283"/>
+                        </a14:backgroundRemoval>
+                      </a14:imgEffect>
+                    </a14:imgLayer>
+                  </a14:imgProps>
+                </a:ext>
+              </a:extLst>
+            </a:blip>
+            <a:stretch>
+              <a:fillRect/>
+            </a:stretch>
+          </a:blipFill>
+          <a:ln>
+            <a:noFill/>
+          </a:ln>
+        </p:spPr>
+        <p:style>
+          <a:lnRef idx="2">
+            <a:schemeClr val="accent1">
+              <a:shade val="15000"/>
+            </a:schemeClr>
+          </a:lnRef>
+          <a:fillRef idx="1">
+            <a:schemeClr val="accent1"/>
+          </a:fillRef>
+          <a:effectRef idx="0">
+            <a:schemeClr val="accent1"/>
+          </a:effectRef>
+          <a:fontRef idx="minor">
+            <a:schemeClr val="lt1"/>
+          </a:fontRef>
+        </p:style>
+        <p:txBody>
+          <a:bodyPr rtlCol="0" anchor="ctr"/>
+          <a:lstStyle/>
+          <a:p>
+            <a:pPr algn="ctr"/>
+            <a:endParaRPr lang="en-AU" dirty="0"/>
+          </a:p>
+        </p:txBody>
+      </p:sp>
+    </p:spTree>
+    <p:extLst>
+      <p:ext uri="{BB962C8B-B14F-4D97-AF65-F5344CB8AC3E}">
+        <p14:creationId xmlns:p14="http://schemas.microsoft.com/office/powerpoint/2010/main" val="646487737"/>
+      </p:ext>
+    </p:extLst>
+  </p:cSld>
+  <p:clrMapOvr>
+    <a:masterClrMapping/>
+  </p:clrMapOvr>
+  <p:timing>
+    <p:tnLst>
+      <p:par>
+        <p:cTn id="1" dur="indefinite" restart="never" nodeType="tmRoot">
+          <p:childTnLst>
+            <p:seq concurrent="1" nextAc="seek">
+              <p:cTn id="2" dur="indefinite" nodeType="mainSeq">
+                <p:childTnLst>
+                  <p:par>
+                    <p:cTn id="3" fill="hold">
+                      <p:stCondLst>
+                        <p:cond delay="indefinite"/>
+                        <p:cond evt="onBegin" delay="0">
+                          <p:tn val="2"/>
+                        </p:cond>
+                      </p:stCondLst>
+                      <p:childTnLst>
+                        <p:par>
+                          <p:cTn id="4" fill="hold">
+                            <p:stCondLst>
+                              <p:cond delay="0"/>
+                            </p:stCondLst>
+                            <p:childTnLst>
+                              <p:par>
+                                <p:cTn id="5" presetID="2" presetClass="entr" presetSubtype="8" accel="20000" decel="80000" fill="hold" nodeType="withEffect">
+                                  <p:stCondLst>
+                                    <p:cond delay="0"/>
+                                  </p:stCondLst>
+                                  <p:childTnLst>
+                                    <p:set>
+                                      <p:cBhvr>
+                                        <p:cTn id="6" dur="1" fill="hold">
+                                          <p:stCondLst>
+                                            <p:cond delay="0"/>
+                                          </p:stCondLst>
+                                        </p:cTn>
+                                        <p:tgtEl>
+                                          <p:spTgt spid="17"/>
+                                        </p:tgtEl>
+                                        <p:attrNameLst>
+                                          <p:attrName>style.visibility</p:attrName>
+                                        </p:attrNameLst>
+                                      </p:cBhvr>
+                                      <p:to>
+                                        <p:strVal val="visible"/>
+                                      </p:to>
+                                    </p:set>
+                                    <p:anim calcmode="lin" valueType="num">
+                                      <p:cBhvr additive="base">
+                                        <p:cTn id="7" dur="1250" fill="hold"/>
+                                        <p:tgtEl>
+                                          <p:spTgt spid="17"/>
+                                        </p:tgtEl>
+                                        <p:attrNameLst>
+                                          <p:attrName>ppt_x</p:attrName>
+                                        </p:attrNameLst>
+                                      </p:cBhvr>
+                                      <p:tavLst>
+                                        <p:tav tm="0">
+                                          <p:val>
+                                            <p:strVal val="0-#ppt_w/2"/>
+                                          </p:val>
+                                        </p:tav>
+                                        <p:tav tm="100000">
+                                          <p:val>
+                                            <p:strVal val="#ppt_x"/>
+                                          </p:val>
+                                        </p:tav>
+                                      </p:tavLst>
+                                    </p:anim>
+                                    <p:anim calcmode="lin" valueType="num">
+                                      <p:cBhvr additive="base">
+                                        <p:cTn id="8" dur="1250" fill="hold"/>
+                                        <p:tgtEl>
+                                          <p:spTgt spid="17"/>
+                                        </p:tgtEl>
+                                        <p:attrNameLst>
+                                          <p:attrName>ppt_y</p:attrName>
+                                        </p:attrNameLst>
+                                      </p:cBhvr>
+                                      <p:tavLst>
+                                        <p:tav tm="0">
+                                          <p:val>
+                                            <p:strVal val="#ppt_y"/>
+                                          </p:val>
+                                        </p:tav>
+                                        <p:tav tm="100000">
+                                          <p:val>
+                                            <p:strVal val="#ppt_y"/>
+                                          </p:val>
+                                        </p:tav>
+                                      </p:tavLst>
+                                    </p:anim>
+                                  </p:childTnLst>
+                                </p:cTn>
+                              </p:par>
+                              <p:par>
+                                <p:cTn id="9" presetID="2" presetClass="entr" presetSubtype="2" accel="20000" decel="80000" fill="hold" grpId="0" nodeType="withEffect">
+                                  <p:stCondLst>
+                                    <p:cond delay="0"/>
+                                  </p:stCondLst>
+                                  <p:childTnLst>
+                                    <p:set>
+                                      <p:cBhvr>
+                                        <p:cTn id="10" dur="1" fill="hold">
+                                          <p:stCondLst>
+                                            <p:cond delay="0"/>
+                                          </p:stCondLst>
+                                        </p:cTn>
+                                        <p:tgtEl>
+                                          <p:spTgt spid="3"/>
+                                        </p:tgtEl>
+                                        <p:attrNameLst>
+                                          <p:attrName>style.visibility</p:attrName>
+                                        </p:attrNameLst>
+                                      </p:cBhvr>
+                                      <p:to>
+                                        <p:strVal val="visible"/>
+                                      </p:to>
+                                    </p:set>
+                                    <p:anim calcmode="lin" valueType="num">
+                                      <p:cBhvr additive="base">
+                                        <p:cTn id="11" dur="1250" fill="hold"/>
+                                        <p:tgtEl>
+                                          <p:spTgt spid="3"/>
+                                        </p:tgtEl>
+                                        <p:attrNameLst>
+                                          <p:attrName>ppt_x</p:attrName>
+                                        </p:attrNameLst>
+                                      </p:cBhvr>
+                                      <p:tavLst>
+                                        <p:tav tm="0">
+                                          <p:val>
+                                            <p:strVal val="1+#ppt_w/2"/>
+                                          </p:val>
+                                        </p:tav>
+                                        <p:tav tm="100000">
+                                          <p:val>
+                                            <p:strVal val="#ppt_x"/>
+                                          </p:val>
+                                        </p:tav>
+                                      </p:tavLst>
+                                    </p:anim>
+                                    <p:anim calcmode="lin" valueType="num">
+                                      <p:cBhvr additive="base">
+                                        <p:cTn id="12" dur="1250" fill="hold"/>
+                                        <p:tgtEl>
+                                          <p:spTgt spid="3"/>
+                                        </p:tgtEl>
+                                        <p:attrNameLst>
+                                          <p:attrName>ppt_y</p:attrName>
+                                        </p:attrNameLst>
+                                      </p:cBhvr>
+                                      <p:tavLst>
+                                        <p:tav tm="0">
+                                          <p:val>
+                                            <p:strVal val="#ppt_y"/>
+                                          </p:val>
+                                        </p:tav>
+                                        <p:tav tm="100000">
+                                          <p:val>
+                                            <p:strVal val="#ppt_y"/>
+                                          </p:val>
+                                        </p:tav>
+                                      </p:tavLst>
+                                    </p:anim>
+                                  </p:childTnLst>
+                                </p:cTn>
+                              </p:par>
+                            </p:childTnLst>
+                          </p:cTn>
+                        </p:par>
+                      </p:childTnLst>
+                    </p:cTn>
+                  </p:par>
+                  <p:par>
+                    <p:cTn id="13" fill="hold">
+                      <p:stCondLst>
+                        <p:cond delay="indefinite"/>
+                      </p:stCondLst>
+                      <p:childTnLst>
+                        <p:par>
+                          <p:cTn id="14" fill="hold">
+                            <p:stCondLst>
+                              <p:cond delay="0"/>
+                            </p:stCondLst>
+                            <p:childTnLst>
+                              <p:par>
+                                <p:cTn id="15" presetID="2" presetClass="exit" presetSubtype="12" accel="100000" fill="hold" grpId="1" nodeType="clickEffect">
+                                  <p:stCondLst>
+                                    <p:cond delay="0"/>
+                                  </p:stCondLst>
+                                  <p:childTnLst>
+                                    <p:anim calcmode="lin" valueType="num">
+                                      <p:cBhvr additive="base">
+                                        <p:cTn id="16" dur="1000"/>
+                                        <p:tgtEl>
+                                          <p:spTgt spid="3"/>
+                                        </p:tgtEl>
+                                        <p:attrNameLst>
+                                          <p:attrName>ppt_x</p:attrName>
+                                        </p:attrNameLst>
+                                      </p:cBhvr>
+                                      <p:tavLst>
+                                        <p:tav tm="0">
+                                          <p:val>
+                                            <p:strVal val="ppt_x"/>
+                                          </p:val>
+                                        </p:tav>
+                                        <p:tav tm="100000">
+                                          <p:val>
+                                            <p:strVal val="0-ppt_w/2"/>
+                                          </p:val>
+                                        </p:tav>
+                                      </p:tavLst>
+                                    </p:anim>
+                                    <p:anim calcmode="lin" valueType="num">
+                                      <p:cBhvr additive="base">
+                                        <p:cTn id="17" dur="1000"/>
+                                        <p:tgtEl>
+                                          <p:spTgt spid="3"/>
+                                        </p:tgtEl>
+                                        <p:attrNameLst>
+                                          <p:attrName>ppt_y</p:attrName>
+                                        </p:attrNameLst>
+                                      </p:cBhvr>
+                                      <p:tavLst>
+                                        <p:tav tm="0">
+                                          <p:val>
+                                            <p:strVal val="ppt_y"/>
+                                          </p:val>
+                                        </p:tav>
+                                        <p:tav tm="100000">
+                                          <p:val>
+                                            <p:strVal val="1+ppt_h/2"/>
+                                          </p:val>
+                                        </p:tav>
+                                      </p:tavLst>
+                                    </p:anim>
+                                    <p:set>
+                                      <p:cBhvr>
+                                        <p:cTn id="18" dur="1" fill="hold">
+                                          <p:stCondLst>
+                                            <p:cond delay="999"/>
+                                          </p:stCondLst>
+                                        </p:cTn>
+                                        <p:tgtEl>
+                                          <p:spTgt spid="3"/>
+                                        </p:tgtEl>
+                                        <p:attrNameLst>
+                                          <p:attrName>style.visibility</p:attrName>
+                                        </p:attrNameLst>
+                                      </p:cBhvr>
+                                      <p:to>
+                                        <p:strVal val="hidden"/>
+                                      </p:to>
+                                    </p:set>
+                                  </p:childTnLst>
+                                </p:cTn>
+                              </p:par>
+                              <p:par>
+                                <p:cTn id="19" presetID="2" presetClass="exit" presetSubtype="3" accel="100000" fill="hold" nodeType="withEffect">
+                                  <p:stCondLst>
+                                    <p:cond delay="0"/>
+                                  </p:stCondLst>
+                                  <p:childTnLst>
+                                    <p:anim calcmode="lin" valueType="num">
+                                      <p:cBhvr additive="base">
+                                        <p:cTn id="20" dur="1000"/>
+                                        <p:tgtEl>
+                                          <p:spTgt spid="17"/>
+                                        </p:tgtEl>
+                                        <p:attrNameLst>
+                                          <p:attrName>ppt_x</p:attrName>
+                                        </p:attrNameLst>
+                                      </p:cBhvr>
+                                      <p:tavLst>
+                                        <p:tav tm="0">
+                                          <p:val>
+                                            <p:strVal val="ppt_x"/>
+                                          </p:val>
+                                        </p:tav>
+                                        <p:tav tm="100000">
+                                          <p:val>
+                                            <p:strVal val="1+ppt_w/2"/>
+                                          </p:val>
+                                        </p:tav>
+                                      </p:tavLst>
+                                    </p:anim>
+                                    <p:anim calcmode="lin" valueType="num">
+                                      <p:cBhvr additive="base">
+                                        <p:cTn id="21" dur="1000"/>
+                                        <p:tgtEl>
+                                          <p:spTgt spid="17"/>
+                                        </p:tgtEl>
+                                        <p:attrNameLst>
+                                          <p:attrName>ppt_y</p:attrName>
+                                        </p:attrNameLst>
+                                      </p:cBhvr>
+                                      <p:tavLst>
+                                        <p:tav tm="0">
+                                          <p:val>
+                                            <p:strVal val="ppt_y"/>
+                                          </p:val>
+                                        </p:tav>
+                                        <p:tav tm="100000">
+                                          <p:val>
+                                            <p:strVal val="0-ppt_h/2"/>
+                                          </p:val>
+                                        </p:tav>
+                                      </p:tavLst>
+                                    </p:anim>
+                                    <p:set>
+                                      <p:cBhvr>
+                                        <p:cTn id="22" dur="1" fill="hold">
+                                          <p:stCondLst>
+                                            <p:cond delay="999"/>
+                                          </p:stCondLst>
+                                        </p:cTn>
+                                        <p:tgtEl>
+                                          <p:spTgt spid="17"/>
+                                        </p:tgtEl>
+                                        <p:attrNameLst>
+                                          <p:attrName>style.visibility</p:attrName>
+                                        </p:attrNameLst>
+                                      </p:cBhvr>
+                                      <p:to>
+                                        <p:strVal val="hidden"/>
+                                      </p:to>
+                                    </p:set>
+                                  </p:childTnLst>
+                                </p:cTn>
+                              </p:par>
+                            </p:childTnLst>
+                          </p:cTn>
+                        </p:par>
+                      </p:childTnLst>
+                    </p:cTn>
+                  </p:par>
+                </p:childTnLst>
+              </p:cTn>
+              <p:prevCondLst>
+                <p:cond evt="onPrev" delay="0">
+                  <p:tgtEl>
+                    <p:sldTgt/>
+                  </p:tgtEl>
+                </p:cond>
+              </p:prevCondLst>
+              <p:nextCondLst>
+                <p:cond evt="onNext" delay="0">
+                  <p:tgtEl>
+                    <p:sldTgt/>
+                  </p:tgtEl>
+                </p:cond>
+              </p:nextCondLst>
+            </p:seq>
+          </p:childTnLst>
+        </p:cTn>
+      </p:par>
+    </p:tnLst>
+    <p:bldLst>
+      <p:bldP spid="3" grpId="0" animBg="1"/>
+      <p:bldP spid="3" grpId="1" animBg="1"/>
+    </p:bldLst>
+  </p:timing>
+</p:sld>
+</file>
+
+<file path=ppt/slides/slide3.xml><?xml version="1.0" encoding="utf-8"?>
+<p:sld xmlns:a="http://schemas.openxmlformats.org/drawingml/2006/main" xmlns:r="http://schemas.openxmlformats.org/officeDocument/2006/relationships" xmlns:p="http://schemas.openxmlformats.org/presentationml/2006/main">
+  <p:cSld>
+    <p:spTree>
+      <p:nvGrpSpPr>
+        <p:cNvPr id="1" name=""/>
+        <p:cNvGrpSpPr/>
+        <p:nvPr/>
+      </p:nvGrpSpPr>
+      <p:grpSpPr>
+        <a:xfrm>
+          <a:off x="0" y="0"/>
+          <a:ext cx="0" cy="0"/>
+          <a:chOff x="0" y="0"/>
+          <a:chExt cx="0" cy="0"/>
+        </a:xfrm>
+      </p:grpSpPr>
+      <p:pic>
+        <p:nvPicPr>
+          <p:cNvPr id="2" name="Picture 2" descr="China's growing military confidence puts Taiwan at risk">
+            <a:extLst>
+              <a:ext uri="{FF2B5EF4-FFF2-40B4-BE49-F238E27FC236}">
+                <a16:creationId xmlns:a16="http://schemas.microsoft.com/office/drawing/2014/main" id="{85DC33AB-462E-17E4-0B0F-9817150C4E87}"/>
+              </a:ext>
+            </a:extLst>
+          </p:cNvPr>
+          <p:cNvPicPr>
+            <a:picLocks noChangeAspect="1" noChangeArrowheads="1"/>
+          </p:cNvPicPr>
+          <p:nvPr/>
+        </p:nvPicPr>
+        <p:blipFill rotWithShape="1">
+          <a:blip r:embed="rId3">
+            <a:alphaModFix/>
+            <a:extLst>
+              <a:ext uri="{BEBA8EAE-BF5A-486C-A8C5-ECC9F3942E4B}">
+                <a14:imgProps xmlns:a14="http://schemas.microsoft.com/office/drawing/2010/main">
+                  <a14:imgLayer r:embed="rId4">
+                    <a14:imgEffect>
+                      <a14:brightnessContrast bright="-40000" contrast="-40000"/>
+                    </a14:imgEffect>
+                  </a14:imgLayer>
+                </a14:imgProps>
+              </a:ext>
+              <a:ext uri="{28A0092B-C50C-407E-A947-70E740481C1C}">
+                <a14:useLocalDpi xmlns:a14="http://schemas.microsoft.com/office/drawing/2010/main" val="0"/>
+              </a:ext>
+            </a:extLst>
+          </a:blip>
+          <a:srcRect t="10450" b="6601"/>
+          <a:stretch/>
+        </p:blipFill>
+        <p:spPr bwMode="auto">
+          <a:xfrm>
+            <a:off x="0" y="1"/>
+            <a:ext cx="12193200" cy="6858000"/>
+          </a:xfrm>
+          <a:prstGeom prst="rect">
+            <a:avLst/>
+          </a:prstGeom>
+          <a:noFill/>
+          <a:extLst>
+            <a:ext uri="{909E8E84-426E-40DD-AFC4-6F175D3DCCD1}">
+              <a14:hiddenFill xmlns:a14="http://schemas.microsoft.com/office/drawing/2010/main">
+                <a:solidFill>
+                  <a:srgbClr val="FFFFFF"/>
+                </a:solidFill>
+              </a14:hiddenFill>
+            </a:ext>
+          </a:extLst>
+        </p:spPr>
+      </p:pic>
+      <p:grpSp>
+        <p:nvGrpSpPr>
+          <p:cNvPr id="16" name="Group 15">
+            <a:extLst>
+              <a:ext uri="{FF2B5EF4-FFF2-40B4-BE49-F238E27FC236}">
+                <a16:creationId xmlns:a16="http://schemas.microsoft.com/office/drawing/2014/main" id="{F644550A-DD5F-EDC7-CB28-E2B31F228473}"/>
+              </a:ext>
+            </a:extLst>
+          </p:cNvPr>
+          <p:cNvGrpSpPr/>
+          <p:nvPr/>
+        </p:nvGrpSpPr>
+        <p:grpSpPr>
+          <a:xfrm>
+            <a:off x="972457" y="0"/>
+            <a:ext cx="4673600" cy="6008914"/>
+            <a:chOff x="972457" y="0"/>
+            <a:chExt cx="4673600" cy="6008914"/>
+          </a:xfrm>
+        </p:grpSpPr>
         <p:sp>
           <p:nvSpPr>
-            <p:cNvPr id="16" name="TextBox 15">
+            <p:cNvPr id="13" name="Rectangle 12">
               <a:extLst>
                 <a:ext uri="{FF2B5EF4-FFF2-40B4-BE49-F238E27FC236}">
-                  <a16:creationId xmlns:a16="http://schemas.microsoft.com/office/drawing/2014/main" id="{2EA2AC93-484E-E228-50C6-F96FD3E3ACA5}"/>
+                  <a16:creationId xmlns:a16="http://schemas.microsoft.com/office/drawing/2014/main" id="{0CA60D4F-36FD-9EAA-6F60-143909472896}"/>
+                </a:ext>
+              </a:extLst>
+            </p:cNvPr>
+            <p:cNvSpPr/>
+            <p:nvPr/>
+          </p:nvSpPr>
+          <p:spPr>
+            <a:xfrm>
+              <a:off x="972457" y="0"/>
+              <a:ext cx="4673600" cy="6008914"/>
+            </a:xfrm>
+            <a:prstGeom prst="rect">
+              <a:avLst/>
+            </a:prstGeom>
+            <a:solidFill>
+              <a:schemeClr val="tx1">
+                <a:lumMod val="75000"/>
+                <a:lumOff val="25000"/>
+              </a:schemeClr>
+            </a:solidFill>
+            <a:ln>
+              <a:noFill/>
+            </a:ln>
+          </p:spPr>
+          <p:style>
+            <a:lnRef idx="2">
+              <a:schemeClr val="accent1">
+                <a:shade val="15000"/>
+              </a:schemeClr>
+            </a:lnRef>
+            <a:fillRef idx="1">
+              <a:schemeClr val="accent1"/>
+            </a:fillRef>
+            <a:effectRef idx="0">
+              <a:schemeClr val="accent1"/>
+            </a:effectRef>
+            <a:fontRef idx="minor">
+              <a:schemeClr val="lt1"/>
+            </a:fontRef>
+          </p:style>
+          <p:txBody>
+            <a:bodyPr rtlCol="0" anchor="ctr"/>
+            <a:lstStyle/>
+            <a:p>
+              <a:pPr algn="ctr"/>
+              <a:endParaRPr lang="en-AU"/>
+            </a:p>
+          </p:txBody>
+        </p:sp>
+        <p:sp>
+          <p:nvSpPr>
+            <p:cNvPr id="14" name="TextBox 13">
+              <a:extLst>
+                <a:ext uri="{FF2B5EF4-FFF2-40B4-BE49-F238E27FC236}">
+                  <a16:creationId xmlns:a16="http://schemas.microsoft.com/office/drawing/2014/main" id="{A85CABD6-F927-59A2-FB0B-7909F8686B72}"/>
                 </a:ext>
               </a:extLst>
             </p:cNvPr>
@@ -3893,8 +4945,63 @@
           </p:nvSpPr>
           <p:spPr>
             <a:xfrm>
-              <a:off x="1035328" y="3580806"/>
-              <a:ext cx="4111487" cy="923330"/>
+              <a:off x="1451430" y="754649"/>
+              <a:ext cx="2380343" cy="769441"/>
+            </a:xfrm>
+            <a:prstGeom prst="rect">
+              <a:avLst/>
+            </a:prstGeom>
+            <a:noFill/>
+          </p:spPr>
+          <p:txBody>
+            <a:bodyPr wrap="square" rtlCol="0">
+              <a:spAutoFit/>
+            </a:bodyPr>
+            <a:lstStyle/>
+            <a:p>
+              <a:r>
+                <a:rPr lang="en-AU" sz="4400" dirty="0" err="1">
+                  <a:solidFill>
+                    <a:schemeClr val="bg1"/>
+                  </a:solidFill>
+                  <a:latin typeface="Segoe UI Variable Display Semil" pitchFamily="2" charset="0"/>
+                </a:rPr>
+                <a:t>Fakten</a:t>
+              </a:r>
+              <a:r>
+                <a:rPr lang="en-AU" sz="4400" dirty="0">
+                  <a:solidFill>
+                    <a:schemeClr val="bg1"/>
+                  </a:solidFill>
+                  <a:latin typeface="Segoe UI Variable Display Semil" pitchFamily="2" charset="0"/>
+                </a:rPr>
+                <a:t>:</a:t>
+              </a:r>
+              <a:endParaRPr lang="en-AU" dirty="0">
+                <a:solidFill>
+                  <a:schemeClr val="bg1"/>
+                </a:solidFill>
+                <a:latin typeface="Segoe UI Variable Display Semil" pitchFamily="2" charset="0"/>
+              </a:endParaRPr>
+            </a:p>
+          </p:txBody>
+        </p:sp>
+        <p:sp>
+          <p:nvSpPr>
+            <p:cNvPr id="15" name="TextBox 14">
+              <a:extLst>
+                <a:ext uri="{FF2B5EF4-FFF2-40B4-BE49-F238E27FC236}">
+                  <a16:creationId xmlns:a16="http://schemas.microsoft.com/office/drawing/2014/main" id="{1B8E43CA-7A6B-DA23-E49B-F28B2BAF023F}"/>
+                </a:ext>
+              </a:extLst>
+            </p:cNvPr>
+            <p:cNvSpPr txBox="1"/>
+            <p:nvPr/>
+          </p:nvSpPr>
+          <p:spPr>
+            <a:xfrm>
+              <a:off x="1444172" y="1659437"/>
+              <a:ext cx="3730170" cy="3693319"/>
             </a:xfrm>
             <a:prstGeom prst="rect">
               <a:avLst/>
@@ -3918,16 +5025,7 @@
                   </a:solidFill>
                   <a:latin typeface="Segoe UI Variable Display Semil" pitchFamily="2" charset="0"/>
                 </a:rPr>
-                <a:t>Der </a:t>
-              </a:r>
-              <a:r>
-                <a:rPr lang="de-AT" dirty="0">
-                  <a:solidFill>
-                    <a:schemeClr val="bg1"/>
-                  </a:solidFill>
-                  <a:latin typeface="Segoe UI Variable Display Semil" pitchFamily="2" charset="0"/>
-                </a:rPr>
-                <a:t>Standard</a:t>
+                <a:t>Der Standard</a:t>
               </a:r>
             </a:p>
             <a:p>
@@ -3968,6 +5066,27 @@
                 <a:buFont typeface="Arial" panose="020B0604020202020204" pitchFamily="34" charset="0"/>
                 <a:buChar char="•"/>
               </a:pPr>
+              <a:endParaRPr lang="en-AU" dirty="0">
+                <a:solidFill>
+                  <a:schemeClr val="bg1"/>
+                </a:solidFill>
+                <a:latin typeface="Segoe UI Variable Display Semil" pitchFamily="2" charset="0"/>
+              </a:endParaRPr>
+            </a:p>
+            <a:p>
+              <a:pPr marL="285750" indent="-285750">
+                <a:buFont typeface="Arial" panose="020B0604020202020204" pitchFamily="34" charset="0"/>
+                <a:buChar char="•"/>
+              </a:pPr>
+              <a:r>
+                <a:rPr lang="en-AU" dirty="0" err="1">
+                  <a:solidFill>
+                    <a:schemeClr val="bg1"/>
+                  </a:solidFill>
+                  <a:latin typeface="Segoe UI Variable Display Semil" pitchFamily="2" charset="0"/>
+                </a:rPr>
+                <a:t>Warum</a:t>
+              </a:r>
               <a:r>
                 <a:rPr lang="en-AU" dirty="0">
                   <a:solidFill>
@@ -3975,7 +5094,7 @@
                   </a:solidFill>
                   <a:latin typeface="Segoe UI Variable Display Semil" pitchFamily="2" charset="0"/>
                 </a:rPr>
-                <a:t>China – Taiwan </a:t>
+                <a:t> </a:t>
               </a:r>
               <a:r>
                 <a:rPr lang="en-AU" dirty="0" err="1">
@@ -3984,9 +5103,78 @@
                   </a:solidFill>
                   <a:latin typeface="Segoe UI Variable Display Semil" pitchFamily="2" charset="0"/>
                 </a:rPr>
-                <a:t>Konflikt</a:t>
+                <a:t>gewählt</a:t>
               </a:r>
-              <a:endParaRPr lang="en-AU" dirty="0">
+              <a:r>
+                <a:rPr lang="en-AU" dirty="0">
+                  <a:solidFill>
+                    <a:schemeClr val="bg1"/>
+                  </a:solidFill>
+                  <a:latin typeface="Segoe UI Variable Display Semil" pitchFamily="2" charset="0"/>
+                </a:rPr>
+                <a:t>?</a:t>
+              </a:r>
+            </a:p>
+            <a:p>
+              <a:pPr marL="742950" lvl="1" indent="-285750">
+                <a:buFont typeface="Arial" panose="020B0604020202020204" pitchFamily="34" charset="0"/>
+                <a:buChar char="•"/>
+              </a:pPr>
+              <a:r>
+                <a:rPr lang="en-AU" dirty="0" err="1">
+                  <a:solidFill>
+                    <a:schemeClr val="bg1"/>
+                  </a:solidFill>
+                  <a:latin typeface="Segoe UI Variable Display Semil" pitchFamily="2" charset="0"/>
+                </a:rPr>
+                <a:t>Aktuelles</a:t>
+              </a:r>
+              <a:r>
+                <a:rPr lang="en-AU" dirty="0">
+                  <a:solidFill>
+                    <a:schemeClr val="bg1"/>
+                  </a:solidFill>
+                  <a:latin typeface="Segoe UI Variable Display Semil" pitchFamily="2" charset="0"/>
+                </a:rPr>
+                <a:t> Thema</a:t>
+              </a:r>
+            </a:p>
+            <a:p>
+              <a:pPr marL="742950" lvl="1" indent="-285750">
+                <a:buFont typeface="Arial" panose="020B0604020202020204" pitchFamily="34" charset="0"/>
+                <a:buChar char="•"/>
+              </a:pPr>
+              <a:r>
+                <a:rPr lang="de-AT" dirty="0">
+                  <a:solidFill>
+                    <a:schemeClr val="bg1"/>
+                  </a:solidFill>
+                  <a:latin typeface="Segoe UI Variable Display Semil" pitchFamily="2" charset="0"/>
+                </a:rPr>
+                <a:t>✈️</a:t>
+              </a:r>
+            </a:p>
+            <a:p>
+              <a:pPr lvl="1" algn="ctr"/>
+              <a:endParaRPr lang="de-AT" dirty="0">
+                <a:solidFill>
+                  <a:schemeClr val="bg1"/>
+                </a:solidFill>
+                <a:latin typeface="Segoe UI Variable Display Semil" pitchFamily="2" charset="0"/>
+              </a:endParaRPr>
+            </a:p>
+            <a:p>
+              <a:pPr algn="ctr"/>
+              <a:r>
+                <a:rPr lang="de-DE" dirty="0">
+                  <a:solidFill>
+                    <a:schemeClr val="bg1"/>
+                  </a:solidFill>
+                  <a:latin typeface="Segoe UI Variable Display Semil" pitchFamily="2" charset="0"/>
+                </a:rPr>
+                <a:t>Es ist die größte Machtdemonstration Chinas seit der Präsidentenwahl. Im Streit mit Peking um diplomatische Anerkennung droht Taiwan eine weitere Schlappe nach Wahlen in Tuvalu</a:t>
+              </a:r>
+              <a:endParaRPr lang="de-AT" dirty="0">
                 <a:solidFill>
                   <a:schemeClr val="bg1"/>
                 </a:solidFill>
@@ -3996,188 +5184,40 @@
           </p:txBody>
         </p:sp>
       </p:grpSp>
-      <p:grpSp>
-        <p:nvGrpSpPr>
-          <p:cNvPr id="13" name="Group 12">
-            <a:extLst>
-              <a:ext uri="{FF2B5EF4-FFF2-40B4-BE49-F238E27FC236}">
-                <a16:creationId xmlns:a16="http://schemas.microsoft.com/office/drawing/2014/main" id="{86A5F527-8B27-C4A2-4FA6-E9F3ED8ADB6B}"/>
-              </a:ext>
-            </a:extLst>
-          </p:cNvPr>
-          <p:cNvGrpSpPr/>
+      <p:pic>
+        <p:nvPicPr>
+          <p:cNvPr id="12" name="Picture 11">
+            <a:extLst>
+              <a:ext uri="{FF2B5EF4-FFF2-40B4-BE49-F238E27FC236}">
+                <a16:creationId xmlns:a16="http://schemas.microsoft.com/office/drawing/2014/main" id="{B9155B07-D774-4D85-3FA8-8784CF44A81A}"/>
+              </a:ext>
+            </a:extLst>
+          </p:cNvPr>
+          <p:cNvPicPr>
+            <a:picLocks noChangeAspect="1"/>
+          </p:cNvPicPr>
           <p:nvPr/>
-        </p:nvGrpSpPr>
-        <p:grpSpPr>
+        </p:nvPicPr>
+        <p:blipFill>
+          <a:blip r:embed="rId5"/>
+          <a:stretch>
+            <a:fillRect/>
+          </a:stretch>
+        </p:blipFill>
+        <p:spPr>
           <a:xfrm>
-            <a:off x="5059456" y="-698499"/>
-            <a:ext cx="10786821" cy="5756489"/>
-            <a:chOff x="5557120" y="-650867"/>
-            <a:chExt cx="10786821" cy="5429870"/>
+            <a:off x="6767807" y="0"/>
+            <a:ext cx="5424193" cy="6858000"/>
           </a:xfrm>
-          <a:blipFill dpi="0" rotWithShape="1">
-            <a:blip r:embed="rId4"/>
-            <a:srcRect/>
-            <a:stretch>
-              <a:fillRect l="-8000" t="8000"/>
-            </a:stretch>
-          </a:blipFill>
-        </p:grpSpPr>
-        <p:sp>
-          <p:nvSpPr>
-            <p:cNvPr id="2" name="Rectangle 1">
-              <a:extLst>
-                <a:ext uri="{FF2B5EF4-FFF2-40B4-BE49-F238E27FC236}">
-                  <a16:creationId xmlns:a16="http://schemas.microsoft.com/office/drawing/2014/main" id="{41AD82AA-7E68-EA60-C8A8-98DFF0E35889}"/>
-                </a:ext>
-              </a:extLst>
-            </p:cNvPr>
-            <p:cNvSpPr/>
-            <p:nvPr/>
-          </p:nvSpPr>
-          <p:spPr>
-            <a:xfrm rot="19800000">
-              <a:off x="5557120" y="1816064"/>
-              <a:ext cx="8720479" cy="1771683"/>
-            </a:xfrm>
-            <a:prstGeom prst="rect">
-              <a:avLst/>
-            </a:prstGeom>
-            <a:grpFill/>
-            <a:ln>
-              <a:noFill/>
-            </a:ln>
-          </p:spPr>
-          <p:style>
-            <a:lnRef idx="2">
-              <a:schemeClr val="accent1">
-                <a:shade val="15000"/>
-              </a:schemeClr>
-            </a:lnRef>
-            <a:fillRef idx="1">
-              <a:schemeClr val="accent1"/>
-            </a:fillRef>
-            <a:effectRef idx="0">
-              <a:schemeClr val="accent1"/>
-            </a:effectRef>
-            <a:fontRef idx="minor">
-              <a:schemeClr val="lt1"/>
-            </a:fontRef>
-          </p:style>
-          <p:txBody>
-            <a:bodyPr rtlCol="0" anchor="ctr"/>
-            <a:lstStyle/>
-            <a:p>
-              <a:pPr algn="ctr"/>
-              <a:endParaRPr lang="en-AU"/>
-            </a:p>
-          </p:txBody>
-        </p:sp>
-        <p:sp>
-          <p:nvSpPr>
-            <p:cNvPr id="8" name="Rectangle 7">
-              <a:extLst>
-                <a:ext uri="{FF2B5EF4-FFF2-40B4-BE49-F238E27FC236}">
-                  <a16:creationId xmlns:a16="http://schemas.microsoft.com/office/drawing/2014/main" id="{F36EC835-8B40-CE65-62B1-0032BDB5AF5D}"/>
-                </a:ext>
-              </a:extLst>
-            </p:cNvPr>
-            <p:cNvSpPr/>
-            <p:nvPr/>
-          </p:nvSpPr>
-          <p:spPr>
-            <a:xfrm rot="19800000">
-              <a:off x="7156210" y="3007320"/>
-              <a:ext cx="9187731" cy="1771683"/>
-            </a:xfrm>
-            <a:prstGeom prst="rect">
-              <a:avLst/>
-            </a:prstGeom>
-            <a:grpFill/>
-            <a:ln>
-              <a:noFill/>
-            </a:ln>
-          </p:spPr>
-          <p:style>
-            <a:lnRef idx="2">
-              <a:schemeClr val="accent1">
-                <a:shade val="15000"/>
-              </a:schemeClr>
-            </a:lnRef>
-            <a:fillRef idx="1">
-              <a:schemeClr val="accent1"/>
-            </a:fillRef>
-            <a:effectRef idx="0">
-              <a:schemeClr val="accent1"/>
-            </a:effectRef>
-            <a:fontRef idx="minor">
-              <a:schemeClr val="lt1"/>
-            </a:fontRef>
-          </p:style>
-          <p:txBody>
-            <a:bodyPr rtlCol="0" anchor="ctr"/>
-            <a:lstStyle/>
-            <a:p>
-              <a:pPr algn="ctr"/>
-              <a:endParaRPr lang="en-AU" dirty="0"/>
-            </a:p>
-          </p:txBody>
-        </p:sp>
-        <p:sp>
-          <p:nvSpPr>
-            <p:cNvPr id="12" name="Rectangle 11">
-              <a:extLst>
-                <a:ext uri="{FF2B5EF4-FFF2-40B4-BE49-F238E27FC236}">
-                  <a16:creationId xmlns:a16="http://schemas.microsoft.com/office/drawing/2014/main" id="{73A9B77C-262C-0DBC-4607-3E5AA7151854}"/>
-                </a:ext>
-              </a:extLst>
-            </p:cNvPr>
-            <p:cNvSpPr/>
-            <p:nvPr/>
-          </p:nvSpPr>
-          <p:spPr>
-            <a:xfrm rot="19800000">
-              <a:off x="5991886" y="-650867"/>
-              <a:ext cx="8778138" cy="1771683"/>
-            </a:xfrm>
-            <a:prstGeom prst="rect">
-              <a:avLst/>
-            </a:prstGeom>
-            <a:grpFill/>
-            <a:ln>
-              <a:noFill/>
-            </a:ln>
-          </p:spPr>
-          <p:style>
-            <a:lnRef idx="2">
-              <a:schemeClr val="accent1">
-                <a:shade val="15000"/>
-              </a:schemeClr>
-            </a:lnRef>
-            <a:fillRef idx="1">
-              <a:schemeClr val="accent1"/>
-            </a:fillRef>
-            <a:effectRef idx="0">
-              <a:schemeClr val="accent1"/>
-            </a:effectRef>
-            <a:fontRef idx="minor">
-              <a:schemeClr val="lt1"/>
-            </a:fontRef>
-          </p:style>
-          <p:txBody>
-            <a:bodyPr rtlCol="0" anchor="ctr"/>
-            <a:lstStyle/>
-            <a:p>
-              <a:pPr algn="ctr"/>
-              <a:endParaRPr lang="en-AU"/>
-            </a:p>
-          </p:txBody>
-        </p:sp>
-      </p:grpSp>
+          <a:prstGeom prst="rect">
+            <a:avLst/>
+          </a:prstGeom>
+        </p:spPr>
+      </p:pic>
     </p:spTree>
     <p:extLst>
       <p:ext uri="{BB962C8B-B14F-4D97-AF65-F5344CB8AC3E}">
-        <p14:creationId xmlns:p14="http://schemas.microsoft.com/office/powerpoint/2010/main" val="646487737"/>
+        <p14:creationId xmlns:p14="http://schemas.microsoft.com/office/powerpoint/2010/main" val="3927838708"/>
       </p:ext>
     </p:extLst>
   </p:cSld>
@@ -4208,7 +5248,7 @@
                             </p:stCondLst>
                             <p:childTnLst>
                               <p:par>
-                                <p:cTn id="5" presetID="2" presetClass="entr" presetSubtype="8" decel="100000" fill="hold" nodeType="withEffect">
+                                <p:cTn id="5" presetID="2" presetClass="entr" presetSubtype="1" accel="20000" decel="80000" fill="hold" nodeType="withEffect">
                                   <p:stCondLst>
                                     <p:cond delay="0"/>
                                   </p:stCondLst>
@@ -4221,7 +5261,7 @@
                                           </p:stCondLst>
                                         </p:cTn>
                                         <p:tgtEl>
-                                          <p:spTgt spid="17"/>
+                                          <p:spTgt spid="16"/>
                                         </p:tgtEl>
                                         <p:attrNameLst>
                                           <p:attrName>style.visibility</p:attrName>
@@ -4233,9 +5273,9 @@
                                     </p:set>
                                     <p:anim calcmode="lin" valueType="num">
                                       <p:cBhvr additive="base">
-                                        <p:cTn id="7" dur="1000" fill="hold"/>
+                                        <p:cTn id="7" dur="1250" fill="hold"/>
                                         <p:tgtEl>
-                                          <p:spTgt spid="17"/>
+                                          <p:spTgt spid="16"/>
                                         </p:tgtEl>
                                         <p:attrNameLst>
                                           <p:attrName>ppt_x</p:attrName>
@@ -4244,7 +5284,7 @@
                                       <p:tavLst>
                                         <p:tav tm="0">
                                           <p:val>
-                                            <p:strVal val="0-#ppt_w/2"/>
+                                            <p:strVal val="#ppt_x"/>
                                           </p:val>
                                         </p:tav>
                                         <p:tav tm="100000">
@@ -4256,9 +5296,82 @@
                                     </p:anim>
                                     <p:anim calcmode="lin" valueType="num">
                                       <p:cBhvr additive="base">
-                                        <p:cTn id="8" dur="1000" fill="hold"/>
+                                        <p:cTn id="8" dur="1250" fill="hold"/>
                                         <p:tgtEl>
-                                          <p:spTgt spid="17"/>
+                                          <p:spTgt spid="16"/>
+                                        </p:tgtEl>
+                                        <p:attrNameLst>
+                                          <p:attrName>ppt_y</p:attrName>
+                                        </p:attrNameLst>
+                                      </p:cBhvr>
+                                      <p:tavLst>
+                                        <p:tav tm="0">
+                                          <p:val>
+                                            <p:strVal val="0-#ppt_h/2"/>
+                                          </p:val>
+                                        </p:tav>
+                                        <p:tav tm="100000">
+                                          <p:val>
+                                            <p:strVal val="#ppt_y"/>
+                                          </p:val>
+                                        </p:tav>
+                                      </p:tavLst>
+                                    </p:anim>
+                                  </p:childTnLst>
+                                </p:cTn>
+                              </p:par>
+                              <p:par>
+                                <p:cTn id="9" presetID="2" presetClass="entr" presetSubtype="2" accel="20000" decel="80000" fill="hold" nodeType="withEffect">
+                                  <p:stCondLst>
+                                    <p:cond delay="0"/>
+                                  </p:stCondLst>
+                                  <p:childTnLst>
+                                    <p:set>
+                                      <p:cBhvr>
+                                        <p:cTn id="10" dur="1" fill="hold">
+                                          <p:stCondLst>
+                                            <p:cond delay="0"/>
+                                          </p:stCondLst>
+                                        </p:cTn>
+                                        <p:tgtEl>
+                                          <p:spTgt spid="12"/>
+                                        </p:tgtEl>
+                                        <p:attrNameLst>
+                                          <p:attrName>style.visibility</p:attrName>
+                                        </p:attrNameLst>
+                                      </p:cBhvr>
+                                      <p:to>
+                                        <p:strVal val="visible"/>
+                                      </p:to>
+                                    </p:set>
+                                    <p:anim calcmode="lin" valueType="num">
+                                      <p:cBhvr additive="base">
+                                        <p:cTn id="11" dur="1250" fill="hold"/>
+                                        <p:tgtEl>
+                                          <p:spTgt spid="12"/>
+                                        </p:tgtEl>
+                                        <p:attrNameLst>
+                                          <p:attrName>ppt_x</p:attrName>
+                                        </p:attrNameLst>
+                                      </p:cBhvr>
+                                      <p:tavLst>
+                                        <p:tav tm="0">
+                                          <p:val>
+                                            <p:strVal val="1+#ppt_w/2"/>
+                                          </p:val>
+                                        </p:tav>
+                                        <p:tav tm="100000">
+                                          <p:val>
+                                            <p:strVal val="#ppt_x"/>
+                                          </p:val>
+                                        </p:tav>
+                                      </p:tavLst>
+                                    </p:anim>
+                                    <p:anim calcmode="lin" valueType="num">
+                                      <p:cBhvr additive="base">
+                                        <p:cTn id="12" dur="1250" fill="hold"/>
+                                        <p:tgtEl>
+                                          <p:spTgt spid="12"/>
                                         </p:tgtEl>
                                         <p:attrNameLst>
                                           <p:attrName>ppt_y</p:attrName>
@@ -4280,21 +5393,704 @@
                                   </p:childTnLst>
                                 </p:cTn>
                               </p:par>
+                            </p:childTnLst>
+                          </p:cTn>
+                        </p:par>
+                      </p:childTnLst>
+                    </p:cTn>
+                  </p:par>
+                  <p:par>
+                    <p:cTn id="13" fill="hold">
+                      <p:stCondLst>
+                        <p:cond delay="indefinite"/>
+                      </p:stCondLst>
+                      <p:childTnLst>
+                        <p:par>
+                          <p:cTn id="14" fill="hold">
+                            <p:stCondLst>
+                              <p:cond delay="0"/>
+                            </p:stCondLst>
+                            <p:childTnLst>
                               <p:par>
-                                <p:cTn id="9" presetID="2" presetClass="entr" presetSubtype="2" decel="100000" fill="hold" nodeType="withEffect">
+                                <p:cTn id="15" presetID="2" presetClass="exit" presetSubtype="4" accel="100000" fill="hold" nodeType="clickEffect">
+                                  <p:stCondLst>
+                                    <p:cond delay="0"/>
+                                  </p:stCondLst>
+                                  <p:childTnLst>
+                                    <p:anim calcmode="lin" valueType="num">
+                                      <p:cBhvr additive="base">
+                                        <p:cTn id="16" dur="1000"/>
+                                        <p:tgtEl>
+                                          <p:spTgt spid="16"/>
+                                        </p:tgtEl>
+                                        <p:attrNameLst>
+                                          <p:attrName>ppt_x</p:attrName>
+                                        </p:attrNameLst>
+                                      </p:cBhvr>
+                                      <p:tavLst>
+                                        <p:tav tm="0">
+                                          <p:val>
+                                            <p:strVal val="ppt_x"/>
+                                          </p:val>
+                                        </p:tav>
+                                        <p:tav tm="100000">
+                                          <p:val>
+                                            <p:strVal val="ppt_x"/>
+                                          </p:val>
+                                        </p:tav>
+                                      </p:tavLst>
+                                    </p:anim>
+                                    <p:anim calcmode="lin" valueType="num">
+                                      <p:cBhvr additive="base">
+                                        <p:cTn id="17" dur="1000"/>
+                                        <p:tgtEl>
+                                          <p:spTgt spid="16"/>
+                                        </p:tgtEl>
+                                        <p:attrNameLst>
+                                          <p:attrName>ppt_y</p:attrName>
+                                        </p:attrNameLst>
+                                      </p:cBhvr>
+                                      <p:tavLst>
+                                        <p:tav tm="0">
+                                          <p:val>
+                                            <p:strVal val="ppt_y"/>
+                                          </p:val>
+                                        </p:tav>
+                                        <p:tav tm="100000">
+                                          <p:val>
+                                            <p:strVal val="1+ppt_h/2"/>
+                                          </p:val>
+                                        </p:tav>
+                                      </p:tavLst>
+                                    </p:anim>
+                                    <p:set>
+                                      <p:cBhvr>
+                                        <p:cTn id="18" dur="1" fill="hold">
+                                          <p:stCondLst>
+                                            <p:cond delay="999"/>
+                                          </p:stCondLst>
+                                        </p:cTn>
+                                        <p:tgtEl>
+                                          <p:spTgt spid="16"/>
+                                        </p:tgtEl>
+                                        <p:attrNameLst>
+                                          <p:attrName>style.visibility</p:attrName>
+                                        </p:attrNameLst>
+                                      </p:cBhvr>
+                                      <p:to>
+                                        <p:strVal val="hidden"/>
+                                      </p:to>
+                                    </p:set>
+                                  </p:childTnLst>
+                                </p:cTn>
+                              </p:par>
+                              <p:par>
+                                <p:cTn id="19" presetID="2" presetClass="exit" presetSubtype="8" accel="100000" fill="hold" nodeType="withEffect">
+                                  <p:stCondLst>
+                                    <p:cond delay="0"/>
+                                  </p:stCondLst>
+                                  <p:childTnLst>
+                                    <p:anim calcmode="lin" valueType="num">
+                                      <p:cBhvr additive="base">
+                                        <p:cTn id="20" dur="1000"/>
+                                        <p:tgtEl>
+                                          <p:spTgt spid="12"/>
+                                        </p:tgtEl>
+                                        <p:attrNameLst>
+                                          <p:attrName>ppt_x</p:attrName>
+                                        </p:attrNameLst>
+                                      </p:cBhvr>
+                                      <p:tavLst>
+                                        <p:tav tm="0">
+                                          <p:val>
+                                            <p:strVal val="ppt_x"/>
+                                          </p:val>
+                                        </p:tav>
+                                        <p:tav tm="100000">
+                                          <p:val>
+                                            <p:strVal val="0-ppt_w/2"/>
+                                          </p:val>
+                                        </p:tav>
+                                      </p:tavLst>
+                                    </p:anim>
+                                    <p:anim calcmode="lin" valueType="num">
+                                      <p:cBhvr additive="base">
+                                        <p:cTn id="21" dur="1000"/>
+                                        <p:tgtEl>
+                                          <p:spTgt spid="12"/>
+                                        </p:tgtEl>
+                                        <p:attrNameLst>
+                                          <p:attrName>ppt_y</p:attrName>
+                                        </p:attrNameLst>
+                                      </p:cBhvr>
+                                      <p:tavLst>
+                                        <p:tav tm="0">
+                                          <p:val>
+                                            <p:strVal val="ppt_y"/>
+                                          </p:val>
+                                        </p:tav>
+                                        <p:tav tm="100000">
+                                          <p:val>
+                                            <p:strVal val="ppt_y"/>
+                                          </p:val>
+                                        </p:tav>
+                                      </p:tavLst>
+                                    </p:anim>
+                                    <p:set>
+                                      <p:cBhvr>
+                                        <p:cTn id="22" dur="1" fill="hold">
+                                          <p:stCondLst>
+                                            <p:cond delay="999"/>
+                                          </p:stCondLst>
+                                        </p:cTn>
+                                        <p:tgtEl>
+                                          <p:spTgt spid="12"/>
+                                        </p:tgtEl>
+                                        <p:attrNameLst>
+                                          <p:attrName>style.visibility</p:attrName>
+                                        </p:attrNameLst>
+                                      </p:cBhvr>
+                                      <p:to>
+                                        <p:strVal val="hidden"/>
+                                      </p:to>
+                                    </p:set>
+                                  </p:childTnLst>
+                                </p:cTn>
+                              </p:par>
+                            </p:childTnLst>
+                          </p:cTn>
+                        </p:par>
+                      </p:childTnLst>
+                    </p:cTn>
+                  </p:par>
+                </p:childTnLst>
+              </p:cTn>
+              <p:prevCondLst>
+                <p:cond evt="onPrev" delay="0">
+                  <p:tgtEl>
+                    <p:sldTgt/>
+                  </p:tgtEl>
+                </p:cond>
+              </p:prevCondLst>
+              <p:nextCondLst>
+                <p:cond evt="onNext" delay="0">
+                  <p:tgtEl>
+                    <p:sldTgt/>
+                  </p:tgtEl>
+                </p:cond>
+              </p:nextCondLst>
+            </p:seq>
+          </p:childTnLst>
+        </p:cTn>
+      </p:par>
+    </p:tnLst>
+  </p:timing>
+</p:sld>
+</file>
+
+<file path=ppt/slides/slide4.xml><?xml version="1.0" encoding="utf-8"?>
+<p:sld xmlns:a="http://schemas.openxmlformats.org/drawingml/2006/main" xmlns:r="http://schemas.openxmlformats.org/officeDocument/2006/relationships" xmlns:p="http://schemas.openxmlformats.org/presentationml/2006/main">
+  <p:cSld>
+    <p:spTree>
+      <p:nvGrpSpPr>
+        <p:cNvPr id="1" name=""/>
+        <p:cNvGrpSpPr/>
+        <p:nvPr/>
+      </p:nvGrpSpPr>
+      <p:grpSpPr>
+        <a:xfrm>
+          <a:off x="0" y="0"/>
+          <a:ext cx="0" cy="0"/>
+          <a:chOff x="0" y="0"/>
+          <a:chExt cx="0" cy="0"/>
+        </a:xfrm>
+      </p:grpSpPr>
+      <p:pic>
+        <p:nvPicPr>
+          <p:cNvPr id="4" name="Picture 2" descr="China's growing military confidence puts Taiwan at risk">
+            <a:extLst>
+              <a:ext uri="{FF2B5EF4-FFF2-40B4-BE49-F238E27FC236}">
+                <a16:creationId xmlns:a16="http://schemas.microsoft.com/office/drawing/2014/main" id="{F00F50EF-6514-8633-CB27-ADD936BA5D86}"/>
+              </a:ext>
+            </a:extLst>
+          </p:cNvPr>
+          <p:cNvPicPr>
+            <a:picLocks noChangeAspect="1" noChangeArrowheads="1"/>
+          </p:cNvPicPr>
+          <p:nvPr/>
+        </p:nvPicPr>
+        <p:blipFill rotWithShape="1">
+          <a:blip r:embed="rId2">
+            <a:alphaModFix/>
+            <a:extLst>
+              <a:ext uri="{BEBA8EAE-BF5A-486C-A8C5-ECC9F3942E4B}">
+                <a14:imgProps xmlns:a14="http://schemas.microsoft.com/office/drawing/2010/main">
+                  <a14:imgLayer r:embed="rId3">
+                    <a14:imgEffect>
+                      <a14:brightnessContrast bright="-40000" contrast="-40000"/>
+                    </a14:imgEffect>
+                  </a14:imgLayer>
+                </a14:imgProps>
+              </a:ext>
+              <a:ext uri="{28A0092B-C50C-407E-A947-70E740481C1C}">
+                <a14:useLocalDpi xmlns:a14="http://schemas.microsoft.com/office/drawing/2010/main" val="0"/>
+              </a:ext>
+            </a:extLst>
+          </a:blip>
+          <a:srcRect t="10450" b="6601"/>
+          <a:stretch/>
+        </p:blipFill>
+        <p:spPr bwMode="auto">
+          <a:xfrm>
+            <a:off x="0" y="1"/>
+            <a:ext cx="12193200" cy="6858000"/>
+          </a:xfrm>
+          <a:prstGeom prst="rect">
+            <a:avLst/>
+          </a:prstGeom>
+          <a:noFill/>
+          <a:extLst>
+            <a:ext uri="{909E8E84-426E-40DD-AFC4-6F175D3DCCD1}">
+              <a14:hiddenFill xmlns:a14="http://schemas.microsoft.com/office/drawing/2010/main">
+                <a:solidFill>
+                  <a:srgbClr val="FFFFFF"/>
+                </a:solidFill>
+              </a14:hiddenFill>
+            </a:ext>
+          </a:extLst>
+        </p:spPr>
+      </p:pic>
+      <p:sp>
+        <p:nvSpPr>
+          <p:cNvPr id="6" name="Rectangle 5">
+            <a:extLst>
+              <a:ext uri="{FF2B5EF4-FFF2-40B4-BE49-F238E27FC236}">
+                <a16:creationId xmlns:a16="http://schemas.microsoft.com/office/drawing/2014/main" id="{42829848-007C-7A26-E6FC-3E17FE40481E}"/>
+              </a:ext>
+            </a:extLst>
+          </p:cNvPr>
+          <p:cNvSpPr/>
+          <p:nvPr/>
+        </p:nvSpPr>
+        <p:spPr>
+          <a:xfrm>
+            <a:off x="1" y="146957"/>
+            <a:ext cx="7039429" cy="928914"/>
+          </a:xfrm>
+          <a:prstGeom prst="rect">
+            <a:avLst/>
+          </a:prstGeom>
+          <a:solidFill>
+            <a:schemeClr val="tx1">
+              <a:lumMod val="85000"/>
+              <a:lumOff val="15000"/>
+            </a:schemeClr>
+          </a:solidFill>
+          <a:ln>
+            <a:noFill/>
+          </a:ln>
+        </p:spPr>
+        <p:style>
+          <a:lnRef idx="2">
+            <a:schemeClr val="accent1">
+              <a:shade val="15000"/>
+            </a:schemeClr>
+          </a:lnRef>
+          <a:fillRef idx="1">
+            <a:schemeClr val="accent1"/>
+          </a:fillRef>
+          <a:effectRef idx="0">
+            <a:schemeClr val="accent1"/>
+          </a:effectRef>
+          <a:fontRef idx="minor">
+            <a:schemeClr val="lt1"/>
+          </a:fontRef>
+        </p:style>
+        <p:txBody>
+          <a:bodyPr rtlCol="0" anchor="ctr"/>
+          <a:lstStyle/>
+          <a:p>
+            <a:pPr algn="ctr"/>
+            <a:r>
+              <a:rPr lang="de-DE" u="sng" dirty="0">
+                <a:latin typeface="Segoe UI Variable Display Semil" pitchFamily="2" charset="0"/>
+              </a:rPr>
+              <a:t>Als was betrachtet China Taiwan?</a:t>
+            </a:r>
+            <a:endParaRPr lang="de-AT" u="sng" dirty="0">
+              <a:latin typeface="Segoe UI Variable Display Semil" pitchFamily="2" charset="0"/>
+            </a:endParaRPr>
+          </a:p>
+        </p:txBody>
+      </p:sp>
+      <p:sp>
+        <p:nvSpPr>
+          <p:cNvPr id="7" name="Rectangle 6">
+            <a:extLst>
+              <a:ext uri="{FF2B5EF4-FFF2-40B4-BE49-F238E27FC236}">
+                <a16:creationId xmlns:a16="http://schemas.microsoft.com/office/drawing/2014/main" id="{92AC8B46-E94D-7341-5667-341DF63A4556}"/>
+              </a:ext>
+            </a:extLst>
+          </p:cNvPr>
+          <p:cNvSpPr/>
+          <p:nvPr/>
+        </p:nvSpPr>
+        <p:spPr>
+          <a:xfrm>
+            <a:off x="5152574" y="1265465"/>
+            <a:ext cx="7039429" cy="928914"/>
+          </a:xfrm>
+          <a:prstGeom prst="rect">
+            <a:avLst/>
+          </a:prstGeom>
+          <a:solidFill>
+            <a:schemeClr val="tx1">
+              <a:lumMod val="65000"/>
+              <a:lumOff val="35000"/>
+            </a:schemeClr>
+          </a:solidFill>
+          <a:ln>
+            <a:noFill/>
+          </a:ln>
+        </p:spPr>
+        <p:style>
+          <a:lnRef idx="2">
+            <a:schemeClr val="accent1">
+              <a:shade val="15000"/>
+            </a:schemeClr>
+          </a:lnRef>
+          <a:fillRef idx="1">
+            <a:schemeClr val="accent1"/>
+          </a:fillRef>
+          <a:effectRef idx="0">
+            <a:schemeClr val="accent1"/>
+          </a:effectRef>
+          <a:fontRef idx="minor">
+            <a:schemeClr val="lt1"/>
+          </a:fontRef>
+        </p:style>
+        <p:txBody>
+          <a:bodyPr rtlCol="0" anchor="ctr"/>
+          <a:lstStyle/>
+          <a:p>
+            <a:pPr algn="ctr"/>
+            <a:r>
+              <a:rPr lang="de-DE" dirty="0">
+                <a:latin typeface="Segoe UI Variable Display Semil" pitchFamily="2" charset="0"/>
+              </a:rPr>
+              <a:t>"als abtrünnige Provinz, die wieder mit dem Festland vereinigt werden soll - notfalls mit militärischer Gewalt."</a:t>
+            </a:r>
+            <a:endParaRPr lang="de-AT" dirty="0">
+              <a:latin typeface="Segoe UI Variable Display Semil" pitchFamily="2" charset="0"/>
+            </a:endParaRPr>
+          </a:p>
+        </p:txBody>
+      </p:sp>
+      <p:sp>
+        <p:nvSpPr>
+          <p:cNvPr id="8" name="Rectangle 7">
+            <a:extLst>
+              <a:ext uri="{FF2B5EF4-FFF2-40B4-BE49-F238E27FC236}">
+                <a16:creationId xmlns:a16="http://schemas.microsoft.com/office/drawing/2014/main" id="{603F7AB5-7B7A-1C89-38D4-BB2C6D095D83}"/>
+              </a:ext>
+            </a:extLst>
+          </p:cNvPr>
+          <p:cNvSpPr/>
+          <p:nvPr/>
+        </p:nvSpPr>
+        <p:spPr>
+          <a:xfrm>
+            <a:off x="0" y="2383973"/>
+            <a:ext cx="7039429" cy="928914"/>
+          </a:xfrm>
+          <a:prstGeom prst="rect">
+            <a:avLst/>
+          </a:prstGeom>
+          <a:solidFill>
+            <a:schemeClr val="tx1">
+              <a:lumMod val="85000"/>
+              <a:lumOff val="15000"/>
+            </a:schemeClr>
+          </a:solidFill>
+          <a:ln>
+            <a:noFill/>
+          </a:ln>
+        </p:spPr>
+        <p:style>
+          <a:lnRef idx="2">
+            <a:schemeClr val="accent1">
+              <a:shade val="15000"/>
+            </a:schemeClr>
+          </a:lnRef>
+          <a:fillRef idx="1">
+            <a:schemeClr val="accent1"/>
+          </a:fillRef>
+          <a:effectRef idx="0">
+            <a:schemeClr val="accent1"/>
+          </a:effectRef>
+          <a:fontRef idx="minor">
+            <a:schemeClr val="lt1"/>
+          </a:fontRef>
+        </p:style>
+        <p:txBody>
+          <a:bodyPr rtlCol="0" anchor="ctr"/>
+          <a:lstStyle/>
+          <a:p>
+            <a:pPr algn="ctr"/>
+            <a:r>
+              <a:rPr lang="de-DE" u="sng" dirty="0">
+                <a:latin typeface="Segoe UI Variable Display Semil" pitchFamily="2" charset="0"/>
+              </a:rPr>
+              <a:t>Wieso ist die Abstimmung in Tuvalu so wichtig?</a:t>
+            </a:r>
+            <a:endParaRPr lang="de-AT" u="sng" dirty="0">
+              <a:latin typeface="Segoe UI Variable Display Semil" pitchFamily="2" charset="0"/>
+            </a:endParaRPr>
+          </a:p>
+        </p:txBody>
+      </p:sp>
+      <p:sp>
+        <p:nvSpPr>
+          <p:cNvPr id="9" name="Rectangle 8">
+            <a:extLst>
+              <a:ext uri="{FF2B5EF4-FFF2-40B4-BE49-F238E27FC236}">
+                <a16:creationId xmlns:a16="http://schemas.microsoft.com/office/drawing/2014/main" id="{C9F4DDD3-7496-0A19-2919-C062CECE6516}"/>
+              </a:ext>
+            </a:extLst>
+          </p:cNvPr>
+          <p:cNvSpPr/>
+          <p:nvPr/>
+        </p:nvSpPr>
+        <p:spPr>
+          <a:xfrm>
+            <a:off x="5152574" y="3511098"/>
+            <a:ext cx="7039429" cy="928914"/>
+          </a:xfrm>
+          <a:prstGeom prst="rect">
+            <a:avLst/>
+          </a:prstGeom>
+          <a:solidFill>
+            <a:schemeClr val="tx1">
+              <a:lumMod val="65000"/>
+              <a:lumOff val="35000"/>
+            </a:schemeClr>
+          </a:solidFill>
+          <a:ln>
+            <a:noFill/>
+          </a:ln>
+        </p:spPr>
+        <p:style>
+          <a:lnRef idx="2">
+            <a:schemeClr val="accent1">
+              <a:shade val="15000"/>
+            </a:schemeClr>
+          </a:lnRef>
+          <a:fillRef idx="1">
+            <a:schemeClr val="accent1"/>
+          </a:fillRef>
+          <a:effectRef idx="0">
+            <a:schemeClr val="accent1"/>
+          </a:effectRef>
+          <a:fontRef idx="minor">
+            <a:schemeClr val="lt1"/>
+          </a:fontRef>
+        </p:style>
+        <p:txBody>
+          <a:bodyPr rtlCol="0" anchor="ctr"/>
+          <a:lstStyle/>
+          <a:p>
+            <a:pPr algn="ctr"/>
+            <a:r>
+              <a:rPr lang="de-DE" dirty="0">
+                <a:latin typeface="Segoe UI Variable Display Semil" pitchFamily="2" charset="0"/>
+              </a:rPr>
+              <a:t>"China und die mit Taiwan verbündeten USA um Einfluss in der pazifischen Region ringen..."</a:t>
+            </a:r>
+            <a:endParaRPr lang="de-AT" dirty="0">
+              <a:latin typeface="Segoe UI Variable Display Semil" pitchFamily="2" charset="0"/>
+            </a:endParaRPr>
+          </a:p>
+        </p:txBody>
+      </p:sp>
+      <p:sp>
+        <p:nvSpPr>
+          <p:cNvPr id="10" name="Rectangle 9">
+            <a:extLst>
+              <a:ext uri="{FF2B5EF4-FFF2-40B4-BE49-F238E27FC236}">
+                <a16:creationId xmlns:a16="http://schemas.microsoft.com/office/drawing/2014/main" id="{23FBEFA3-6EE2-1FA9-0BF3-BF1D6CAB6738}"/>
+              </a:ext>
+            </a:extLst>
+          </p:cNvPr>
+          <p:cNvSpPr/>
+          <p:nvPr/>
+        </p:nvSpPr>
+        <p:spPr>
+          <a:xfrm>
+            <a:off x="3" y="4638223"/>
+            <a:ext cx="7039429" cy="928914"/>
+          </a:xfrm>
+          <a:prstGeom prst="rect">
+            <a:avLst/>
+          </a:prstGeom>
+          <a:solidFill>
+            <a:schemeClr val="tx1">
+              <a:lumMod val="85000"/>
+              <a:lumOff val="15000"/>
+            </a:schemeClr>
+          </a:solidFill>
+          <a:ln>
+            <a:solidFill>
+              <a:schemeClr val="tx1">
+                <a:lumMod val="85000"/>
+                <a:lumOff val="15000"/>
+              </a:schemeClr>
+            </a:solidFill>
+          </a:ln>
+        </p:spPr>
+        <p:style>
+          <a:lnRef idx="2">
+            <a:schemeClr val="accent1">
+              <a:shade val="15000"/>
+            </a:schemeClr>
+          </a:lnRef>
+          <a:fillRef idx="1">
+            <a:schemeClr val="accent1"/>
+          </a:fillRef>
+          <a:effectRef idx="0">
+            <a:schemeClr val="accent1"/>
+          </a:effectRef>
+          <a:fontRef idx="minor">
+            <a:schemeClr val="lt1"/>
+          </a:fontRef>
+        </p:style>
+        <p:txBody>
+          <a:bodyPr rtlCol="0" anchor="ctr"/>
+          <a:lstStyle/>
+          <a:p>
+            <a:pPr algn="ctr"/>
+            <a:r>
+              <a:rPr lang="de-DE" u="sng" dirty="0">
+                <a:latin typeface="Segoe UI Variable Display Semil" pitchFamily="2" charset="0"/>
+              </a:rPr>
+              <a:t>Was macht China mit allen Staaten, die mit Taiwan im Vertag stehen?</a:t>
+            </a:r>
+            <a:endParaRPr lang="de-AT" u="sng" dirty="0">
+              <a:latin typeface="Segoe UI Variable Display Semil" pitchFamily="2" charset="0"/>
+            </a:endParaRPr>
+          </a:p>
+        </p:txBody>
+      </p:sp>
+      <p:sp>
+        <p:nvSpPr>
+          <p:cNvPr id="11" name="Rectangle 10">
+            <a:extLst>
+              <a:ext uri="{FF2B5EF4-FFF2-40B4-BE49-F238E27FC236}">
+                <a16:creationId xmlns:a16="http://schemas.microsoft.com/office/drawing/2014/main" id="{C40CD1B9-C7B6-1E0F-8D03-88E8955629C7}"/>
+              </a:ext>
+            </a:extLst>
+          </p:cNvPr>
+          <p:cNvSpPr/>
+          <p:nvPr/>
+        </p:nvSpPr>
+        <p:spPr>
+          <a:xfrm>
+            <a:off x="5152577" y="5765348"/>
+            <a:ext cx="7039429" cy="928914"/>
+          </a:xfrm>
+          <a:prstGeom prst="rect">
+            <a:avLst/>
+          </a:prstGeom>
+          <a:solidFill>
+            <a:schemeClr val="tx1">
+              <a:lumMod val="65000"/>
+              <a:lumOff val="35000"/>
+            </a:schemeClr>
+          </a:solidFill>
+          <a:ln>
+            <a:noFill/>
+          </a:ln>
+        </p:spPr>
+        <p:style>
+          <a:lnRef idx="2">
+            <a:schemeClr val="accent1">
+              <a:shade val="15000"/>
+            </a:schemeClr>
+          </a:lnRef>
+          <a:fillRef idx="1">
+            <a:schemeClr val="accent1"/>
+          </a:fillRef>
+          <a:effectRef idx="0">
+            <a:schemeClr val="accent1"/>
+          </a:effectRef>
+          <a:fontRef idx="minor">
+            <a:schemeClr val="lt1"/>
+          </a:fontRef>
+        </p:style>
+        <p:txBody>
+          <a:bodyPr rtlCol="0" anchor="ctr"/>
+          <a:lstStyle/>
+          <a:p>
+            <a:pPr algn="ctr"/>
+            <a:r>
+              <a:rPr lang="de-DE" dirty="0">
+                <a:latin typeface="Segoe UI Variable Display Semil" pitchFamily="2" charset="0"/>
+              </a:rPr>
+              <a:t>"übt Druck auf alle Staaten aus, die Kontakte zu der Inselrepublik vor dem chinesischen Festland unterhalten."</a:t>
+            </a:r>
+            <a:endParaRPr lang="de-AT" dirty="0">
+              <a:latin typeface="Segoe UI Variable Display Semil" pitchFamily="2" charset="0"/>
+            </a:endParaRPr>
+          </a:p>
+        </p:txBody>
+      </p:sp>
+    </p:spTree>
+    <p:extLst>
+      <p:ext uri="{BB962C8B-B14F-4D97-AF65-F5344CB8AC3E}">
+        <p14:creationId xmlns:p14="http://schemas.microsoft.com/office/powerpoint/2010/main" val="2027113277"/>
+      </p:ext>
+    </p:extLst>
+  </p:cSld>
+  <p:clrMapOvr>
+    <a:masterClrMapping/>
+  </p:clrMapOvr>
+  <p:timing>
+    <p:tnLst>
+      <p:par>
+        <p:cTn id="1" dur="indefinite" restart="never" nodeType="tmRoot">
+          <p:childTnLst>
+            <p:seq concurrent="1" nextAc="seek">
+              <p:cTn id="2" dur="indefinite" nodeType="mainSeq">
+                <p:childTnLst>
+                  <p:par>
+                    <p:cTn id="3" fill="hold">
+                      <p:stCondLst>
+                        <p:cond delay="indefinite"/>
+                        <p:cond evt="onBegin" delay="0">
+                          <p:tn val="2"/>
+                        </p:cond>
+                      </p:stCondLst>
+                      <p:childTnLst>
+                        <p:par>
+                          <p:cTn id="4" fill="hold">
+                            <p:stCondLst>
+                              <p:cond delay="0"/>
+                            </p:stCondLst>
+                            <p:childTnLst>
+                              <p:par>
+                                <p:cTn id="5" presetID="2" presetClass="entr" presetSubtype="8" accel="20000" decel="80000" fill="hold" grpId="0" nodeType="withEffect">
                                   <p:stCondLst>
                                     <p:cond delay="0"/>
                                   </p:stCondLst>
                                   <p:childTnLst>
                                     <p:set>
                                       <p:cBhvr>
-                                        <p:cTn id="10" dur="1" fill="hold">
+                                        <p:cTn id="6" dur="1" fill="hold">
                                           <p:stCondLst>
                                             <p:cond delay="0"/>
                                           </p:stCondLst>
                                         </p:cTn>
                                         <p:tgtEl>
-                                          <p:spTgt spid="13"/>
+                                          <p:spTgt spid="6"/>
                                         </p:tgtEl>
                                         <p:attrNameLst>
                                           <p:attrName>style.visibility</p:attrName>
@@ -4306,9 +6102,264 @@
                                     </p:set>
                                     <p:anim calcmode="lin" valueType="num">
                                       <p:cBhvr additive="base">
-                                        <p:cTn id="11" dur="1000" fill="hold"/>
+                                        <p:cTn id="7" dur="1250" fill="hold"/>
                                         <p:tgtEl>
-                                          <p:spTgt spid="13"/>
+                                          <p:spTgt spid="6"/>
+                                        </p:tgtEl>
+                                        <p:attrNameLst>
+                                          <p:attrName>ppt_x</p:attrName>
+                                        </p:attrNameLst>
+                                      </p:cBhvr>
+                                      <p:tavLst>
+                                        <p:tav tm="0">
+                                          <p:val>
+                                            <p:strVal val="0-#ppt_w/2"/>
+                                          </p:val>
+                                        </p:tav>
+                                        <p:tav tm="100000">
+                                          <p:val>
+                                            <p:strVal val="#ppt_x"/>
+                                          </p:val>
+                                        </p:tav>
+                                      </p:tavLst>
+                                    </p:anim>
+                                    <p:anim calcmode="lin" valueType="num">
+                                      <p:cBhvr additive="base">
+                                        <p:cTn id="8" dur="1250" fill="hold"/>
+                                        <p:tgtEl>
+                                          <p:spTgt spid="6"/>
+                                        </p:tgtEl>
+                                        <p:attrNameLst>
+                                          <p:attrName>ppt_y</p:attrName>
+                                        </p:attrNameLst>
+                                      </p:cBhvr>
+                                      <p:tavLst>
+                                        <p:tav tm="0">
+                                          <p:val>
+                                            <p:strVal val="#ppt_y"/>
+                                          </p:val>
+                                        </p:tav>
+                                        <p:tav tm="100000">
+                                          <p:val>
+                                            <p:strVal val="#ppt_y"/>
+                                          </p:val>
+                                        </p:tav>
+                                      </p:tavLst>
+                                    </p:anim>
+                                  </p:childTnLst>
+                                </p:cTn>
+                              </p:par>
+                            </p:childTnLst>
+                          </p:cTn>
+                        </p:par>
+                        <p:par>
+                          <p:cTn id="9" fill="hold">
+                            <p:stCondLst>
+                              <p:cond delay="1250"/>
+                            </p:stCondLst>
+                            <p:childTnLst>
+                              <p:par>
+                                <p:cTn id="10" presetID="2" presetClass="entr" presetSubtype="8" accel="20000" decel="80000" fill="hold" grpId="0" nodeType="afterEffect">
+                                  <p:stCondLst>
+                                    <p:cond delay="0"/>
+                                  </p:stCondLst>
+                                  <p:childTnLst>
+                                    <p:set>
+                                      <p:cBhvr>
+                                        <p:cTn id="11" dur="1" fill="hold">
+                                          <p:stCondLst>
+                                            <p:cond delay="0"/>
+                                          </p:stCondLst>
+                                        </p:cTn>
+                                        <p:tgtEl>
+                                          <p:spTgt spid="8"/>
+                                        </p:tgtEl>
+                                        <p:attrNameLst>
+                                          <p:attrName>style.visibility</p:attrName>
+                                        </p:attrNameLst>
+                                      </p:cBhvr>
+                                      <p:to>
+                                        <p:strVal val="visible"/>
+                                      </p:to>
+                                    </p:set>
+                                    <p:anim calcmode="lin" valueType="num">
+                                      <p:cBhvr additive="base">
+                                        <p:cTn id="12" dur="1250" fill="hold"/>
+                                        <p:tgtEl>
+                                          <p:spTgt spid="8"/>
+                                        </p:tgtEl>
+                                        <p:attrNameLst>
+                                          <p:attrName>ppt_x</p:attrName>
+                                        </p:attrNameLst>
+                                      </p:cBhvr>
+                                      <p:tavLst>
+                                        <p:tav tm="0">
+                                          <p:val>
+                                            <p:strVal val="0-#ppt_w/2"/>
+                                          </p:val>
+                                        </p:tav>
+                                        <p:tav tm="100000">
+                                          <p:val>
+                                            <p:strVal val="#ppt_x"/>
+                                          </p:val>
+                                        </p:tav>
+                                      </p:tavLst>
+                                    </p:anim>
+                                    <p:anim calcmode="lin" valueType="num">
+                                      <p:cBhvr additive="base">
+                                        <p:cTn id="13" dur="1250" fill="hold"/>
+                                        <p:tgtEl>
+                                          <p:spTgt spid="8"/>
+                                        </p:tgtEl>
+                                        <p:attrNameLst>
+                                          <p:attrName>ppt_y</p:attrName>
+                                        </p:attrNameLst>
+                                      </p:cBhvr>
+                                      <p:tavLst>
+                                        <p:tav tm="0">
+                                          <p:val>
+                                            <p:strVal val="#ppt_y"/>
+                                          </p:val>
+                                        </p:tav>
+                                        <p:tav tm="100000">
+                                          <p:val>
+                                            <p:strVal val="#ppt_y"/>
+                                          </p:val>
+                                        </p:tav>
+                                      </p:tavLst>
+                                    </p:anim>
+                                  </p:childTnLst>
+                                </p:cTn>
+                              </p:par>
+                            </p:childTnLst>
+                          </p:cTn>
+                        </p:par>
+                        <p:par>
+                          <p:cTn id="14" fill="hold">
+                            <p:stCondLst>
+                              <p:cond delay="2500"/>
+                            </p:stCondLst>
+                            <p:childTnLst>
+                              <p:par>
+                                <p:cTn id="15" presetID="2" presetClass="entr" presetSubtype="8" accel="20000" decel="80000" fill="hold" grpId="0" nodeType="afterEffect">
+                                  <p:stCondLst>
+                                    <p:cond delay="0"/>
+                                  </p:stCondLst>
+                                  <p:childTnLst>
+                                    <p:set>
+                                      <p:cBhvr>
+                                        <p:cTn id="16" dur="1" fill="hold">
+                                          <p:stCondLst>
+                                            <p:cond delay="0"/>
+                                          </p:stCondLst>
+                                        </p:cTn>
+                                        <p:tgtEl>
+                                          <p:spTgt spid="10"/>
+                                        </p:tgtEl>
+                                        <p:attrNameLst>
+                                          <p:attrName>style.visibility</p:attrName>
+                                        </p:attrNameLst>
+                                      </p:cBhvr>
+                                      <p:to>
+                                        <p:strVal val="visible"/>
+                                      </p:to>
+                                    </p:set>
+                                    <p:anim calcmode="lin" valueType="num">
+                                      <p:cBhvr additive="base">
+                                        <p:cTn id="17" dur="1250" fill="hold"/>
+                                        <p:tgtEl>
+                                          <p:spTgt spid="10"/>
+                                        </p:tgtEl>
+                                        <p:attrNameLst>
+                                          <p:attrName>ppt_x</p:attrName>
+                                        </p:attrNameLst>
+                                      </p:cBhvr>
+                                      <p:tavLst>
+                                        <p:tav tm="0">
+                                          <p:val>
+                                            <p:strVal val="0-#ppt_w/2"/>
+                                          </p:val>
+                                        </p:tav>
+                                        <p:tav tm="100000">
+                                          <p:val>
+                                            <p:strVal val="#ppt_x"/>
+                                          </p:val>
+                                        </p:tav>
+                                      </p:tavLst>
+                                    </p:anim>
+                                    <p:anim calcmode="lin" valueType="num">
+                                      <p:cBhvr additive="base">
+                                        <p:cTn id="18" dur="1250" fill="hold"/>
+                                        <p:tgtEl>
+                                          <p:spTgt spid="10"/>
+                                        </p:tgtEl>
+                                        <p:attrNameLst>
+                                          <p:attrName>ppt_y</p:attrName>
+                                        </p:attrNameLst>
+                                      </p:cBhvr>
+                                      <p:tavLst>
+                                        <p:tav tm="0">
+                                          <p:val>
+                                            <p:strVal val="#ppt_y"/>
+                                          </p:val>
+                                        </p:tav>
+                                        <p:tav tm="100000">
+                                          <p:val>
+                                            <p:strVal val="#ppt_y"/>
+                                          </p:val>
+                                        </p:tav>
+                                      </p:tavLst>
+                                    </p:anim>
+                                  </p:childTnLst>
+                                </p:cTn>
+                              </p:par>
+                            </p:childTnLst>
+                          </p:cTn>
+                        </p:par>
+                      </p:childTnLst>
+                    </p:cTn>
+                  </p:par>
+                  <p:par>
+                    <p:cTn id="19" fill="hold">
+                      <p:stCondLst>
+                        <p:cond delay="indefinite"/>
+                      </p:stCondLst>
+                      <p:childTnLst>
+                        <p:par>
+                          <p:cTn id="20" fill="hold">
+                            <p:stCondLst>
+                              <p:cond delay="0"/>
+                            </p:stCondLst>
+                            <p:childTnLst>
+                              <p:par>
+                                <p:cTn id="21" presetID="2" presetClass="entr" presetSubtype="2" accel="20000" decel="80000" fill="hold" grpId="0" nodeType="clickEffect">
+                                  <p:stCondLst>
+                                    <p:cond delay="0"/>
+                                  </p:stCondLst>
+                                  <p:childTnLst>
+                                    <p:set>
+                                      <p:cBhvr>
+                                        <p:cTn id="22" dur="1" fill="hold">
+                                          <p:stCondLst>
+                                            <p:cond delay="0"/>
+                                          </p:stCondLst>
+                                        </p:cTn>
+                                        <p:tgtEl>
+                                          <p:spTgt spid="7"/>
+                                        </p:tgtEl>
+                                        <p:attrNameLst>
+                                          <p:attrName>style.visibility</p:attrName>
+                                        </p:attrNameLst>
+                                      </p:cBhvr>
+                                      <p:to>
+                                        <p:strVal val="visible"/>
+                                      </p:to>
+                                    </p:set>
+                                    <p:anim calcmode="lin" valueType="num">
+                                      <p:cBhvr additive="base">
+                                        <p:cTn id="23" dur="1250" fill="hold"/>
+                                        <p:tgtEl>
+                                          <p:spTgt spid="7"/>
                                         </p:tgtEl>
                                         <p:attrNameLst>
                                           <p:attrName>ppt_x</p:attrName>
@@ -4329,9 +6380,191 @@
                                     </p:anim>
                                     <p:anim calcmode="lin" valueType="num">
                                       <p:cBhvr additive="base">
-                                        <p:cTn id="12" dur="1000" fill="hold"/>
+                                        <p:cTn id="24" dur="1250" fill="hold"/>
                                         <p:tgtEl>
-                                          <p:spTgt spid="13"/>
+                                          <p:spTgt spid="7"/>
+                                        </p:tgtEl>
+                                        <p:attrNameLst>
+                                          <p:attrName>ppt_y</p:attrName>
+                                        </p:attrNameLst>
+                                      </p:cBhvr>
+                                      <p:tavLst>
+                                        <p:tav tm="0">
+                                          <p:val>
+                                            <p:strVal val="#ppt_y"/>
+                                          </p:val>
+                                        </p:tav>
+                                        <p:tav tm="100000">
+                                          <p:val>
+                                            <p:strVal val="#ppt_y"/>
+                                          </p:val>
+                                        </p:tav>
+                                      </p:tavLst>
+                                    </p:anim>
+                                  </p:childTnLst>
+                                </p:cTn>
+                              </p:par>
+                            </p:childTnLst>
+                          </p:cTn>
+                        </p:par>
+                      </p:childTnLst>
+                    </p:cTn>
+                  </p:par>
+                  <p:par>
+                    <p:cTn id="25" fill="hold">
+                      <p:stCondLst>
+                        <p:cond delay="indefinite"/>
+                      </p:stCondLst>
+                      <p:childTnLst>
+                        <p:par>
+                          <p:cTn id="26" fill="hold">
+                            <p:stCondLst>
+                              <p:cond delay="0"/>
+                            </p:stCondLst>
+                            <p:childTnLst>
+                              <p:par>
+                                <p:cTn id="27" presetID="2" presetClass="entr" presetSubtype="2" accel="20000" decel="80000" fill="hold" grpId="0" nodeType="clickEffect">
+                                  <p:stCondLst>
+                                    <p:cond delay="0"/>
+                                  </p:stCondLst>
+                                  <p:childTnLst>
+                                    <p:set>
+                                      <p:cBhvr>
+                                        <p:cTn id="28" dur="1" fill="hold">
+                                          <p:stCondLst>
+                                            <p:cond delay="0"/>
+                                          </p:stCondLst>
+                                        </p:cTn>
+                                        <p:tgtEl>
+                                          <p:spTgt spid="9"/>
+                                        </p:tgtEl>
+                                        <p:attrNameLst>
+                                          <p:attrName>style.visibility</p:attrName>
+                                        </p:attrNameLst>
+                                      </p:cBhvr>
+                                      <p:to>
+                                        <p:strVal val="visible"/>
+                                      </p:to>
+                                    </p:set>
+                                    <p:anim calcmode="lin" valueType="num">
+                                      <p:cBhvr additive="base">
+                                        <p:cTn id="29" dur="1250" fill="hold"/>
+                                        <p:tgtEl>
+                                          <p:spTgt spid="9"/>
+                                        </p:tgtEl>
+                                        <p:attrNameLst>
+                                          <p:attrName>ppt_x</p:attrName>
+                                        </p:attrNameLst>
+                                      </p:cBhvr>
+                                      <p:tavLst>
+                                        <p:tav tm="0">
+                                          <p:val>
+                                            <p:strVal val="1+#ppt_w/2"/>
+                                          </p:val>
+                                        </p:tav>
+                                        <p:tav tm="100000">
+                                          <p:val>
+                                            <p:strVal val="#ppt_x"/>
+                                          </p:val>
+                                        </p:tav>
+                                      </p:tavLst>
+                                    </p:anim>
+                                    <p:anim calcmode="lin" valueType="num">
+                                      <p:cBhvr additive="base">
+                                        <p:cTn id="30" dur="1250" fill="hold"/>
+                                        <p:tgtEl>
+                                          <p:spTgt spid="9"/>
+                                        </p:tgtEl>
+                                        <p:attrNameLst>
+                                          <p:attrName>ppt_y</p:attrName>
+                                        </p:attrNameLst>
+                                      </p:cBhvr>
+                                      <p:tavLst>
+                                        <p:tav tm="0">
+                                          <p:val>
+                                            <p:strVal val="#ppt_y"/>
+                                          </p:val>
+                                        </p:tav>
+                                        <p:tav tm="100000">
+                                          <p:val>
+                                            <p:strVal val="#ppt_y"/>
+                                          </p:val>
+                                        </p:tav>
+                                      </p:tavLst>
+                                    </p:anim>
+                                  </p:childTnLst>
+                                </p:cTn>
+                              </p:par>
+                            </p:childTnLst>
+                          </p:cTn>
+                        </p:par>
+                      </p:childTnLst>
+                    </p:cTn>
+                  </p:par>
+                  <p:par>
+                    <p:cTn id="31" fill="hold">
+                      <p:stCondLst>
+                        <p:cond delay="indefinite"/>
+                      </p:stCondLst>
+                      <p:childTnLst>
+                        <p:par>
+                          <p:cTn id="32" fill="hold">
+                            <p:stCondLst>
+                              <p:cond delay="0"/>
+                            </p:stCondLst>
+                            <p:childTnLst>
+                              <p:par>
+                                <p:cTn id="33" presetID="2" presetClass="entr" presetSubtype="2" accel="20000" decel="80000" fill="hold" grpId="0" nodeType="clickEffect">
+                                  <p:stCondLst>
+                                    <p:cond delay="0"/>
+                                  </p:stCondLst>
+                                  <p:childTnLst>
+                                    <p:set>
+                                      <p:cBhvr>
+                                        <p:cTn id="34" dur="1" fill="hold">
+                                          <p:stCondLst>
+                                            <p:cond delay="0"/>
+                                          </p:stCondLst>
+                                        </p:cTn>
+                                        <p:tgtEl>
+                                          <p:spTgt spid="11"/>
+                                        </p:tgtEl>
+                                        <p:attrNameLst>
+                                          <p:attrName>style.visibility</p:attrName>
+                                        </p:attrNameLst>
+                                      </p:cBhvr>
+                                      <p:to>
+                                        <p:strVal val="visible"/>
+                                      </p:to>
+                                    </p:set>
+                                    <p:anim calcmode="lin" valueType="num">
+                                      <p:cBhvr additive="base">
+                                        <p:cTn id="35" dur="1250" fill="hold"/>
+                                        <p:tgtEl>
+                                          <p:spTgt spid="11"/>
+                                        </p:tgtEl>
+                                        <p:attrNameLst>
+                                          <p:attrName>ppt_x</p:attrName>
+                                        </p:attrNameLst>
+                                      </p:cBhvr>
+                                      <p:tavLst>
+                                        <p:tav tm="0">
+                                          <p:val>
+                                            <p:strVal val="1+#ppt_w/2"/>
+                                          </p:val>
+                                        </p:tav>
+                                        <p:tav tm="100000">
+                                          <p:val>
+                                            <p:strVal val="#ppt_x"/>
+                                          </p:val>
+                                        </p:tav>
+                                      </p:tavLst>
+                                    </p:anim>
+                                    <p:anim calcmode="lin" valueType="num">
+                                      <p:cBhvr additive="base">
+                                        <p:cTn id="36" dur="1250" fill="hold"/>
+                                        <p:tgtEl>
+                                          <p:spTgt spid="11"/>
                                         </p:tgtEl>
                                         <p:attrNameLst>
                                           <p:attrName>ppt_y</p:attrName>
@@ -4380,6 +6613,329 @@
         </p:cTn>
       </p:par>
     </p:tnLst>
+    <p:bldLst>
+      <p:bldP spid="6" grpId="0" animBg="1"/>
+      <p:bldP spid="7" grpId="0" animBg="1"/>
+      <p:bldP spid="8" grpId="0" animBg="1"/>
+      <p:bldP spid="9" grpId="0" animBg="1"/>
+      <p:bldP spid="10" grpId="0" animBg="1"/>
+      <p:bldP spid="11" grpId="0" animBg="1"/>
+    </p:bldLst>
+  </p:timing>
+</p:sld>
+</file>
+
+<file path=ppt/slides/slide5.xml><?xml version="1.0" encoding="utf-8"?>
+<p:sld xmlns:a="http://schemas.openxmlformats.org/drawingml/2006/main" xmlns:r="http://schemas.openxmlformats.org/officeDocument/2006/relationships" xmlns:p="http://schemas.openxmlformats.org/presentationml/2006/main">
+  <p:cSld>
+    <p:spTree>
+      <p:nvGrpSpPr>
+        <p:cNvPr id="1" name=""/>
+        <p:cNvGrpSpPr/>
+        <p:nvPr/>
+      </p:nvGrpSpPr>
+      <p:grpSpPr>
+        <a:xfrm>
+          <a:off x="0" y="0"/>
+          <a:ext cx="0" cy="0"/>
+          <a:chOff x="0" y="0"/>
+          <a:chExt cx="0" cy="0"/>
+        </a:xfrm>
+      </p:grpSpPr>
+      <p:pic>
+        <p:nvPicPr>
+          <p:cNvPr id="2" name="Picture 2" descr="China's growing military confidence puts Taiwan at risk">
+            <a:extLst>
+              <a:ext uri="{FF2B5EF4-FFF2-40B4-BE49-F238E27FC236}">
+                <a16:creationId xmlns:a16="http://schemas.microsoft.com/office/drawing/2014/main" id="{984A1025-B197-9A0F-EBA9-1804C745C804}"/>
+              </a:ext>
+            </a:extLst>
+          </p:cNvPr>
+          <p:cNvPicPr>
+            <a:picLocks noChangeAspect="1" noChangeArrowheads="1"/>
+          </p:cNvPicPr>
+          <p:nvPr/>
+        </p:nvPicPr>
+        <p:blipFill rotWithShape="1">
+          <a:blip r:embed="rId2">
+            <a:alphaModFix/>
+            <a:extLst>
+              <a:ext uri="{BEBA8EAE-BF5A-486C-A8C5-ECC9F3942E4B}">
+                <a14:imgProps xmlns:a14="http://schemas.microsoft.com/office/drawing/2010/main">
+                  <a14:imgLayer r:embed="rId3">
+                    <a14:imgEffect>
+                      <a14:brightnessContrast bright="-40000" contrast="-40000"/>
+                    </a14:imgEffect>
+                  </a14:imgLayer>
+                </a14:imgProps>
+              </a:ext>
+              <a:ext uri="{28A0092B-C50C-407E-A947-70E740481C1C}">
+                <a14:useLocalDpi xmlns:a14="http://schemas.microsoft.com/office/drawing/2010/main" val="0"/>
+              </a:ext>
+            </a:extLst>
+          </a:blip>
+          <a:srcRect t="10450" b="6601"/>
+          <a:stretch/>
+        </p:blipFill>
+        <p:spPr bwMode="auto">
+          <a:xfrm>
+            <a:off x="0" y="1"/>
+            <a:ext cx="12193200" cy="6858000"/>
+          </a:xfrm>
+          <a:prstGeom prst="rect">
+            <a:avLst/>
+          </a:prstGeom>
+          <a:noFill/>
+          <a:extLst>
+            <a:ext uri="{909E8E84-426E-40DD-AFC4-6F175D3DCCD1}">
+              <a14:hiddenFill xmlns:a14="http://schemas.microsoft.com/office/drawing/2010/main">
+                <a:solidFill>
+                  <a:srgbClr val="FFFFFF"/>
+                </a:solidFill>
+              </a14:hiddenFill>
+            </a:ext>
+          </a:extLst>
+        </p:spPr>
+      </p:pic>
+      <p:sp>
+        <p:nvSpPr>
+          <p:cNvPr id="5" name="TextBox 4">
+            <a:extLst>
+              <a:ext uri="{FF2B5EF4-FFF2-40B4-BE49-F238E27FC236}">
+                <a16:creationId xmlns:a16="http://schemas.microsoft.com/office/drawing/2014/main" id="{7CC6F07C-2673-233E-B6C9-FFB3D03A1AD8}"/>
+              </a:ext>
+            </a:extLst>
+          </p:cNvPr>
+          <p:cNvSpPr txBox="1"/>
+          <p:nvPr/>
+        </p:nvSpPr>
+        <p:spPr>
+          <a:xfrm>
+            <a:off x="2603092" y="3013501"/>
+            <a:ext cx="6985815" cy="830997"/>
+          </a:xfrm>
+          <a:prstGeom prst="rect">
+            <a:avLst/>
+          </a:prstGeom>
+          <a:noFill/>
+        </p:spPr>
+        <p:txBody>
+          <a:bodyPr wrap="square" rtlCol="0">
+            <a:spAutoFit/>
+          </a:bodyPr>
+          <a:lstStyle/>
+          <a:p>
+            <a:r>
+              <a:rPr lang="de-AT" sz="4800" dirty="0">
+                <a:solidFill>
+                  <a:schemeClr val="bg1"/>
+                </a:solidFill>
+                <a:effectLst>
+                  <a:outerShdw blurRad="38100" dist="38100" dir="2700000" algn="tl">
+                    <a:srgbClr val="000000">
+                      <a:alpha val="43137"/>
+                    </a:srgbClr>
+                  </a:outerShdw>
+                </a:effectLst>
+                <a:latin typeface="Segoe UI Variable Display Semil" pitchFamily="2" charset="0"/>
+              </a:rPr>
+              <a:t>Vielen Dank fürs Zuhören!</a:t>
+            </a:r>
+          </a:p>
+        </p:txBody>
+      </p:sp>
+      <p:sp>
+        <p:nvSpPr>
+          <p:cNvPr id="3" name="Rectangle: Diagonal Corners Snipped 2">
+            <a:extLst>
+              <a:ext uri="{FF2B5EF4-FFF2-40B4-BE49-F238E27FC236}">
+                <a16:creationId xmlns:a16="http://schemas.microsoft.com/office/drawing/2014/main" id="{0DCB0C9B-09F3-B763-3E95-36D29DCD776C}"/>
+              </a:ext>
+            </a:extLst>
+          </p:cNvPr>
+          <p:cNvSpPr/>
+          <p:nvPr/>
+        </p:nvSpPr>
+        <p:spPr>
+          <a:xfrm rot="20127690">
+            <a:off x="-7448958" y="6654521"/>
+            <a:ext cx="9414214" cy="4811232"/>
+          </a:xfrm>
+          <a:prstGeom prst="snip2DiagRect">
+            <a:avLst/>
+          </a:prstGeom>
+          <a:blipFill>
+            <a:blip r:embed="rId4">
+              <a:extLst>
+                <a:ext uri="{BEBA8EAE-BF5A-486C-A8C5-ECC9F3942E4B}">
+                  <a14:imgProps xmlns:a14="http://schemas.microsoft.com/office/drawing/2010/main">
+                    <a14:imgLayer r:embed="rId5">
+                      <a14:imgEffect>
+                        <a14:backgroundRemoval t="9576" b="89663" l="6817" r="93401">
+                          <a14:foregroundMark x1="10080" y1="38303" x2="4423" y2="40588"/>
+                          <a14:foregroundMark x1="4423" y1="40588" x2="9862" y2="46681"/>
+                          <a14:foregroundMark x1="9862" y1="46681" x2="10152" y2="38629"/>
+                          <a14:foregroundMark x1="7179" y1="39391" x2="6817" y2="39608"/>
+                          <a14:foregroundMark x1="89775" y1="58651" x2="90573" y2="59304"/>
+                          <a14:foregroundMark x1="93256" y1="58868" x2="93401" y2="60283"/>
+                        </a14:backgroundRemoval>
+                      </a14:imgEffect>
+                    </a14:imgLayer>
+                  </a14:imgProps>
+                </a:ext>
+              </a:extLst>
+            </a:blip>
+            <a:stretch>
+              <a:fillRect/>
+            </a:stretch>
+          </a:blipFill>
+          <a:ln>
+            <a:noFill/>
+          </a:ln>
+        </p:spPr>
+        <p:style>
+          <a:lnRef idx="2">
+            <a:schemeClr val="accent1">
+              <a:shade val="15000"/>
+            </a:schemeClr>
+          </a:lnRef>
+          <a:fillRef idx="1">
+            <a:schemeClr val="accent1"/>
+          </a:fillRef>
+          <a:effectRef idx="0">
+            <a:schemeClr val="accent1"/>
+          </a:effectRef>
+          <a:fontRef idx="minor">
+            <a:schemeClr val="lt1"/>
+          </a:fontRef>
+        </p:style>
+        <p:txBody>
+          <a:bodyPr rtlCol="0" anchor="ctr"/>
+          <a:lstStyle/>
+          <a:p>
+            <a:pPr algn="ctr"/>
+            <a:endParaRPr lang="en-AU" dirty="0"/>
+          </a:p>
+        </p:txBody>
+      </p:sp>
+    </p:spTree>
+    <p:extLst>
+      <p:ext uri="{BB962C8B-B14F-4D97-AF65-F5344CB8AC3E}">
+        <p14:creationId xmlns:p14="http://schemas.microsoft.com/office/powerpoint/2010/main" val="4206479646"/>
+      </p:ext>
+    </p:extLst>
+  </p:cSld>
+  <p:clrMapOvr>
+    <a:masterClrMapping/>
+  </p:clrMapOvr>
+  <p:timing>
+    <p:tnLst>
+      <p:par>
+        <p:cTn id="1" dur="indefinite" restart="never" nodeType="tmRoot">
+          <p:childTnLst>
+            <p:seq concurrent="1" nextAc="seek">
+              <p:cTn id="2" dur="indefinite" nodeType="mainSeq">
+                <p:childTnLst>
+                  <p:par>
+                    <p:cTn id="3" fill="hold">
+                      <p:stCondLst>
+                        <p:cond delay="indefinite"/>
+                      </p:stCondLst>
+                      <p:childTnLst>
+                        <p:par>
+                          <p:cTn id="4" fill="hold">
+                            <p:stCondLst>
+                              <p:cond delay="0"/>
+                            </p:stCondLst>
+                            <p:childTnLst>
+                              <p:par>
+                                <p:cTn id="5" presetID="0" presetClass="path" presetSubtype="0" accel="50000" decel="50000" fill="hold" grpId="0" nodeType="clickEffect">
+                                  <p:stCondLst>
+                                    <p:cond delay="0"/>
+                                  </p:stCondLst>
+                                  <p:childTnLst>
+                                    <p:animMotion origin="layout" path="M 1.5668 -1.54328 L -5E-6 3.33333E-6 " pathEditMode="relative" rAng="0" ptsTypes="AA">
+                                      <p:cBhvr>
+                                        <p:cTn id="6" dur="2000" fill="hold"/>
+                                        <p:tgtEl>
+                                          <p:spTgt spid="3"/>
+                                        </p:tgtEl>
+                                        <p:attrNameLst>
+                                          <p:attrName>ppt_x</p:attrName>
+                                          <p:attrName>ppt_y</p:attrName>
+                                        </p:attrNameLst>
+                                      </p:cBhvr>
+                                      <p:rCtr x="-77253" y="71944"/>
+                                    </p:animMotion>
+                                  </p:childTnLst>
+                                </p:cTn>
+                              </p:par>
+                              <p:par>
+                                <p:cTn id="7" presetID="10" presetClass="entr" presetSubtype="0" fill="hold" grpId="0" nodeType="withEffect">
+                                  <p:stCondLst>
+                                    <p:cond delay="1000"/>
+                                  </p:stCondLst>
+                                  <p:childTnLst>
+                                    <p:set>
+                                      <p:cBhvr>
+                                        <p:cTn id="8" dur="1" fill="hold">
+                                          <p:stCondLst>
+                                            <p:cond delay="0"/>
+                                          </p:stCondLst>
+                                        </p:cTn>
+                                        <p:tgtEl>
+                                          <p:spTgt spid="5"/>
+                                        </p:tgtEl>
+                                        <p:attrNameLst>
+                                          <p:attrName>style.visibility</p:attrName>
+                                        </p:attrNameLst>
+                                      </p:cBhvr>
+                                      <p:to>
+                                        <p:strVal val="visible"/>
+                                      </p:to>
+                                    </p:set>
+                                    <p:animEffect transition="in" filter="fade">
+                                      <p:cBhvr>
+                                        <p:cTn id="9" dur="500"/>
+                                        <p:tgtEl>
+                                          <p:spTgt spid="5"/>
+                                        </p:tgtEl>
+                                      </p:cBhvr>
+                                    </p:animEffect>
+                                  </p:childTnLst>
+                                </p:cTn>
+                              </p:par>
+                            </p:childTnLst>
+                          </p:cTn>
+                        </p:par>
+                      </p:childTnLst>
+                    </p:cTn>
+                  </p:par>
+                </p:childTnLst>
+              </p:cTn>
+              <p:prevCondLst>
+                <p:cond evt="onPrev" delay="0">
+                  <p:tgtEl>
+                    <p:sldTgt/>
+                  </p:tgtEl>
+                </p:cond>
+              </p:prevCondLst>
+              <p:nextCondLst>
+                <p:cond evt="onNext" delay="0">
+                  <p:tgtEl>
+                    <p:sldTgt/>
+                  </p:tgtEl>
+                </p:cond>
+              </p:nextCondLst>
+            </p:seq>
+          </p:childTnLst>
+        </p:cTn>
+      </p:par>
+    </p:tnLst>
+    <p:bldLst>
+      <p:bldP spid="5" grpId="0"/>
+      <p:bldP spid="3" grpId="0" animBg="1"/>
+    </p:bldLst>
   </p:timing>
 </p:sld>
 </file>
@@ -4677,4 +7233,299 @@
     </a:ext>
   </a:extLst>
 </a:theme>
+</file>
+
+<file path=ppt/theme/theme2.xml><?xml version="1.0" encoding="utf-8"?>
+<a:theme xmlns:a="http://schemas.openxmlformats.org/drawingml/2006/main" name="Office Theme">
+  <a:themeElements>
+    <a:clrScheme name="Office">
+      <a:dk1>
+        <a:sysClr val="windowText" lastClr="000000"/>
+      </a:dk1>
+      <a:lt1>
+        <a:sysClr val="window" lastClr="FFFFFF"/>
+      </a:lt1>
+      <a:dk2>
+        <a:srgbClr val="44546A"/>
+      </a:dk2>
+      <a:lt2>
+        <a:srgbClr val="E7E6E6"/>
+      </a:lt2>
+      <a:accent1>
+        <a:srgbClr val="4472C4"/>
+      </a:accent1>
+      <a:accent2>
+        <a:srgbClr val="ED7D31"/>
+      </a:accent2>
+      <a:accent3>
+        <a:srgbClr val="A5A5A5"/>
+      </a:accent3>
+      <a:accent4>
+        <a:srgbClr val="FFC000"/>
+      </a:accent4>
+      <a:accent5>
+        <a:srgbClr val="5B9BD5"/>
+      </a:accent5>
+      <a:accent6>
+        <a:srgbClr val="70AD47"/>
+      </a:accent6>
+      <a:hlink>
+        <a:srgbClr val="0563C1"/>
+      </a:hlink>
+      <a:folHlink>
+        <a:srgbClr val="954F72"/>
+      </a:folHlink>
+    </a:clrScheme>
+    <a:fontScheme name="Office">
+      <a:majorFont>
+        <a:latin typeface="Calibri Light" panose="020F0302020204030204"/>
+        <a:ea typeface=""/>
+        <a:cs typeface=""/>
+        <a:font script="Jpan" typeface="游ゴシック Light"/>
+        <a:font script="Hang" typeface="맑은 고딕"/>
+        <a:font script="Hans" typeface="等线 Light"/>
+        <a:font script="Hant" typeface="新細明體"/>
+        <a:font script="Arab" typeface="Times New Roman"/>
+        <a:font script="Hebr" typeface="Times New Roman"/>
+        <a:font script="Thai" typeface="Angsana New"/>
+        <a:font script="Ethi" typeface="Nyala"/>
+        <a:font script="Beng" typeface="Vrinda"/>
+        <a:font script="Gujr" typeface="Shruti"/>
+        <a:font script="Khmr" typeface="MoolBoran"/>
+        <a:font script="Knda" typeface="Tunga"/>
+        <a:font script="Guru" typeface="Raavi"/>
+        <a:font script="Cans" typeface="Euphemia"/>
+        <a:font script="Cher" typeface="Plantagenet Cherokee"/>
+        <a:font script="Yiii" typeface="Microsoft Yi Baiti"/>
+        <a:font script="Tibt" typeface="Microsoft Himalaya"/>
+        <a:font script="Thaa" typeface="MV Boli"/>
+        <a:font script="Deva" typeface="Mangal"/>
+        <a:font script="Telu" typeface="Gautami"/>
+        <a:font script="Taml" typeface="Latha"/>
+        <a:font script="Syrc" typeface="Estrangelo Edessa"/>
+        <a:font script="Orya" typeface="Kalinga"/>
+        <a:font script="Mlym" typeface="Kartika"/>
+        <a:font script="Laoo" typeface="DokChampa"/>
+        <a:font script="Sinh" typeface="Iskoola Pota"/>
+        <a:font script="Mong" typeface="Mongolian Baiti"/>
+        <a:font script="Viet" typeface="Times New Roman"/>
+        <a:font script="Uigh" typeface="Microsoft Uighur"/>
+        <a:font script="Geor" typeface="Sylfaen"/>
+        <a:font script="Armn" typeface="Arial"/>
+        <a:font script="Bugi" typeface="Leelawadee UI"/>
+        <a:font script="Bopo" typeface="Microsoft JhengHei"/>
+        <a:font script="Java" typeface="Javanese Text"/>
+        <a:font script="Lisu" typeface="Segoe UI"/>
+        <a:font script="Mymr" typeface="Myanmar Text"/>
+        <a:font script="Nkoo" typeface="Ebrima"/>
+        <a:font script="Olck" typeface="Nirmala UI"/>
+        <a:font script="Osma" typeface="Ebrima"/>
+        <a:font script="Phag" typeface="Phagspa"/>
+        <a:font script="Syrn" typeface="Estrangelo Edessa"/>
+        <a:font script="Syrj" typeface="Estrangelo Edessa"/>
+        <a:font script="Syre" typeface="Estrangelo Edessa"/>
+        <a:font script="Sora" typeface="Nirmala UI"/>
+        <a:font script="Tale" typeface="Microsoft Tai Le"/>
+        <a:font script="Talu" typeface="Microsoft New Tai Lue"/>
+        <a:font script="Tfng" typeface="Ebrima"/>
+      </a:majorFont>
+      <a:minorFont>
+        <a:latin typeface="Calibri" panose="020F0502020204030204"/>
+        <a:ea typeface=""/>
+        <a:cs typeface=""/>
+        <a:font script="Jpan" typeface="游ゴシック"/>
+        <a:font script="Hang" typeface="맑은 고딕"/>
+        <a:font script="Hans" typeface="等线"/>
+        <a:font script="Hant" typeface="新細明體"/>
+        <a:font script="Arab" typeface="Arial"/>
+        <a:font script="Hebr" typeface="Arial"/>
+        <a:font script="Thai" typeface="Cordia New"/>
+        <a:font script="Ethi" typeface="Nyala"/>
+        <a:font script="Beng" typeface="Vrinda"/>
+        <a:font script="Gujr" typeface="Shruti"/>
+        <a:font script="Khmr" typeface="DaunPenh"/>
+        <a:font script="Knda" typeface="Tunga"/>
+        <a:font script="Guru" typeface="Raavi"/>
+        <a:font script="Cans" typeface="Euphemia"/>
+        <a:font script="Cher" typeface="Plantagenet Cherokee"/>
+        <a:font script="Yiii" typeface="Microsoft Yi Baiti"/>
+        <a:font script="Tibt" typeface="Microsoft Himalaya"/>
+        <a:font script="Thaa" typeface="MV Boli"/>
+        <a:font script="Deva" typeface="Mangal"/>
+        <a:font script="Telu" typeface="Gautami"/>
+        <a:font script="Taml" typeface="Latha"/>
+        <a:font script="Syrc" typeface="Estrangelo Edessa"/>
+        <a:font script="Orya" typeface="Kalinga"/>
+        <a:font script="Mlym" typeface="Kartika"/>
+        <a:font script="Laoo" typeface="DokChampa"/>
+        <a:font script="Sinh" typeface="Iskoola Pota"/>
+        <a:font script="Mong" typeface="Mongolian Baiti"/>
+        <a:font script="Viet" typeface="Arial"/>
+        <a:font script="Uigh" typeface="Microsoft Uighur"/>
+        <a:font script="Geor" typeface="Sylfaen"/>
+        <a:font script="Armn" typeface="Arial"/>
+        <a:font script="Bugi" typeface="Leelawadee UI"/>
+        <a:font script="Bopo" typeface="Microsoft JhengHei"/>
+        <a:font script="Java" typeface="Javanese Text"/>
+        <a:font script="Lisu" typeface="Segoe UI"/>
+        <a:font script="Mymr" typeface="Myanmar Text"/>
+        <a:font script="Nkoo" typeface="Ebrima"/>
+        <a:font script="Olck" typeface="Nirmala UI"/>
+        <a:font script="Osma" typeface="Ebrima"/>
+        <a:font script="Phag" typeface="Phagspa"/>
+        <a:font script="Syrn" typeface="Estrangelo Edessa"/>
+        <a:font script="Syrj" typeface="Estrangelo Edessa"/>
+        <a:font script="Syre" typeface="Estrangelo Edessa"/>
+        <a:font script="Sora" typeface="Nirmala UI"/>
+        <a:font script="Tale" typeface="Microsoft Tai Le"/>
+        <a:font script="Talu" typeface="Microsoft New Tai Lue"/>
+        <a:font script="Tfng" typeface="Ebrima"/>
+      </a:minorFont>
+    </a:fontScheme>
+    <a:fmtScheme name="Office">
+      <a:fillStyleLst>
+        <a:solidFill>
+          <a:schemeClr val="phClr"/>
+        </a:solidFill>
+        <a:gradFill rotWithShape="1">
+          <a:gsLst>
+            <a:gs pos="0">
+              <a:schemeClr val="phClr">
+                <a:lumMod val="110000"/>
+                <a:satMod val="105000"/>
+                <a:tint val="67000"/>
+              </a:schemeClr>
+            </a:gs>
+            <a:gs pos="50000">
+              <a:schemeClr val="phClr">
+                <a:lumMod val="105000"/>
+                <a:satMod val="103000"/>
+                <a:tint val="73000"/>
+              </a:schemeClr>
+            </a:gs>
+            <a:gs pos="100000">
+              <a:schemeClr val="phClr">
+                <a:lumMod val="105000"/>
+                <a:satMod val="109000"/>
+                <a:tint val="81000"/>
+              </a:schemeClr>
+            </a:gs>
+          </a:gsLst>
+          <a:lin ang="5400000" scaled="0"/>
+        </a:gradFill>
+        <a:gradFill rotWithShape="1">
+          <a:gsLst>
+            <a:gs pos="0">
+              <a:schemeClr val="phClr">
+                <a:satMod val="103000"/>
+                <a:lumMod val="102000"/>
+                <a:tint val="94000"/>
+              </a:schemeClr>
+            </a:gs>
+            <a:gs pos="50000">
+              <a:schemeClr val="phClr">
+                <a:satMod val="110000"/>
+                <a:lumMod val="100000"/>
+                <a:shade val="100000"/>
+              </a:schemeClr>
+            </a:gs>
+            <a:gs pos="100000">
+              <a:schemeClr val="phClr">
+                <a:lumMod val="99000"/>
+                <a:satMod val="120000"/>
+                <a:shade val="78000"/>
+              </a:schemeClr>
+            </a:gs>
+          </a:gsLst>
+          <a:lin ang="5400000" scaled="0"/>
+        </a:gradFill>
+      </a:fillStyleLst>
+      <a:lnStyleLst>
+        <a:ln w="6350" cap="flat" cmpd="sng" algn="ctr">
+          <a:solidFill>
+            <a:schemeClr val="phClr"/>
+          </a:solidFill>
+          <a:prstDash val="solid"/>
+          <a:miter lim="800000"/>
+        </a:ln>
+        <a:ln w="12700" cap="flat" cmpd="sng" algn="ctr">
+          <a:solidFill>
+            <a:schemeClr val="phClr"/>
+          </a:solidFill>
+          <a:prstDash val="solid"/>
+          <a:miter lim="800000"/>
+        </a:ln>
+        <a:ln w="19050" cap="flat" cmpd="sng" algn="ctr">
+          <a:solidFill>
+            <a:schemeClr val="phClr"/>
+          </a:solidFill>
+          <a:prstDash val="solid"/>
+          <a:miter lim="800000"/>
+        </a:ln>
+      </a:lnStyleLst>
+      <a:effectStyleLst>
+        <a:effectStyle>
+          <a:effectLst/>
+        </a:effectStyle>
+        <a:effectStyle>
+          <a:effectLst/>
+        </a:effectStyle>
+        <a:effectStyle>
+          <a:effectLst>
+            <a:outerShdw blurRad="57150" dist="19050" dir="5400000" algn="ctr" rotWithShape="0">
+              <a:srgbClr val="000000">
+                <a:alpha val="63000"/>
+              </a:srgbClr>
+            </a:outerShdw>
+          </a:effectLst>
+        </a:effectStyle>
+      </a:effectStyleLst>
+      <a:bgFillStyleLst>
+        <a:solidFill>
+          <a:schemeClr val="phClr"/>
+        </a:solidFill>
+        <a:solidFill>
+          <a:schemeClr val="phClr">
+            <a:tint val="95000"/>
+            <a:satMod val="170000"/>
+          </a:schemeClr>
+        </a:solidFill>
+        <a:gradFill rotWithShape="1">
+          <a:gsLst>
+            <a:gs pos="0">
+              <a:schemeClr val="phClr">
+                <a:tint val="93000"/>
+                <a:satMod val="150000"/>
+                <a:shade val="98000"/>
+                <a:lumMod val="102000"/>
+              </a:schemeClr>
+            </a:gs>
+            <a:gs pos="50000">
+              <a:schemeClr val="phClr">
+                <a:tint val="98000"/>
+                <a:satMod val="130000"/>
+                <a:shade val="90000"/>
+                <a:lumMod val="103000"/>
+              </a:schemeClr>
+            </a:gs>
+            <a:gs pos="100000">
+              <a:schemeClr val="phClr">
+                <a:shade val="63000"/>
+                <a:satMod val="120000"/>
+              </a:schemeClr>
+            </a:gs>
+          </a:gsLst>
+          <a:lin ang="5400000" scaled="0"/>
+        </a:gradFill>
+      </a:bgFillStyleLst>
+    </a:fmtScheme>
+  </a:themeElements>
+  <a:objectDefaults/>
+  <a:extraClrSchemeLst/>
+  <a:extLst>
+    <a:ext uri="{05A4C25C-085E-4340-85A3-A5531E510DB2}">
+      <thm15:themeFamily xmlns:thm15="http://schemas.microsoft.com/office/thememl/2012/main" name="Office Theme" id="{62F939B6-93AF-4DB8-9C6B-D6C7DFDC589F}" vid="{4A3C46E8-61CC-4603-A589-7422A47A8E4A}"/>
+    </a:ext>
+  </a:extLst>
+</a:theme>
 </file>
</xml_diff>

<commit_message>
Vault backup: 30/01/24 20:08:43 ASUS
Affected files:
WIR/Wirtschaft/Zeitungsartikel.pptx
</commit_message>
<xml_diff>
--- a/WIR/Wirtschaft/Zeitungsartikel.pptx
+++ b/WIR/Wirtschaft/Zeitungsartikel.pptx
@@ -5,14 +5,15 @@
     <p:sldMasterId id="2147483648" r:id="rId1"/>
   </p:sldMasterIdLst>
   <p:notesMasterIdLst>
-    <p:notesMasterId r:id="rId7"/>
+    <p:notesMasterId r:id="rId8"/>
   </p:notesMasterIdLst>
   <p:sldIdLst>
     <p:sldId id="256" r:id="rId2"/>
     <p:sldId id="257" r:id="rId3"/>
     <p:sldId id="258" r:id="rId4"/>
     <p:sldId id="259" r:id="rId5"/>
-    <p:sldId id="260" r:id="rId6"/>
+    <p:sldId id="261" r:id="rId6"/>
+    <p:sldId id="260" r:id="rId7"/>
   </p:sldIdLst>
   <p:sldSz cx="12192000" cy="6858000"/>
   <p:notesSz cx="6858000" cy="9144000"/>
@@ -360,7 +361,7 @@
           <a:p>
             <a:fld id="{E3149BBE-474E-4122-8657-31F7BB1071B1}" type="slidenum">
               <a:rPr lang="de-AT" smtClean="0"/>
-              <a:t>‹#›</a:t>
+              <a:t>‹Nr.›</a:t>
             </a:fld>
             <a:endParaRPr lang="de-AT"/>
           </a:p>
@@ -776,7 +777,7 @@
           <a:p>
             <a:fld id="{C404F00C-D47C-4BF4-A179-F92F46FAD4EE}" type="slidenum">
               <a:rPr lang="en-AU" smtClean="0"/>
-              <a:t>‹#›</a:t>
+              <a:t>‹Nr.›</a:t>
             </a:fld>
             <a:endParaRPr lang="en-AU"/>
           </a:p>
@@ -976,7 +977,7 @@
           <a:p>
             <a:fld id="{C404F00C-D47C-4BF4-A179-F92F46FAD4EE}" type="slidenum">
               <a:rPr lang="en-AU" smtClean="0"/>
-              <a:t>‹#›</a:t>
+              <a:t>‹Nr.›</a:t>
             </a:fld>
             <a:endParaRPr lang="en-AU"/>
           </a:p>
@@ -1186,7 +1187,7 @@
           <a:p>
             <a:fld id="{C404F00C-D47C-4BF4-A179-F92F46FAD4EE}" type="slidenum">
               <a:rPr lang="en-AU" smtClean="0"/>
-              <a:t>‹#›</a:t>
+              <a:t>‹Nr.›</a:t>
             </a:fld>
             <a:endParaRPr lang="en-AU"/>
           </a:p>
@@ -1386,7 +1387,7 @@
           <a:p>
             <a:fld id="{C404F00C-D47C-4BF4-A179-F92F46FAD4EE}" type="slidenum">
               <a:rPr lang="en-AU" smtClean="0"/>
-              <a:t>‹#›</a:t>
+              <a:t>‹Nr.›</a:t>
             </a:fld>
             <a:endParaRPr lang="en-AU"/>
           </a:p>
@@ -1662,7 +1663,7 @@
           <a:p>
             <a:fld id="{C404F00C-D47C-4BF4-A179-F92F46FAD4EE}" type="slidenum">
               <a:rPr lang="en-AU" smtClean="0"/>
-              <a:t>‹#›</a:t>
+              <a:t>‹Nr.›</a:t>
             </a:fld>
             <a:endParaRPr lang="en-AU"/>
           </a:p>
@@ -1930,7 +1931,7 @@
           <a:p>
             <a:fld id="{C404F00C-D47C-4BF4-A179-F92F46FAD4EE}" type="slidenum">
               <a:rPr lang="en-AU" smtClean="0"/>
-              <a:t>‹#›</a:t>
+              <a:t>‹Nr.›</a:t>
             </a:fld>
             <a:endParaRPr lang="en-AU"/>
           </a:p>
@@ -2345,7 +2346,7 @@
           <a:p>
             <a:fld id="{C404F00C-D47C-4BF4-A179-F92F46FAD4EE}" type="slidenum">
               <a:rPr lang="en-AU" smtClean="0"/>
-              <a:t>‹#›</a:t>
+              <a:t>‹Nr.›</a:t>
             </a:fld>
             <a:endParaRPr lang="en-AU"/>
           </a:p>
@@ -2487,7 +2488,7 @@
           <a:p>
             <a:fld id="{C404F00C-D47C-4BF4-A179-F92F46FAD4EE}" type="slidenum">
               <a:rPr lang="en-AU" smtClean="0"/>
-              <a:t>‹#›</a:t>
+              <a:t>‹Nr.›</a:t>
             </a:fld>
             <a:endParaRPr lang="en-AU"/>
           </a:p>
@@ -2600,7 +2601,7 @@
           <a:p>
             <a:fld id="{C404F00C-D47C-4BF4-A179-F92F46FAD4EE}" type="slidenum">
               <a:rPr lang="en-AU" smtClean="0"/>
-              <a:t>‹#›</a:t>
+              <a:t>‹Nr.›</a:t>
             </a:fld>
             <a:endParaRPr lang="en-AU"/>
           </a:p>
@@ -2913,7 +2914,7 @@
           <a:p>
             <a:fld id="{C404F00C-D47C-4BF4-A179-F92F46FAD4EE}" type="slidenum">
               <a:rPr lang="en-AU" smtClean="0"/>
-              <a:t>‹#›</a:t>
+              <a:t>‹Nr.›</a:t>
             </a:fld>
             <a:endParaRPr lang="en-AU"/>
           </a:p>
@@ -3202,7 +3203,7 @@
           <a:p>
             <a:fld id="{C404F00C-D47C-4BF4-A179-F92F46FAD4EE}" type="slidenum">
               <a:rPr lang="en-AU" smtClean="0"/>
-              <a:t>‹#›</a:t>
+              <a:t>‹Nr.›</a:t>
             </a:fld>
             <a:endParaRPr lang="en-AU"/>
           </a:p>
@@ -3481,7 +3482,7 @@
           <a:p>
             <a:fld id="{C404F00C-D47C-4BF4-A179-F92F46FAD4EE}" type="slidenum">
               <a:rPr lang="en-AU" smtClean="0"/>
-              <a:t>‹#›</a:t>
+              <a:t>‹Nr.›</a:t>
             </a:fld>
             <a:endParaRPr lang="en-AU"/>
           </a:p>
@@ -4061,7 +4062,7 @@
                 <a:solidFill>
                   <a:srgbClr val="FFFFFF"/>
                 </a:solidFill>
-                <a:latin typeface="Segoe UI Variable Display Semil" pitchFamily="2" charset="0"/>
+                <a:latin typeface="Carbon Bold" panose="02000806020000020003" pitchFamily="2" charset="0"/>
               </a:rPr>
               <a:t>Zeitungsartikel</a:t>
             </a:r>
@@ -4108,7 +4109,7 @@
                 <a:solidFill>
                   <a:srgbClr val="FFFFFF"/>
                 </a:solidFill>
-                <a:latin typeface="Segoe UI Variable Display Semil" pitchFamily="2" charset="0"/>
+                <a:latin typeface="Carbon Bold" panose="02000806020000020003" pitchFamily="2" charset="0"/>
               </a:rPr>
               <a:t>Hrbek &amp; </a:t>
             </a:r>
@@ -4117,7 +4118,7 @@
                 <a:solidFill>
                   <a:srgbClr val="FFFFFF"/>
                 </a:solidFill>
-                <a:latin typeface="Segoe UI Variable Display Semil" pitchFamily="2" charset="0"/>
+                <a:latin typeface="Carbon Bold" panose="02000806020000020003" pitchFamily="2" charset="0"/>
               </a:rPr>
               <a:t>Thienel</a:t>
             </a:r>
@@ -4125,7 +4126,7 @@
               <a:solidFill>
                 <a:srgbClr val="FFFFFF"/>
               </a:solidFill>
-              <a:latin typeface="Segoe UI Variable Display Semil" pitchFamily="2" charset="0"/>
+              <a:latin typeface="Carbon Bold" panose="02000806020000020003" pitchFamily="2" charset="0"/>
             </a:endParaRPr>
           </a:p>
         </p:txBody>
@@ -4301,8 +4302,8 @@
           </p:nvSpPr>
           <p:spPr>
             <a:xfrm>
-              <a:off x="1132603" y="1720219"/>
-              <a:ext cx="4748461" cy="3139321"/>
+              <a:off x="1223060" y="1542063"/>
+              <a:ext cx="4748461" cy="3323987"/>
             </a:xfrm>
             <a:prstGeom prst="rect">
               <a:avLst/>
@@ -4316,12 +4317,12 @@
             <a:lstStyle/>
             <a:p>
               <a:r>
-                <a:rPr lang="de-DE" sz="3600" b="1" i="0" dirty="0">
+                <a:rPr lang="de-DE" sz="3200" b="1" i="0" dirty="0">
                   <a:solidFill>
                     <a:schemeClr val="bg1"/>
                   </a:solidFill>
                   <a:effectLst/>
-                  <a:latin typeface="Segoe UI Variable Display Semil" pitchFamily="2" charset="0"/>
+                  <a:latin typeface="Carbon Bold" panose="02000806020000020003" pitchFamily="2" charset="0"/>
                 </a:rPr>
                 <a:t>33 chinesische Jets nahe Taiwan gesichtet – Taipeh könnte wieder Verbündeten im Pazifik verlieren</a:t>
               </a:r>
@@ -4945,7 +4946,7 @@
           </p:nvSpPr>
           <p:spPr>
             <a:xfrm>
-              <a:off x="1451430" y="754649"/>
+              <a:off x="1444172" y="425629"/>
               <a:ext cx="2380343" cy="769441"/>
             </a:xfrm>
             <a:prstGeom prst="rect">
@@ -4964,7 +4965,7 @@
                   <a:solidFill>
                     <a:schemeClr val="bg1"/>
                   </a:solidFill>
-                  <a:latin typeface="Segoe UI Variable Display Semil" pitchFamily="2" charset="0"/>
+                  <a:latin typeface="Carbon Bold" panose="02000806020000020003" pitchFamily="2" charset="0"/>
                 </a:rPr>
                 <a:t>Fakten</a:t>
               </a:r>
@@ -4973,7 +4974,7 @@
                   <a:solidFill>
                     <a:schemeClr val="bg1"/>
                   </a:solidFill>
-                  <a:latin typeface="Segoe UI Variable Display Semil" pitchFamily="2" charset="0"/>
+                  <a:latin typeface="Carbon Bold" panose="02000806020000020003" pitchFamily="2" charset="0"/>
                 </a:rPr>
                 <a:t>:</a:t>
               </a:r>
@@ -4981,7 +4982,7 @@
                 <a:solidFill>
                   <a:schemeClr val="bg1"/>
                 </a:solidFill>
-                <a:latin typeface="Segoe UI Variable Display Semil" pitchFamily="2" charset="0"/>
+                <a:latin typeface="Carbon Bold" panose="02000806020000020003" pitchFamily="2" charset="0"/>
               </a:endParaRPr>
             </a:p>
           </p:txBody>
@@ -5000,8 +5001,8 @@
           </p:nvSpPr>
           <p:spPr>
             <a:xfrm>
-              <a:off x="1444172" y="1659437"/>
-              <a:ext cx="3730170" cy="3693319"/>
+              <a:off x="1444172" y="1443967"/>
+              <a:ext cx="3730170" cy="4247317"/>
             </a:xfrm>
             <a:prstGeom prst="rect">
               <a:avLst/>
@@ -5023,7 +5024,7 @@
                   <a:solidFill>
                     <a:schemeClr val="bg1"/>
                   </a:solidFill>
-                  <a:latin typeface="Segoe UI Variable Display Semil" pitchFamily="2" charset="0"/>
+                  <a:latin typeface="Carbon Bold" panose="02000806020000020003" pitchFamily="2" charset="0"/>
                 </a:rPr>
                 <a:t>Der Standard</a:t>
               </a:r>
@@ -5038,7 +5039,7 @@
                   <a:solidFill>
                     <a:schemeClr val="bg1"/>
                   </a:solidFill>
-                  <a:latin typeface="Segoe UI Variable Display Semil" pitchFamily="2" charset="0"/>
+                  <a:latin typeface="Carbon Bold" panose="02000806020000020003" pitchFamily="2" charset="0"/>
                 </a:rPr>
                 <a:t>27. </a:t>
               </a:r>
@@ -5047,7 +5048,7 @@
                   <a:solidFill>
                     <a:schemeClr val="bg1"/>
                   </a:solidFill>
-                  <a:latin typeface="Segoe UI Variable Display Semil" pitchFamily="2" charset="0"/>
+                  <a:latin typeface="Carbon Bold" panose="02000806020000020003" pitchFamily="2" charset="0"/>
                 </a:rPr>
                 <a:t>Jänner</a:t>
               </a:r>
@@ -5056,7 +5057,7 @@
                   <a:solidFill>
                     <a:schemeClr val="bg1"/>
                   </a:solidFill>
-                  <a:latin typeface="Segoe UI Variable Display Semil" pitchFamily="2" charset="0"/>
+                  <a:latin typeface="Carbon Bold" panose="02000806020000020003" pitchFamily="2" charset="0"/>
                 </a:rPr>
                 <a:t> 2024</a:t>
               </a:r>
@@ -5070,7 +5071,7 @@
                 <a:solidFill>
                   <a:schemeClr val="bg1"/>
                 </a:solidFill>
-                <a:latin typeface="Segoe UI Variable Display Semil" pitchFamily="2" charset="0"/>
+                <a:latin typeface="Carbon Bold" panose="02000806020000020003" pitchFamily="2" charset="0"/>
               </a:endParaRPr>
             </a:p>
             <a:p>
@@ -5083,7 +5084,7 @@
                   <a:solidFill>
                     <a:schemeClr val="bg1"/>
                   </a:solidFill>
-                  <a:latin typeface="Segoe UI Variable Display Semil" pitchFamily="2" charset="0"/>
+                  <a:latin typeface="Carbon Bold" panose="02000806020000020003" pitchFamily="2" charset="0"/>
                 </a:rPr>
                 <a:t>Warum</a:t>
               </a:r>
@@ -5092,7 +5093,7 @@
                   <a:solidFill>
                     <a:schemeClr val="bg1"/>
                   </a:solidFill>
-                  <a:latin typeface="Segoe UI Variable Display Semil" pitchFamily="2" charset="0"/>
+                  <a:latin typeface="Carbon Bold" panose="02000806020000020003" pitchFamily="2" charset="0"/>
                 </a:rPr>
                 <a:t> </a:t>
               </a:r>
@@ -5101,7 +5102,7 @@
                   <a:solidFill>
                     <a:schemeClr val="bg1"/>
                   </a:solidFill>
-                  <a:latin typeface="Segoe UI Variable Display Semil" pitchFamily="2" charset="0"/>
+                  <a:latin typeface="Carbon Bold" panose="02000806020000020003" pitchFamily="2" charset="0"/>
                 </a:rPr>
                 <a:t>gewählt</a:t>
               </a:r>
@@ -5110,7 +5111,7 @@
                   <a:solidFill>
                     <a:schemeClr val="bg1"/>
                   </a:solidFill>
-                  <a:latin typeface="Segoe UI Variable Display Semil" pitchFamily="2" charset="0"/>
+                  <a:latin typeface="Carbon Bold" panose="02000806020000020003" pitchFamily="2" charset="0"/>
                 </a:rPr>
                 <a:t>?</a:t>
               </a:r>
@@ -5125,7 +5126,7 @@
                   <a:solidFill>
                     <a:schemeClr val="bg1"/>
                   </a:solidFill>
-                  <a:latin typeface="Segoe UI Variable Display Semil" pitchFamily="2" charset="0"/>
+                  <a:latin typeface="Carbon Bold" panose="02000806020000020003" pitchFamily="2" charset="0"/>
                 </a:rPr>
                 <a:t>Aktuelles</a:t>
               </a:r>
@@ -5134,7 +5135,7 @@
                   <a:solidFill>
                     <a:schemeClr val="bg1"/>
                   </a:solidFill>
-                  <a:latin typeface="Segoe UI Variable Display Semil" pitchFamily="2" charset="0"/>
+                  <a:latin typeface="Carbon Bold" panose="02000806020000020003" pitchFamily="2" charset="0"/>
                 </a:rPr>
                 <a:t> Thema</a:t>
               </a:r>
@@ -5149,7 +5150,7 @@
                   <a:solidFill>
                     <a:schemeClr val="bg1"/>
                   </a:solidFill>
-                  <a:latin typeface="Segoe UI Variable Display Semil" pitchFamily="2" charset="0"/>
+                  <a:latin typeface="Carbon Bold" panose="02000806020000020003" pitchFamily="2" charset="0"/>
                 </a:rPr>
                 <a:t>✈️</a:t>
               </a:r>
@@ -5160,7 +5161,7 @@
                 <a:solidFill>
                   <a:schemeClr val="bg1"/>
                 </a:solidFill>
-                <a:latin typeface="Segoe UI Variable Display Semil" pitchFamily="2" charset="0"/>
+                <a:latin typeface="Carbon Bold" panose="02000806020000020003" pitchFamily="2" charset="0"/>
               </a:endParaRPr>
             </a:p>
             <a:p>
@@ -5170,7 +5171,7 @@
                   <a:solidFill>
                     <a:schemeClr val="bg1"/>
                   </a:solidFill>
-                  <a:latin typeface="Segoe UI Variable Display Semil" pitchFamily="2" charset="0"/>
+                  <a:latin typeface="Carbon Bold" panose="02000806020000020003" pitchFamily="2" charset="0"/>
                 </a:rPr>
                 <a:t>Es ist die größte Machtdemonstration Chinas seit der Präsidentenwahl. Im Streit mit Peking um diplomatische Anerkennung droht Taiwan eine weitere Schlappe nach Wahlen in Tuvalu</a:t>
               </a:r>
@@ -5178,7 +5179,7 @@
                 <a:solidFill>
                   <a:schemeClr val="bg1"/>
                 </a:solidFill>
-                <a:latin typeface="Segoe UI Variable Display Semil" pitchFamily="2" charset="0"/>
+                <a:latin typeface="Carbon Bold" panose="02000806020000020003" pitchFamily="2" charset="0"/>
               </a:endParaRPr>
             </a:p>
           </p:txBody>
@@ -5712,13 +5713,13 @@
           <a:p>
             <a:pPr algn="ctr"/>
             <a:r>
-              <a:rPr lang="de-DE" u="sng" dirty="0">
-                <a:latin typeface="Segoe UI Variable Display Semil" pitchFamily="2" charset="0"/>
+              <a:rPr lang="de-DE" sz="2000" u="sng" dirty="0">
+                <a:latin typeface="Carbon Bold" panose="02000806020000020003" pitchFamily="2" charset="0"/>
               </a:rPr>
               <a:t>Als was betrachtet China Taiwan?</a:t>
             </a:r>
-            <a:endParaRPr lang="de-AT" u="sng" dirty="0">
-              <a:latin typeface="Segoe UI Variable Display Semil" pitchFamily="2" charset="0"/>
+            <a:endParaRPr lang="de-AT" sz="2000" u="sng" dirty="0">
+              <a:latin typeface="Carbon Bold" panose="02000806020000020003" pitchFamily="2" charset="0"/>
             </a:endParaRPr>
           </a:p>
         </p:txBody>
@@ -5775,13 +5776,13 @@
           <a:p>
             <a:pPr algn="ctr"/>
             <a:r>
-              <a:rPr lang="de-DE" dirty="0">
-                <a:latin typeface="Segoe UI Variable Display Semil" pitchFamily="2" charset="0"/>
+              <a:rPr lang="de-DE" sz="2000" dirty="0">
+                <a:latin typeface="Carbon Bold" panose="02000806020000020003" pitchFamily="2" charset="0"/>
               </a:rPr>
               <a:t>"als abtrünnige Provinz, die wieder mit dem Festland vereinigt werden soll - notfalls mit militärischer Gewalt."</a:t>
             </a:r>
-            <a:endParaRPr lang="de-AT" dirty="0">
-              <a:latin typeface="Segoe UI Variable Display Semil" pitchFamily="2" charset="0"/>
+            <a:endParaRPr lang="de-AT" sz="2000" dirty="0">
+              <a:latin typeface="Carbon Bold" panose="02000806020000020003" pitchFamily="2" charset="0"/>
             </a:endParaRPr>
           </a:p>
         </p:txBody>
@@ -5838,13 +5839,13 @@
           <a:p>
             <a:pPr algn="ctr"/>
             <a:r>
-              <a:rPr lang="de-DE" u="sng" dirty="0">
-                <a:latin typeface="Segoe UI Variable Display Semil" pitchFamily="2" charset="0"/>
+              <a:rPr lang="de-DE" sz="2000" u="sng" dirty="0">
+                <a:latin typeface="Carbon Bold" panose="02000806020000020003" pitchFamily="2" charset="0"/>
               </a:rPr>
               <a:t>Wieso ist die Abstimmung in Tuvalu so wichtig?</a:t>
             </a:r>
-            <a:endParaRPr lang="de-AT" u="sng" dirty="0">
-              <a:latin typeface="Segoe UI Variable Display Semil" pitchFamily="2" charset="0"/>
+            <a:endParaRPr lang="de-AT" sz="2000" u="sng" dirty="0">
+              <a:latin typeface="Carbon Bold" panose="02000806020000020003" pitchFamily="2" charset="0"/>
             </a:endParaRPr>
           </a:p>
         </p:txBody>
@@ -5901,13 +5902,13 @@
           <a:p>
             <a:pPr algn="ctr"/>
             <a:r>
-              <a:rPr lang="de-DE" dirty="0">
-                <a:latin typeface="Segoe UI Variable Display Semil" pitchFamily="2" charset="0"/>
+              <a:rPr lang="de-DE" sz="2000" dirty="0">
+                <a:latin typeface="Carbon Bold" panose="02000806020000020003" pitchFamily="2" charset="0"/>
               </a:rPr>
               <a:t>"China und die mit Taiwan verbündeten USA um Einfluss in der pazifischen Region ringen..."</a:t>
             </a:r>
-            <a:endParaRPr lang="de-AT" dirty="0">
-              <a:latin typeface="Segoe UI Variable Display Semil" pitchFamily="2" charset="0"/>
+            <a:endParaRPr lang="de-AT" sz="2000" dirty="0">
+              <a:latin typeface="Carbon Bold" panose="02000806020000020003" pitchFamily="2" charset="0"/>
             </a:endParaRPr>
           </a:p>
         </p:txBody>
@@ -5969,13 +5970,13 @@
           <a:p>
             <a:pPr algn="ctr"/>
             <a:r>
-              <a:rPr lang="de-DE" u="sng" dirty="0">
-                <a:latin typeface="Segoe UI Variable Display Semil" pitchFamily="2" charset="0"/>
+              <a:rPr lang="de-DE" sz="2000" u="sng" dirty="0">
+                <a:latin typeface="Carbon Bold" panose="02000806020000020003" pitchFamily="2" charset="0"/>
               </a:rPr>
               <a:t>Was macht China mit allen Staaten, die mit Taiwan im Vertag stehen?</a:t>
             </a:r>
-            <a:endParaRPr lang="de-AT" u="sng" dirty="0">
-              <a:latin typeface="Segoe UI Variable Display Semil" pitchFamily="2" charset="0"/>
+            <a:endParaRPr lang="de-AT" sz="2000" u="sng" dirty="0">
+              <a:latin typeface="Carbon Bold" panose="02000806020000020003" pitchFamily="2" charset="0"/>
             </a:endParaRPr>
           </a:p>
         </p:txBody>
@@ -6032,13 +6033,13 @@
           <a:p>
             <a:pPr algn="ctr"/>
             <a:r>
-              <a:rPr lang="de-DE" dirty="0">
-                <a:latin typeface="Segoe UI Variable Display Semil" pitchFamily="2" charset="0"/>
+              <a:rPr lang="de-DE" sz="2000" dirty="0">
+                <a:latin typeface="Carbon Bold" panose="02000806020000020003" pitchFamily="2" charset="0"/>
               </a:rPr>
               <a:t>"übt Druck auf alle Staaten aus, die Kontakte zu der Inselrepublik vor dem chinesischen Festland unterhalten."</a:t>
             </a:r>
-            <a:endParaRPr lang="de-AT" dirty="0">
-              <a:latin typeface="Segoe UI Variable Display Semil" pitchFamily="2" charset="0"/>
+            <a:endParaRPr lang="de-AT" sz="2000" dirty="0">
+              <a:latin typeface="Carbon Bold" panose="02000806020000020003" pitchFamily="2" charset="0"/>
             </a:endParaRPr>
           </a:p>
         </p:txBody>
@@ -6592,6 +6593,234 @@
                       </p:childTnLst>
                     </p:cTn>
                   </p:par>
+                  <p:par>
+                    <p:cTn id="37" fill="hold">
+                      <p:stCondLst>
+                        <p:cond delay="indefinite"/>
+                      </p:stCondLst>
+                      <p:childTnLst>
+                        <p:par>
+                          <p:cTn id="38" fill="hold">
+                            <p:stCondLst>
+                              <p:cond delay="0"/>
+                            </p:stCondLst>
+                            <p:childTnLst>
+                              <p:par>
+                                <p:cTn id="39" presetID="10" presetClass="exit" presetSubtype="0" fill="hold" grpId="1" nodeType="clickEffect">
+                                  <p:stCondLst>
+                                    <p:cond delay="0"/>
+                                  </p:stCondLst>
+                                  <p:childTnLst>
+                                    <p:animEffect transition="out" filter="fade">
+                                      <p:cBhvr>
+                                        <p:cTn id="40" dur="500"/>
+                                        <p:tgtEl>
+                                          <p:spTgt spid="6"/>
+                                        </p:tgtEl>
+                                      </p:cBhvr>
+                                    </p:animEffect>
+                                    <p:set>
+                                      <p:cBhvr>
+                                        <p:cTn id="41" dur="1" fill="hold">
+                                          <p:stCondLst>
+                                            <p:cond delay="499"/>
+                                          </p:stCondLst>
+                                        </p:cTn>
+                                        <p:tgtEl>
+                                          <p:spTgt spid="6"/>
+                                        </p:tgtEl>
+                                        <p:attrNameLst>
+                                          <p:attrName>style.visibility</p:attrName>
+                                        </p:attrNameLst>
+                                      </p:cBhvr>
+                                      <p:to>
+                                        <p:strVal val="hidden"/>
+                                      </p:to>
+                                    </p:set>
+                                  </p:childTnLst>
+                                </p:cTn>
+                              </p:par>
+                              <p:par>
+                                <p:cTn id="42" presetID="10" presetClass="exit" presetSubtype="0" fill="hold" grpId="1" nodeType="withEffect">
+                                  <p:stCondLst>
+                                    <p:cond delay="0"/>
+                                  </p:stCondLst>
+                                  <p:childTnLst>
+                                    <p:animEffect transition="out" filter="fade">
+                                      <p:cBhvr>
+                                        <p:cTn id="43" dur="500"/>
+                                        <p:tgtEl>
+                                          <p:spTgt spid="8"/>
+                                        </p:tgtEl>
+                                      </p:cBhvr>
+                                    </p:animEffect>
+                                    <p:set>
+                                      <p:cBhvr>
+                                        <p:cTn id="44" dur="1" fill="hold">
+                                          <p:stCondLst>
+                                            <p:cond delay="499"/>
+                                          </p:stCondLst>
+                                        </p:cTn>
+                                        <p:tgtEl>
+                                          <p:spTgt spid="8"/>
+                                        </p:tgtEl>
+                                        <p:attrNameLst>
+                                          <p:attrName>style.visibility</p:attrName>
+                                        </p:attrNameLst>
+                                      </p:cBhvr>
+                                      <p:to>
+                                        <p:strVal val="hidden"/>
+                                      </p:to>
+                                    </p:set>
+                                  </p:childTnLst>
+                                </p:cTn>
+                              </p:par>
+                              <p:par>
+                                <p:cTn id="45" presetID="10" presetClass="exit" presetSubtype="0" fill="hold" grpId="1" nodeType="withEffect">
+                                  <p:stCondLst>
+                                    <p:cond delay="0"/>
+                                  </p:stCondLst>
+                                  <p:childTnLst>
+                                    <p:animEffect transition="out" filter="fade">
+                                      <p:cBhvr>
+                                        <p:cTn id="46" dur="500"/>
+                                        <p:tgtEl>
+                                          <p:spTgt spid="10"/>
+                                        </p:tgtEl>
+                                      </p:cBhvr>
+                                    </p:animEffect>
+                                    <p:set>
+                                      <p:cBhvr>
+                                        <p:cTn id="47" dur="1" fill="hold">
+                                          <p:stCondLst>
+                                            <p:cond delay="499"/>
+                                          </p:stCondLst>
+                                        </p:cTn>
+                                        <p:tgtEl>
+                                          <p:spTgt spid="10"/>
+                                        </p:tgtEl>
+                                        <p:attrNameLst>
+                                          <p:attrName>style.visibility</p:attrName>
+                                        </p:attrNameLst>
+                                      </p:cBhvr>
+                                      <p:to>
+                                        <p:strVal val="hidden"/>
+                                      </p:to>
+                                    </p:set>
+                                  </p:childTnLst>
+                                </p:cTn>
+                              </p:par>
+                              <p:par>
+                                <p:cTn id="48" presetID="10" presetClass="exit" presetSubtype="0" fill="hold" grpId="1" nodeType="withEffect">
+                                  <p:stCondLst>
+                                    <p:cond delay="0"/>
+                                  </p:stCondLst>
+                                  <p:childTnLst>
+                                    <p:animEffect transition="out" filter="fade">
+                                      <p:cBhvr>
+                                        <p:cTn id="49" dur="500"/>
+                                        <p:tgtEl>
+                                          <p:spTgt spid="7"/>
+                                        </p:tgtEl>
+                                      </p:cBhvr>
+                                    </p:animEffect>
+                                    <p:set>
+                                      <p:cBhvr>
+                                        <p:cTn id="50" dur="1" fill="hold">
+                                          <p:stCondLst>
+                                            <p:cond delay="499"/>
+                                          </p:stCondLst>
+                                        </p:cTn>
+                                        <p:tgtEl>
+                                          <p:spTgt spid="7"/>
+                                        </p:tgtEl>
+                                        <p:attrNameLst>
+                                          <p:attrName>style.visibility</p:attrName>
+                                        </p:attrNameLst>
+                                      </p:cBhvr>
+                                      <p:to>
+                                        <p:strVal val="hidden"/>
+                                      </p:to>
+                                    </p:set>
+                                  </p:childTnLst>
+                                </p:cTn>
+                              </p:par>
+                              <p:par>
+                                <p:cTn id="51" presetID="10" presetClass="exit" presetSubtype="0" fill="hold" grpId="1" nodeType="withEffect">
+                                  <p:stCondLst>
+                                    <p:cond delay="0"/>
+                                  </p:stCondLst>
+                                  <p:childTnLst>
+                                    <p:animEffect transition="out" filter="fade">
+                                      <p:cBhvr>
+                                        <p:cTn id="52" dur="500"/>
+                                        <p:tgtEl>
+                                          <p:spTgt spid="9"/>
+                                        </p:tgtEl>
+                                      </p:cBhvr>
+                                    </p:animEffect>
+                                    <p:set>
+                                      <p:cBhvr>
+                                        <p:cTn id="53" dur="1" fill="hold">
+                                          <p:stCondLst>
+                                            <p:cond delay="499"/>
+                                          </p:stCondLst>
+                                        </p:cTn>
+                                        <p:tgtEl>
+                                          <p:spTgt spid="9"/>
+                                        </p:tgtEl>
+                                        <p:attrNameLst>
+                                          <p:attrName>style.visibility</p:attrName>
+                                        </p:attrNameLst>
+                                      </p:cBhvr>
+                                      <p:to>
+                                        <p:strVal val="hidden"/>
+                                      </p:to>
+                                    </p:set>
+                                  </p:childTnLst>
+                                </p:cTn>
+                              </p:par>
+                              <p:par>
+                                <p:cTn id="54" presetID="10" presetClass="exit" presetSubtype="0" fill="hold" grpId="1" nodeType="withEffect">
+                                  <p:stCondLst>
+                                    <p:cond delay="0"/>
+                                  </p:stCondLst>
+                                  <p:childTnLst>
+                                    <p:animEffect transition="out" filter="fade">
+                                      <p:cBhvr>
+                                        <p:cTn id="55" dur="500"/>
+                                        <p:tgtEl>
+                                          <p:spTgt spid="11"/>
+                                        </p:tgtEl>
+                                      </p:cBhvr>
+                                    </p:animEffect>
+                                    <p:set>
+                                      <p:cBhvr>
+                                        <p:cTn id="56" dur="1" fill="hold">
+                                          <p:stCondLst>
+                                            <p:cond delay="499"/>
+                                          </p:stCondLst>
+                                        </p:cTn>
+                                        <p:tgtEl>
+                                          <p:spTgt spid="11"/>
+                                        </p:tgtEl>
+                                        <p:attrNameLst>
+                                          <p:attrName>style.visibility</p:attrName>
+                                        </p:attrNameLst>
+                                      </p:cBhvr>
+                                      <p:to>
+                                        <p:strVal val="hidden"/>
+                                      </p:to>
+                                    </p:set>
+                                  </p:childTnLst>
+                                </p:cTn>
+                              </p:par>
+                            </p:childTnLst>
+                          </p:cTn>
+                        </p:par>
+                      </p:childTnLst>
+                    </p:cTn>
+                  </p:par>
                 </p:childTnLst>
               </p:cTn>
               <p:prevCondLst>
@@ -6615,17 +6844,1238 @@
     </p:tnLst>
     <p:bldLst>
       <p:bldP spid="6" grpId="0" animBg="1"/>
+      <p:bldP spid="6" grpId="1" animBg="1"/>
       <p:bldP spid="7" grpId="0" animBg="1"/>
+      <p:bldP spid="7" grpId="1" animBg="1"/>
       <p:bldP spid="8" grpId="0" animBg="1"/>
+      <p:bldP spid="8" grpId="1" animBg="1"/>
       <p:bldP spid="9" grpId="0" animBg="1"/>
+      <p:bldP spid="9" grpId="1" animBg="1"/>
       <p:bldP spid="10" grpId="0" animBg="1"/>
+      <p:bldP spid="10" grpId="1" animBg="1"/>
       <p:bldP spid="11" grpId="0" animBg="1"/>
+      <p:bldP spid="11" grpId="1" animBg="1"/>
     </p:bldLst>
   </p:timing>
 </p:sld>
 </file>
 
 <file path=ppt/slides/slide5.xml><?xml version="1.0" encoding="utf-8"?>
+<p:sld xmlns:a="http://schemas.openxmlformats.org/drawingml/2006/main" xmlns:r="http://schemas.openxmlformats.org/officeDocument/2006/relationships" xmlns:p="http://schemas.openxmlformats.org/presentationml/2006/main">
+  <p:cSld>
+    <p:spTree>
+      <p:nvGrpSpPr>
+        <p:cNvPr id="1" name=""/>
+        <p:cNvGrpSpPr/>
+        <p:nvPr/>
+      </p:nvGrpSpPr>
+      <p:grpSpPr>
+        <a:xfrm>
+          <a:off x="0" y="0"/>
+          <a:ext cx="0" cy="0"/>
+          <a:chOff x="0" y="0"/>
+          <a:chExt cx="0" cy="0"/>
+        </a:xfrm>
+      </p:grpSpPr>
+      <p:pic>
+        <p:nvPicPr>
+          <p:cNvPr id="2" name="Picture 2" descr="China's growing military confidence puts Taiwan at risk">
+            <a:extLst>
+              <a:ext uri="{FF2B5EF4-FFF2-40B4-BE49-F238E27FC236}">
+                <a16:creationId xmlns:a16="http://schemas.microsoft.com/office/drawing/2014/main" id="{B8BD10A8-BB72-DDBD-BEFC-997B9F99B0F5}"/>
+              </a:ext>
+            </a:extLst>
+          </p:cNvPr>
+          <p:cNvPicPr>
+            <a:picLocks noChangeAspect="1" noChangeArrowheads="1"/>
+          </p:cNvPicPr>
+          <p:nvPr/>
+        </p:nvPicPr>
+        <p:blipFill rotWithShape="1">
+          <a:blip r:embed="rId2">
+            <a:alphaModFix/>
+            <a:extLst>
+              <a:ext uri="{BEBA8EAE-BF5A-486C-A8C5-ECC9F3942E4B}">
+                <a14:imgProps xmlns:a14="http://schemas.microsoft.com/office/drawing/2010/main">
+                  <a14:imgLayer r:embed="rId3">
+                    <a14:imgEffect>
+                      <a14:brightnessContrast bright="-40000" contrast="-40000"/>
+                    </a14:imgEffect>
+                  </a14:imgLayer>
+                </a14:imgProps>
+              </a:ext>
+              <a:ext uri="{28A0092B-C50C-407E-A947-70E740481C1C}">
+                <a14:useLocalDpi xmlns:a14="http://schemas.microsoft.com/office/drawing/2010/main" val="0"/>
+              </a:ext>
+            </a:extLst>
+          </a:blip>
+          <a:srcRect t="10450" b="6601"/>
+          <a:stretch/>
+        </p:blipFill>
+        <p:spPr bwMode="auto">
+          <a:xfrm>
+            <a:off x="0" y="1"/>
+            <a:ext cx="12193200" cy="6858000"/>
+          </a:xfrm>
+          <a:prstGeom prst="rect">
+            <a:avLst/>
+          </a:prstGeom>
+          <a:noFill/>
+          <a:extLst>
+            <a:ext uri="{909E8E84-426E-40DD-AFC4-6F175D3DCCD1}">
+              <a14:hiddenFill xmlns:a14="http://schemas.microsoft.com/office/drawing/2010/main">
+                <a:solidFill>
+                  <a:srgbClr val="FFFFFF"/>
+                </a:solidFill>
+              </a14:hiddenFill>
+            </a:ext>
+          </a:extLst>
+        </p:spPr>
+      </p:pic>
+      <p:sp>
+        <p:nvSpPr>
+          <p:cNvPr id="6" name="Rechteck 5">
+            <a:extLst>
+              <a:ext uri="{FF2B5EF4-FFF2-40B4-BE49-F238E27FC236}">
+                <a16:creationId xmlns:a16="http://schemas.microsoft.com/office/drawing/2014/main" id="{77809655-1BEB-439D-CB85-31D9ABE5B5F1}"/>
+              </a:ext>
+            </a:extLst>
+          </p:cNvPr>
+          <p:cNvSpPr/>
+          <p:nvPr/>
+        </p:nvSpPr>
+        <p:spPr>
+          <a:xfrm>
+            <a:off x="2774950" y="0"/>
+            <a:ext cx="6642100" cy="1181100"/>
+          </a:xfrm>
+          <a:prstGeom prst="rect">
+            <a:avLst/>
+          </a:prstGeom>
+          <a:solidFill>
+            <a:schemeClr val="tx1">
+              <a:lumMod val="75000"/>
+              <a:lumOff val="25000"/>
+            </a:schemeClr>
+          </a:solidFill>
+          <a:ln>
+            <a:noFill/>
+          </a:ln>
+        </p:spPr>
+        <p:style>
+          <a:lnRef idx="2">
+            <a:schemeClr val="accent1">
+              <a:shade val="15000"/>
+            </a:schemeClr>
+          </a:lnRef>
+          <a:fillRef idx="1">
+            <a:schemeClr val="accent1"/>
+          </a:fillRef>
+          <a:effectRef idx="0">
+            <a:schemeClr val="accent1"/>
+          </a:effectRef>
+          <a:fontRef idx="minor">
+            <a:schemeClr val="lt1"/>
+          </a:fontRef>
+        </p:style>
+        <p:txBody>
+          <a:bodyPr rtlCol="0" anchor="ctr"/>
+          <a:lstStyle/>
+          <a:p>
+            <a:pPr algn="ctr"/>
+            <a:r>
+              <a:rPr lang="de-AT" sz="2800" dirty="0">
+                <a:latin typeface="Carbon Bold"/>
+              </a:rPr>
+              <a:t>Wie / Warum hat uns der Zeitungsartikel gefallen?</a:t>
+            </a:r>
+          </a:p>
+        </p:txBody>
+      </p:sp>
+      <p:pic>
+        <p:nvPicPr>
+          <p:cNvPr id="8" name="Grafik 7" descr="Geschäftsmann hält ein Notebook">
+            <a:extLst>
+              <a:ext uri="{FF2B5EF4-FFF2-40B4-BE49-F238E27FC236}">
+                <a16:creationId xmlns:a16="http://schemas.microsoft.com/office/drawing/2014/main" id="{850DDB4F-BD8B-DCD1-1B1D-1DE38812982E}"/>
+              </a:ext>
+            </a:extLst>
+          </p:cNvPr>
+          <p:cNvPicPr>
+            <a:picLocks noChangeAspect="1"/>
+          </p:cNvPicPr>
+          <p:nvPr/>
+        </p:nvPicPr>
+        <p:blipFill>
+          <a:blip r:embed="rId4">
+            <a:extLst>
+              <a:ext uri="{28A0092B-C50C-407E-A947-70E740481C1C}">
+                <a14:useLocalDpi xmlns:a14="http://schemas.microsoft.com/office/drawing/2010/main" val="0"/>
+              </a:ext>
+            </a:extLst>
+          </a:blip>
+          <a:stretch>
+            <a:fillRect/>
+          </a:stretch>
+        </p:blipFill>
+        <p:spPr>
+          <a:xfrm>
+            <a:off x="9226550" y="5257800"/>
+            <a:ext cx="2758139" cy="6858000"/>
+          </a:xfrm>
+          <a:prstGeom prst="rect">
+            <a:avLst/>
+          </a:prstGeom>
+        </p:spPr>
+      </p:pic>
+      <p:sp>
+        <p:nvSpPr>
+          <p:cNvPr id="9" name="Ellipse 8">
+            <a:extLst>
+              <a:ext uri="{FF2B5EF4-FFF2-40B4-BE49-F238E27FC236}">
+                <a16:creationId xmlns:a16="http://schemas.microsoft.com/office/drawing/2014/main" id="{16935742-55B7-5934-D27B-7E24147B6D67}"/>
+              </a:ext>
+            </a:extLst>
+          </p:cNvPr>
+          <p:cNvSpPr/>
+          <p:nvPr/>
+        </p:nvSpPr>
+        <p:spPr>
+          <a:xfrm>
+            <a:off x="1080000" y="2324100"/>
+            <a:ext cx="2260600" cy="2209800"/>
+          </a:xfrm>
+          <a:prstGeom prst="ellipse">
+            <a:avLst/>
+          </a:prstGeom>
+          <a:solidFill>
+            <a:schemeClr val="tx1">
+              <a:lumMod val="75000"/>
+              <a:lumOff val="25000"/>
+            </a:schemeClr>
+          </a:solidFill>
+          <a:ln>
+            <a:noFill/>
+          </a:ln>
+        </p:spPr>
+        <p:style>
+          <a:lnRef idx="2">
+            <a:schemeClr val="accent1">
+              <a:shade val="15000"/>
+            </a:schemeClr>
+          </a:lnRef>
+          <a:fillRef idx="1">
+            <a:schemeClr val="accent1"/>
+          </a:fillRef>
+          <a:effectRef idx="0">
+            <a:schemeClr val="accent1"/>
+          </a:effectRef>
+          <a:fontRef idx="minor">
+            <a:schemeClr val="lt1"/>
+          </a:fontRef>
+        </p:style>
+        <p:txBody>
+          <a:bodyPr rtlCol="0" anchor="ctr"/>
+          <a:lstStyle/>
+          <a:p>
+            <a:pPr algn="ctr"/>
+            <a:r>
+              <a:rPr lang="de-AT" sz="2400" dirty="0">
+                <a:latin typeface="Carbon Bold" panose="02000806020000020003" pitchFamily="2" charset="0"/>
+              </a:rPr>
+              <a:t>Kurz</a:t>
+            </a:r>
+          </a:p>
+        </p:txBody>
+      </p:sp>
+      <p:sp>
+        <p:nvSpPr>
+          <p:cNvPr id="10" name="Ellipse 9">
+            <a:extLst>
+              <a:ext uri="{FF2B5EF4-FFF2-40B4-BE49-F238E27FC236}">
+                <a16:creationId xmlns:a16="http://schemas.microsoft.com/office/drawing/2014/main" id="{60FAE3A2-9179-4C50-9463-29A9A9A3F381}"/>
+              </a:ext>
+            </a:extLst>
+          </p:cNvPr>
+          <p:cNvSpPr/>
+          <p:nvPr/>
+        </p:nvSpPr>
+        <p:spPr>
+          <a:xfrm>
+            <a:off x="4965700" y="2324100"/>
+            <a:ext cx="2260600" cy="2209800"/>
+          </a:xfrm>
+          <a:prstGeom prst="ellipse">
+            <a:avLst/>
+          </a:prstGeom>
+          <a:solidFill>
+            <a:schemeClr val="tx1">
+              <a:lumMod val="75000"/>
+              <a:lumOff val="25000"/>
+            </a:schemeClr>
+          </a:solidFill>
+          <a:ln>
+            <a:noFill/>
+          </a:ln>
+        </p:spPr>
+        <p:style>
+          <a:lnRef idx="2">
+            <a:schemeClr val="accent1">
+              <a:shade val="15000"/>
+            </a:schemeClr>
+          </a:lnRef>
+          <a:fillRef idx="1">
+            <a:schemeClr val="accent1"/>
+          </a:fillRef>
+          <a:effectRef idx="0">
+            <a:schemeClr val="accent1"/>
+          </a:effectRef>
+          <a:fontRef idx="minor">
+            <a:schemeClr val="lt1"/>
+          </a:fontRef>
+        </p:style>
+        <p:txBody>
+          <a:bodyPr rtlCol="0" anchor="ctr"/>
+          <a:lstStyle/>
+          <a:p>
+            <a:pPr algn="ctr"/>
+            <a:r>
+              <a:rPr lang="de-AT" sz="2400" dirty="0">
+                <a:latin typeface="Carbon Bold" panose="02000806020000020003" pitchFamily="2" charset="0"/>
+              </a:rPr>
+              <a:t>Geht in die Tiefe</a:t>
+            </a:r>
+          </a:p>
+        </p:txBody>
+      </p:sp>
+      <p:sp>
+        <p:nvSpPr>
+          <p:cNvPr id="11" name="Ellipse 10">
+            <a:extLst>
+              <a:ext uri="{FF2B5EF4-FFF2-40B4-BE49-F238E27FC236}">
+                <a16:creationId xmlns:a16="http://schemas.microsoft.com/office/drawing/2014/main" id="{721A282A-63A6-C893-142B-AFEA9F24E9F8}"/>
+              </a:ext>
+            </a:extLst>
+          </p:cNvPr>
+          <p:cNvSpPr/>
+          <p:nvPr/>
+        </p:nvSpPr>
+        <p:spPr>
+          <a:xfrm>
+            <a:off x="8564400" y="2324100"/>
+            <a:ext cx="2260600" cy="2209800"/>
+          </a:xfrm>
+          <a:prstGeom prst="ellipse">
+            <a:avLst/>
+          </a:prstGeom>
+          <a:solidFill>
+            <a:schemeClr val="tx1">
+              <a:lumMod val="75000"/>
+              <a:lumOff val="25000"/>
+            </a:schemeClr>
+          </a:solidFill>
+          <a:ln>
+            <a:noFill/>
+          </a:ln>
+        </p:spPr>
+        <p:style>
+          <a:lnRef idx="2">
+            <a:schemeClr val="accent1">
+              <a:shade val="15000"/>
+            </a:schemeClr>
+          </a:lnRef>
+          <a:fillRef idx="1">
+            <a:schemeClr val="accent1"/>
+          </a:fillRef>
+          <a:effectRef idx="0">
+            <a:schemeClr val="accent1"/>
+          </a:effectRef>
+          <a:fontRef idx="minor">
+            <a:schemeClr val="lt1"/>
+          </a:fontRef>
+        </p:style>
+        <p:txBody>
+          <a:bodyPr rtlCol="0" anchor="ctr"/>
+          <a:lstStyle/>
+          <a:p>
+            <a:pPr algn="ctr"/>
+            <a:r>
+              <a:rPr lang="de-AT" sz="2400" dirty="0">
+                <a:latin typeface="Carbon Bold" panose="02000806020000020003" pitchFamily="2" charset="0"/>
+              </a:rPr>
+              <a:t>Tages-aktuell</a:t>
+            </a:r>
+          </a:p>
+        </p:txBody>
+      </p:sp>
+    </p:spTree>
+    <p:extLst>
+      <p:ext uri="{BB962C8B-B14F-4D97-AF65-F5344CB8AC3E}">
+        <p14:creationId xmlns:p14="http://schemas.microsoft.com/office/powerpoint/2010/main" val="3860019171"/>
+      </p:ext>
+    </p:extLst>
+  </p:cSld>
+  <p:clrMapOvr>
+    <a:masterClrMapping/>
+  </p:clrMapOvr>
+  <p:timing>
+    <p:tnLst>
+      <p:par>
+        <p:cTn id="1" dur="indefinite" restart="never" nodeType="tmRoot">
+          <p:childTnLst>
+            <p:seq concurrent="1" nextAc="seek">
+              <p:cTn id="2" dur="indefinite" nodeType="mainSeq">
+                <p:childTnLst>
+                  <p:par>
+                    <p:cTn id="3" fill="hold">
+                      <p:stCondLst>
+                        <p:cond delay="indefinite"/>
+                        <p:cond evt="onBegin" delay="0">
+                          <p:tn val="2"/>
+                        </p:cond>
+                      </p:stCondLst>
+                      <p:childTnLst>
+                        <p:par>
+                          <p:cTn id="4" fill="hold">
+                            <p:stCondLst>
+                              <p:cond delay="0"/>
+                            </p:stCondLst>
+                            <p:childTnLst>
+                              <p:par>
+                                <p:cTn id="5" presetID="2" presetClass="entr" presetSubtype="1" decel="100000" fill="hold" grpId="0" nodeType="afterEffect">
+                                  <p:stCondLst>
+                                    <p:cond delay="0"/>
+                                  </p:stCondLst>
+                                  <p:childTnLst>
+                                    <p:set>
+                                      <p:cBhvr>
+                                        <p:cTn id="6" dur="1" fill="hold">
+                                          <p:stCondLst>
+                                            <p:cond delay="0"/>
+                                          </p:stCondLst>
+                                        </p:cTn>
+                                        <p:tgtEl>
+                                          <p:spTgt spid="6"/>
+                                        </p:tgtEl>
+                                        <p:attrNameLst>
+                                          <p:attrName>style.visibility</p:attrName>
+                                        </p:attrNameLst>
+                                      </p:cBhvr>
+                                      <p:to>
+                                        <p:strVal val="visible"/>
+                                      </p:to>
+                                    </p:set>
+                                    <p:anim calcmode="lin" valueType="num">
+                                      <p:cBhvr additive="base">
+                                        <p:cTn id="7" dur="1000" fill="hold"/>
+                                        <p:tgtEl>
+                                          <p:spTgt spid="6"/>
+                                        </p:tgtEl>
+                                        <p:attrNameLst>
+                                          <p:attrName>ppt_x</p:attrName>
+                                        </p:attrNameLst>
+                                      </p:cBhvr>
+                                      <p:tavLst>
+                                        <p:tav tm="0">
+                                          <p:val>
+                                            <p:strVal val="#ppt_x"/>
+                                          </p:val>
+                                        </p:tav>
+                                        <p:tav tm="100000">
+                                          <p:val>
+                                            <p:strVal val="#ppt_x"/>
+                                          </p:val>
+                                        </p:tav>
+                                      </p:tavLst>
+                                    </p:anim>
+                                    <p:anim calcmode="lin" valueType="num">
+                                      <p:cBhvr additive="base">
+                                        <p:cTn id="8" dur="1000" fill="hold"/>
+                                        <p:tgtEl>
+                                          <p:spTgt spid="6"/>
+                                        </p:tgtEl>
+                                        <p:attrNameLst>
+                                          <p:attrName>ppt_y</p:attrName>
+                                        </p:attrNameLst>
+                                      </p:cBhvr>
+                                      <p:tavLst>
+                                        <p:tav tm="0">
+                                          <p:val>
+                                            <p:strVal val="0-#ppt_h/2"/>
+                                          </p:val>
+                                        </p:tav>
+                                        <p:tav tm="100000">
+                                          <p:val>
+                                            <p:strVal val="#ppt_y"/>
+                                          </p:val>
+                                        </p:tav>
+                                      </p:tavLst>
+                                    </p:anim>
+                                  </p:childTnLst>
+                                </p:cTn>
+                              </p:par>
+                            </p:childTnLst>
+                          </p:cTn>
+                        </p:par>
+                      </p:childTnLst>
+                    </p:cTn>
+                  </p:par>
+                  <p:par>
+                    <p:cTn id="9" fill="hold">
+                      <p:stCondLst>
+                        <p:cond delay="indefinite"/>
+                      </p:stCondLst>
+                      <p:childTnLst>
+                        <p:par>
+                          <p:cTn id="10" fill="hold">
+                            <p:stCondLst>
+                              <p:cond delay="0"/>
+                            </p:stCondLst>
+                            <p:childTnLst>
+                              <p:par>
+                                <p:cTn id="11" presetID="2" presetClass="entr" presetSubtype="8" decel="100000" fill="hold" grpId="0" nodeType="clickEffect">
+                                  <p:stCondLst>
+                                    <p:cond delay="0"/>
+                                  </p:stCondLst>
+                                  <p:childTnLst>
+                                    <p:set>
+                                      <p:cBhvr>
+                                        <p:cTn id="12" dur="1" fill="hold">
+                                          <p:stCondLst>
+                                            <p:cond delay="0"/>
+                                          </p:stCondLst>
+                                        </p:cTn>
+                                        <p:tgtEl>
+                                          <p:spTgt spid="9"/>
+                                        </p:tgtEl>
+                                        <p:attrNameLst>
+                                          <p:attrName>style.visibility</p:attrName>
+                                        </p:attrNameLst>
+                                      </p:cBhvr>
+                                      <p:to>
+                                        <p:strVal val="visible"/>
+                                      </p:to>
+                                    </p:set>
+                                    <p:anim calcmode="lin" valueType="num">
+                                      <p:cBhvr additive="base">
+                                        <p:cTn id="13" dur="1000" fill="hold"/>
+                                        <p:tgtEl>
+                                          <p:spTgt spid="9"/>
+                                        </p:tgtEl>
+                                        <p:attrNameLst>
+                                          <p:attrName>ppt_x</p:attrName>
+                                        </p:attrNameLst>
+                                      </p:cBhvr>
+                                      <p:tavLst>
+                                        <p:tav tm="0">
+                                          <p:val>
+                                            <p:strVal val="0-#ppt_w/2"/>
+                                          </p:val>
+                                        </p:tav>
+                                        <p:tav tm="100000">
+                                          <p:val>
+                                            <p:strVal val="#ppt_x"/>
+                                          </p:val>
+                                        </p:tav>
+                                      </p:tavLst>
+                                    </p:anim>
+                                    <p:anim calcmode="lin" valueType="num">
+                                      <p:cBhvr additive="base">
+                                        <p:cTn id="14" dur="1000" fill="hold"/>
+                                        <p:tgtEl>
+                                          <p:spTgt spid="9"/>
+                                        </p:tgtEl>
+                                        <p:attrNameLst>
+                                          <p:attrName>ppt_y</p:attrName>
+                                        </p:attrNameLst>
+                                      </p:cBhvr>
+                                      <p:tavLst>
+                                        <p:tav tm="0">
+                                          <p:val>
+                                            <p:strVal val="#ppt_y"/>
+                                          </p:val>
+                                        </p:tav>
+                                        <p:tav tm="100000">
+                                          <p:val>
+                                            <p:strVal val="#ppt_y"/>
+                                          </p:val>
+                                        </p:tav>
+                                      </p:tavLst>
+                                    </p:anim>
+                                  </p:childTnLst>
+                                </p:cTn>
+                              </p:par>
+                              <p:par>
+                                <p:cTn id="15" presetID="10" presetClass="entr" presetSubtype="0" fill="hold" grpId="1" nodeType="withEffect">
+                                  <p:stCondLst>
+                                    <p:cond delay="0"/>
+                                  </p:stCondLst>
+                                  <p:childTnLst>
+                                    <p:set>
+                                      <p:cBhvr>
+                                        <p:cTn id="16" dur="1" fill="hold">
+                                          <p:stCondLst>
+                                            <p:cond delay="0"/>
+                                          </p:stCondLst>
+                                        </p:cTn>
+                                        <p:tgtEl>
+                                          <p:spTgt spid="9"/>
+                                        </p:tgtEl>
+                                        <p:attrNameLst>
+                                          <p:attrName>style.visibility</p:attrName>
+                                        </p:attrNameLst>
+                                      </p:cBhvr>
+                                      <p:to>
+                                        <p:strVal val="visible"/>
+                                      </p:to>
+                                    </p:set>
+                                    <p:animEffect transition="in" filter="fade">
+                                      <p:cBhvr>
+                                        <p:cTn id="17" dur="1000"/>
+                                        <p:tgtEl>
+                                          <p:spTgt spid="9"/>
+                                        </p:tgtEl>
+                                      </p:cBhvr>
+                                    </p:animEffect>
+                                  </p:childTnLst>
+                                </p:cTn>
+                              </p:par>
+                            </p:childTnLst>
+                          </p:cTn>
+                        </p:par>
+                        <p:par>
+                          <p:cTn id="18" fill="hold">
+                            <p:stCondLst>
+                              <p:cond delay="1000"/>
+                            </p:stCondLst>
+                            <p:childTnLst>
+                              <p:par>
+                                <p:cTn id="19" presetID="2" presetClass="entr" presetSubtype="4" decel="100000" fill="hold" grpId="0" nodeType="afterEffect">
+                                  <p:stCondLst>
+                                    <p:cond delay="0"/>
+                                  </p:stCondLst>
+                                  <p:childTnLst>
+                                    <p:set>
+                                      <p:cBhvr>
+                                        <p:cTn id="20" dur="1" fill="hold">
+                                          <p:stCondLst>
+                                            <p:cond delay="0"/>
+                                          </p:stCondLst>
+                                        </p:cTn>
+                                        <p:tgtEl>
+                                          <p:spTgt spid="10"/>
+                                        </p:tgtEl>
+                                        <p:attrNameLst>
+                                          <p:attrName>style.visibility</p:attrName>
+                                        </p:attrNameLst>
+                                      </p:cBhvr>
+                                      <p:to>
+                                        <p:strVal val="visible"/>
+                                      </p:to>
+                                    </p:set>
+                                    <p:anim calcmode="lin" valueType="num">
+                                      <p:cBhvr additive="base">
+                                        <p:cTn id="21" dur="1000" fill="hold"/>
+                                        <p:tgtEl>
+                                          <p:spTgt spid="10"/>
+                                        </p:tgtEl>
+                                        <p:attrNameLst>
+                                          <p:attrName>ppt_x</p:attrName>
+                                        </p:attrNameLst>
+                                      </p:cBhvr>
+                                      <p:tavLst>
+                                        <p:tav tm="0">
+                                          <p:val>
+                                            <p:strVal val="#ppt_x"/>
+                                          </p:val>
+                                        </p:tav>
+                                        <p:tav tm="100000">
+                                          <p:val>
+                                            <p:strVal val="#ppt_x"/>
+                                          </p:val>
+                                        </p:tav>
+                                      </p:tavLst>
+                                    </p:anim>
+                                    <p:anim calcmode="lin" valueType="num">
+                                      <p:cBhvr additive="base">
+                                        <p:cTn id="22" dur="1000" fill="hold"/>
+                                        <p:tgtEl>
+                                          <p:spTgt spid="10"/>
+                                        </p:tgtEl>
+                                        <p:attrNameLst>
+                                          <p:attrName>ppt_y</p:attrName>
+                                        </p:attrNameLst>
+                                      </p:cBhvr>
+                                      <p:tavLst>
+                                        <p:tav tm="0">
+                                          <p:val>
+                                            <p:strVal val="1+#ppt_h/2"/>
+                                          </p:val>
+                                        </p:tav>
+                                        <p:tav tm="100000">
+                                          <p:val>
+                                            <p:strVal val="#ppt_y"/>
+                                          </p:val>
+                                        </p:tav>
+                                      </p:tavLst>
+                                    </p:anim>
+                                  </p:childTnLst>
+                                </p:cTn>
+                              </p:par>
+                              <p:par>
+                                <p:cTn id="23" presetID="10" presetClass="entr" presetSubtype="0" fill="hold" grpId="1" nodeType="withEffect">
+                                  <p:stCondLst>
+                                    <p:cond delay="0"/>
+                                  </p:stCondLst>
+                                  <p:childTnLst>
+                                    <p:set>
+                                      <p:cBhvr>
+                                        <p:cTn id="24" dur="1" fill="hold">
+                                          <p:stCondLst>
+                                            <p:cond delay="0"/>
+                                          </p:stCondLst>
+                                        </p:cTn>
+                                        <p:tgtEl>
+                                          <p:spTgt spid="10"/>
+                                        </p:tgtEl>
+                                        <p:attrNameLst>
+                                          <p:attrName>style.visibility</p:attrName>
+                                        </p:attrNameLst>
+                                      </p:cBhvr>
+                                      <p:to>
+                                        <p:strVal val="visible"/>
+                                      </p:to>
+                                    </p:set>
+                                    <p:animEffect transition="in" filter="fade">
+                                      <p:cBhvr>
+                                        <p:cTn id="25" dur="1000"/>
+                                        <p:tgtEl>
+                                          <p:spTgt spid="10"/>
+                                        </p:tgtEl>
+                                      </p:cBhvr>
+                                    </p:animEffect>
+                                  </p:childTnLst>
+                                </p:cTn>
+                              </p:par>
+                            </p:childTnLst>
+                          </p:cTn>
+                        </p:par>
+                        <p:par>
+                          <p:cTn id="26" fill="hold">
+                            <p:stCondLst>
+                              <p:cond delay="2000"/>
+                            </p:stCondLst>
+                            <p:childTnLst>
+                              <p:par>
+                                <p:cTn id="27" presetID="2" presetClass="entr" presetSubtype="4" fill="hold" nodeType="afterEffect">
+                                  <p:stCondLst>
+                                    <p:cond delay="0"/>
+                                  </p:stCondLst>
+                                  <p:childTnLst>
+                                    <p:set>
+                                      <p:cBhvr>
+                                        <p:cTn id="28" dur="1" fill="hold">
+                                          <p:stCondLst>
+                                            <p:cond delay="0"/>
+                                          </p:stCondLst>
+                                        </p:cTn>
+                                        <p:tgtEl>
+                                          <p:spTgt spid="8"/>
+                                        </p:tgtEl>
+                                        <p:attrNameLst>
+                                          <p:attrName>style.visibility</p:attrName>
+                                        </p:attrNameLst>
+                                      </p:cBhvr>
+                                      <p:to>
+                                        <p:strVal val="visible"/>
+                                      </p:to>
+                                    </p:set>
+                                    <p:anim calcmode="lin" valueType="num">
+                                      <p:cBhvr additive="base">
+                                        <p:cTn id="29" dur="250" fill="hold"/>
+                                        <p:tgtEl>
+                                          <p:spTgt spid="8"/>
+                                        </p:tgtEl>
+                                        <p:attrNameLst>
+                                          <p:attrName>ppt_x</p:attrName>
+                                        </p:attrNameLst>
+                                      </p:cBhvr>
+                                      <p:tavLst>
+                                        <p:tav tm="0">
+                                          <p:val>
+                                            <p:strVal val="#ppt_x"/>
+                                          </p:val>
+                                        </p:tav>
+                                        <p:tav tm="100000">
+                                          <p:val>
+                                            <p:strVal val="#ppt_x"/>
+                                          </p:val>
+                                        </p:tav>
+                                      </p:tavLst>
+                                    </p:anim>
+                                    <p:anim calcmode="lin" valueType="num">
+                                      <p:cBhvr additive="base">
+                                        <p:cTn id="30" dur="250" fill="hold"/>
+                                        <p:tgtEl>
+                                          <p:spTgt spid="8"/>
+                                        </p:tgtEl>
+                                        <p:attrNameLst>
+                                          <p:attrName>ppt_y</p:attrName>
+                                        </p:attrNameLst>
+                                      </p:cBhvr>
+                                      <p:tavLst>
+                                        <p:tav tm="0">
+                                          <p:val>
+                                            <p:strVal val="1+#ppt_h/2"/>
+                                          </p:val>
+                                        </p:tav>
+                                        <p:tav tm="100000">
+                                          <p:val>
+                                            <p:strVal val="#ppt_y"/>
+                                          </p:val>
+                                        </p:tav>
+                                      </p:tavLst>
+                                    </p:anim>
+                                  </p:childTnLst>
+                                </p:cTn>
+                              </p:par>
+                            </p:childTnLst>
+                          </p:cTn>
+                        </p:par>
+                        <p:par>
+                          <p:cTn id="31" fill="hold">
+                            <p:stCondLst>
+                              <p:cond delay="2250"/>
+                            </p:stCondLst>
+                            <p:childTnLst>
+                              <p:par>
+                                <p:cTn id="32" presetID="2" presetClass="exit" presetSubtype="4" fill="hold" nodeType="afterEffect">
+                                  <p:stCondLst>
+                                    <p:cond delay="0"/>
+                                  </p:stCondLst>
+                                  <p:childTnLst>
+                                    <p:anim calcmode="lin" valueType="num">
+                                      <p:cBhvr additive="base">
+                                        <p:cTn id="33" dur="250"/>
+                                        <p:tgtEl>
+                                          <p:spTgt spid="8"/>
+                                        </p:tgtEl>
+                                        <p:attrNameLst>
+                                          <p:attrName>ppt_x</p:attrName>
+                                        </p:attrNameLst>
+                                      </p:cBhvr>
+                                      <p:tavLst>
+                                        <p:tav tm="0">
+                                          <p:val>
+                                            <p:strVal val="ppt_x"/>
+                                          </p:val>
+                                        </p:tav>
+                                        <p:tav tm="100000">
+                                          <p:val>
+                                            <p:strVal val="ppt_x"/>
+                                          </p:val>
+                                        </p:tav>
+                                      </p:tavLst>
+                                    </p:anim>
+                                    <p:anim calcmode="lin" valueType="num">
+                                      <p:cBhvr additive="base">
+                                        <p:cTn id="34" dur="250"/>
+                                        <p:tgtEl>
+                                          <p:spTgt spid="8"/>
+                                        </p:tgtEl>
+                                        <p:attrNameLst>
+                                          <p:attrName>ppt_y</p:attrName>
+                                        </p:attrNameLst>
+                                      </p:cBhvr>
+                                      <p:tavLst>
+                                        <p:tav tm="0">
+                                          <p:val>
+                                            <p:strVal val="ppt_y"/>
+                                          </p:val>
+                                        </p:tav>
+                                        <p:tav tm="100000">
+                                          <p:val>
+                                            <p:strVal val="1+ppt_h/2"/>
+                                          </p:val>
+                                        </p:tav>
+                                      </p:tavLst>
+                                    </p:anim>
+                                    <p:set>
+                                      <p:cBhvr>
+                                        <p:cTn id="35" dur="1" fill="hold">
+                                          <p:stCondLst>
+                                            <p:cond delay="249"/>
+                                          </p:stCondLst>
+                                        </p:cTn>
+                                        <p:tgtEl>
+                                          <p:spTgt spid="8"/>
+                                        </p:tgtEl>
+                                        <p:attrNameLst>
+                                          <p:attrName>style.visibility</p:attrName>
+                                        </p:attrNameLst>
+                                      </p:cBhvr>
+                                      <p:to>
+                                        <p:strVal val="hidden"/>
+                                      </p:to>
+                                    </p:set>
+                                  </p:childTnLst>
+                                </p:cTn>
+                              </p:par>
+                            </p:childTnLst>
+                          </p:cTn>
+                        </p:par>
+                        <p:par>
+                          <p:cTn id="36" fill="hold">
+                            <p:stCondLst>
+                              <p:cond delay="2500"/>
+                            </p:stCondLst>
+                            <p:childTnLst>
+                              <p:par>
+                                <p:cTn id="37" presetID="2" presetClass="entr" presetSubtype="2" decel="100000" fill="hold" grpId="0" nodeType="afterEffect">
+                                  <p:stCondLst>
+                                    <p:cond delay="0"/>
+                                  </p:stCondLst>
+                                  <p:childTnLst>
+                                    <p:set>
+                                      <p:cBhvr>
+                                        <p:cTn id="38" dur="1" fill="hold">
+                                          <p:stCondLst>
+                                            <p:cond delay="0"/>
+                                          </p:stCondLst>
+                                        </p:cTn>
+                                        <p:tgtEl>
+                                          <p:spTgt spid="11"/>
+                                        </p:tgtEl>
+                                        <p:attrNameLst>
+                                          <p:attrName>style.visibility</p:attrName>
+                                        </p:attrNameLst>
+                                      </p:cBhvr>
+                                      <p:to>
+                                        <p:strVal val="visible"/>
+                                      </p:to>
+                                    </p:set>
+                                    <p:anim calcmode="lin" valueType="num">
+                                      <p:cBhvr additive="base">
+                                        <p:cTn id="39" dur="1000" fill="hold"/>
+                                        <p:tgtEl>
+                                          <p:spTgt spid="11"/>
+                                        </p:tgtEl>
+                                        <p:attrNameLst>
+                                          <p:attrName>ppt_x</p:attrName>
+                                        </p:attrNameLst>
+                                      </p:cBhvr>
+                                      <p:tavLst>
+                                        <p:tav tm="0">
+                                          <p:val>
+                                            <p:strVal val="1+#ppt_w/2"/>
+                                          </p:val>
+                                        </p:tav>
+                                        <p:tav tm="100000">
+                                          <p:val>
+                                            <p:strVal val="#ppt_x"/>
+                                          </p:val>
+                                        </p:tav>
+                                      </p:tavLst>
+                                    </p:anim>
+                                    <p:anim calcmode="lin" valueType="num">
+                                      <p:cBhvr additive="base">
+                                        <p:cTn id="40" dur="1000" fill="hold"/>
+                                        <p:tgtEl>
+                                          <p:spTgt spid="11"/>
+                                        </p:tgtEl>
+                                        <p:attrNameLst>
+                                          <p:attrName>ppt_y</p:attrName>
+                                        </p:attrNameLst>
+                                      </p:cBhvr>
+                                      <p:tavLst>
+                                        <p:tav tm="0">
+                                          <p:val>
+                                            <p:strVal val="#ppt_y"/>
+                                          </p:val>
+                                        </p:tav>
+                                        <p:tav tm="100000">
+                                          <p:val>
+                                            <p:strVal val="#ppt_y"/>
+                                          </p:val>
+                                        </p:tav>
+                                      </p:tavLst>
+                                    </p:anim>
+                                  </p:childTnLst>
+                                </p:cTn>
+                              </p:par>
+                              <p:par>
+                                <p:cTn id="41" presetID="10" presetClass="entr" presetSubtype="0" fill="hold" grpId="1" nodeType="withEffect">
+                                  <p:stCondLst>
+                                    <p:cond delay="0"/>
+                                  </p:stCondLst>
+                                  <p:childTnLst>
+                                    <p:set>
+                                      <p:cBhvr>
+                                        <p:cTn id="42" dur="1" fill="hold">
+                                          <p:stCondLst>
+                                            <p:cond delay="0"/>
+                                          </p:stCondLst>
+                                        </p:cTn>
+                                        <p:tgtEl>
+                                          <p:spTgt spid="11"/>
+                                        </p:tgtEl>
+                                        <p:attrNameLst>
+                                          <p:attrName>style.visibility</p:attrName>
+                                        </p:attrNameLst>
+                                      </p:cBhvr>
+                                      <p:to>
+                                        <p:strVal val="visible"/>
+                                      </p:to>
+                                    </p:set>
+                                    <p:animEffect transition="in" filter="fade">
+                                      <p:cBhvr>
+                                        <p:cTn id="43" dur="1000"/>
+                                        <p:tgtEl>
+                                          <p:spTgt spid="11"/>
+                                        </p:tgtEl>
+                                      </p:cBhvr>
+                                    </p:animEffect>
+                                  </p:childTnLst>
+                                </p:cTn>
+                              </p:par>
+                            </p:childTnLst>
+                          </p:cTn>
+                        </p:par>
+                      </p:childTnLst>
+                    </p:cTn>
+                  </p:par>
+                  <p:par>
+                    <p:cTn id="44" fill="hold">
+                      <p:stCondLst>
+                        <p:cond delay="indefinite"/>
+                      </p:stCondLst>
+                      <p:childTnLst>
+                        <p:par>
+                          <p:cTn id="45" fill="hold">
+                            <p:stCondLst>
+                              <p:cond delay="0"/>
+                            </p:stCondLst>
+                            <p:childTnLst>
+                              <p:par>
+                                <p:cTn id="46" presetID="10" presetClass="exit" presetSubtype="0" fill="hold" grpId="1" nodeType="clickEffect">
+                                  <p:stCondLst>
+                                    <p:cond delay="0"/>
+                                  </p:stCondLst>
+                                  <p:childTnLst>
+                                    <p:animEffect transition="out" filter="fade">
+                                      <p:cBhvr>
+                                        <p:cTn id="47" dur="500"/>
+                                        <p:tgtEl>
+                                          <p:spTgt spid="6"/>
+                                        </p:tgtEl>
+                                      </p:cBhvr>
+                                    </p:animEffect>
+                                    <p:set>
+                                      <p:cBhvr>
+                                        <p:cTn id="48" dur="1" fill="hold">
+                                          <p:stCondLst>
+                                            <p:cond delay="499"/>
+                                          </p:stCondLst>
+                                        </p:cTn>
+                                        <p:tgtEl>
+                                          <p:spTgt spid="6"/>
+                                        </p:tgtEl>
+                                        <p:attrNameLst>
+                                          <p:attrName>style.visibility</p:attrName>
+                                        </p:attrNameLst>
+                                      </p:cBhvr>
+                                      <p:to>
+                                        <p:strVal val="hidden"/>
+                                      </p:to>
+                                    </p:set>
+                                  </p:childTnLst>
+                                </p:cTn>
+                              </p:par>
+                              <p:par>
+                                <p:cTn id="49" presetID="10" presetClass="exit" presetSubtype="0" fill="hold" grpId="2" nodeType="withEffect">
+                                  <p:stCondLst>
+                                    <p:cond delay="0"/>
+                                  </p:stCondLst>
+                                  <p:childTnLst>
+                                    <p:animEffect transition="out" filter="fade">
+                                      <p:cBhvr>
+                                        <p:cTn id="50" dur="500"/>
+                                        <p:tgtEl>
+                                          <p:spTgt spid="9"/>
+                                        </p:tgtEl>
+                                      </p:cBhvr>
+                                    </p:animEffect>
+                                    <p:set>
+                                      <p:cBhvr>
+                                        <p:cTn id="51" dur="1" fill="hold">
+                                          <p:stCondLst>
+                                            <p:cond delay="499"/>
+                                          </p:stCondLst>
+                                        </p:cTn>
+                                        <p:tgtEl>
+                                          <p:spTgt spid="9"/>
+                                        </p:tgtEl>
+                                        <p:attrNameLst>
+                                          <p:attrName>style.visibility</p:attrName>
+                                        </p:attrNameLst>
+                                      </p:cBhvr>
+                                      <p:to>
+                                        <p:strVal val="hidden"/>
+                                      </p:to>
+                                    </p:set>
+                                  </p:childTnLst>
+                                </p:cTn>
+                              </p:par>
+                              <p:par>
+                                <p:cTn id="52" presetID="10" presetClass="exit" presetSubtype="0" fill="hold" grpId="2" nodeType="withEffect">
+                                  <p:stCondLst>
+                                    <p:cond delay="0"/>
+                                  </p:stCondLst>
+                                  <p:childTnLst>
+                                    <p:animEffect transition="out" filter="fade">
+                                      <p:cBhvr>
+                                        <p:cTn id="53" dur="500"/>
+                                        <p:tgtEl>
+                                          <p:spTgt spid="10"/>
+                                        </p:tgtEl>
+                                      </p:cBhvr>
+                                    </p:animEffect>
+                                    <p:set>
+                                      <p:cBhvr>
+                                        <p:cTn id="54" dur="1" fill="hold">
+                                          <p:stCondLst>
+                                            <p:cond delay="499"/>
+                                          </p:stCondLst>
+                                        </p:cTn>
+                                        <p:tgtEl>
+                                          <p:spTgt spid="10"/>
+                                        </p:tgtEl>
+                                        <p:attrNameLst>
+                                          <p:attrName>style.visibility</p:attrName>
+                                        </p:attrNameLst>
+                                      </p:cBhvr>
+                                      <p:to>
+                                        <p:strVal val="hidden"/>
+                                      </p:to>
+                                    </p:set>
+                                  </p:childTnLst>
+                                </p:cTn>
+                              </p:par>
+                              <p:par>
+                                <p:cTn id="55" presetID="10" presetClass="exit" presetSubtype="0" fill="hold" nodeType="withEffect">
+                                  <p:stCondLst>
+                                    <p:cond delay="0"/>
+                                  </p:stCondLst>
+                                  <p:childTnLst>
+                                    <p:animEffect transition="out" filter="fade">
+                                      <p:cBhvr>
+                                        <p:cTn id="56" dur="500"/>
+                                        <p:tgtEl>
+                                          <p:spTgt spid="8"/>
+                                        </p:tgtEl>
+                                      </p:cBhvr>
+                                    </p:animEffect>
+                                    <p:set>
+                                      <p:cBhvr>
+                                        <p:cTn id="57" dur="1" fill="hold">
+                                          <p:stCondLst>
+                                            <p:cond delay="499"/>
+                                          </p:stCondLst>
+                                        </p:cTn>
+                                        <p:tgtEl>
+                                          <p:spTgt spid="8"/>
+                                        </p:tgtEl>
+                                        <p:attrNameLst>
+                                          <p:attrName>style.visibility</p:attrName>
+                                        </p:attrNameLst>
+                                      </p:cBhvr>
+                                      <p:to>
+                                        <p:strVal val="hidden"/>
+                                      </p:to>
+                                    </p:set>
+                                  </p:childTnLst>
+                                </p:cTn>
+                              </p:par>
+                              <p:par>
+                                <p:cTn id="58" presetID="10" presetClass="exit" presetSubtype="0" fill="hold" grpId="2" nodeType="withEffect">
+                                  <p:stCondLst>
+                                    <p:cond delay="0"/>
+                                  </p:stCondLst>
+                                  <p:childTnLst>
+                                    <p:animEffect transition="out" filter="fade">
+                                      <p:cBhvr>
+                                        <p:cTn id="59" dur="500"/>
+                                        <p:tgtEl>
+                                          <p:spTgt spid="11"/>
+                                        </p:tgtEl>
+                                      </p:cBhvr>
+                                    </p:animEffect>
+                                    <p:set>
+                                      <p:cBhvr>
+                                        <p:cTn id="60" dur="1" fill="hold">
+                                          <p:stCondLst>
+                                            <p:cond delay="499"/>
+                                          </p:stCondLst>
+                                        </p:cTn>
+                                        <p:tgtEl>
+                                          <p:spTgt spid="11"/>
+                                        </p:tgtEl>
+                                        <p:attrNameLst>
+                                          <p:attrName>style.visibility</p:attrName>
+                                        </p:attrNameLst>
+                                      </p:cBhvr>
+                                      <p:to>
+                                        <p:strVal val="hidden"/>
+                                      </p:to>
+                                    </p:set>
+                                  </p:childTnLst>
+                                </p:cTn>
+                              </p:par>
+                            </p:childTnLst>
+                          </p:cTn>
+                        </p:par>
+                      </p:childTnLst>
+                    </p:cTn>
+                  </p:par>
+                </p:childTnLst>
+              </p:cTn>
+              <p:prevCondLst>
+                <p:cond evt="onPrev" delay="0">
+                  <p:tgtEl>
+                    <p:sldTgt/>
+                  </p:tgtEl>
+                </p:cond>
+              </p:prevCondLst>
+              <p:nextCondLst>
+                <p:cond evt="onNext" delay="0">
+                  <p:tgtEl>
+                    <p:sldTgt/>
+                  </p:tgtEl>
+                </p:cond>
+              </p:nextCondLst>
+            </p:seq>
+          </p:childTnLst>
+        </p:cTn>
+      </p:par>
+    </p:tnLst>
+    <p:bldLst>
+      <p:bldP spid="6" grpId="0" animBg="1"/>
+      <p:bldP spid="6" grpId="1" animBg="1"/>
+      <p:bldP spid="9" grpId="0" animBg="1"/>
+      <p:bldP spid="9" grpId="1" animBg="1"/>
+      <p:bldP spid="9" grpId="2" animBg="1"/>
+      <p:bldP spid="10" grpId="0" animBg="1"/>
+      <p:bldP spid="10" grpId="1" animBg="1"/>
+      <p:bldP spid="10" grpId="2" animBg="1"/>
+      <p:bldP spid="11" grpId="0" animBg="1"/>
+      <p:bldP spid="11" grpId="1" animBg="1"/>
+      <p:bldP spid="11" grpId="2" animBg="1"/>
+    </p:bldLst>
+  </p:timing>
+</p:sld>
+</file>
+
+<file path=ppt/slides/slide6.xml><?xml version="1.0" encoding="utf-8"?>
 <p:sld xmlns:a="http://schemas.openxmlformats.org/drawingml/2006/main" xmlns:r="http://schemas.openxmlformats.org/officeDocument/2006/relationships" xmlns:p="http://schemas.openxmlformats.org/presentationml/2006/main">
   <p:cSld>
     <p:spTree>
@@ -6711,8 +8161,8 @@
         </p:nvSpPr>
         <p:spPr>
           <a:xfrm>
-            <a:off x="2603092" y="3013501"/>
-            <a:ext cx="6985815" cy="830997"/>
+            <a:off x="1958280" y="3013501"/>
+            <a:ext cx="8275440" cy="830997"/>
           </a:xfrm>
           <a:prstGeom prst="rect">
             <a:avLst/>
@@ -6737,7 +8187,7 @@
                     </a:srgbClr>
                   </a:outerShdw>
                 </a:effectLst>
-                <a:latin typeface="Segoe UI Variable Display Semil" pitchFamily="2" charset="0"/>
+                <a:latin typeface="Carbon Bold" panose="02000806020000020003" pitchFamily="2" charset="0"/>
               </a:rPr>
               <a:t>Vielen Dank fürs Zuhören!</a:t>
             </a:r>
@@ -6757,7 +8207,7 @@
           <p:nvPr/>
         </p:nvSpPr>
         <p:spPr>
-          <a:xfrm rot="20127690">
+          <a:xfrm>
             <a:off x="-7448958" y="6654521"/>
             <a:ext cx="9414214" cy="4811232"/>
           </a:xfrm>
@@ -6840,6 +8290,9 @@
                     <p:cTn id="3" fill="hold">
                       <p:stCondLst>
                         <p:cond delay="indefinite"/>
+                        <p:cond evt="onBegin" delay="0">
+                          <p:tn val="2"/>
+                        </p:cond>
                       </p:stCondLst>
                       <p:childTnLst>
                         <p:par>
@@ -6849,12 +8302,12 @@
                             </p:stCondLst>
                             <p:childTnLst>
                               <p:par>
-                                <p:cTn id="5" presetID="0" presetClass="path" presetSubtype="0" accel="50000" decel="50000" fill="hold" grpId="0" nodeType="clickEffect">
+                                <p:cTn id="5" presetID="0" presetClass="path" presetSubtype="0" accel="50000" decel="50000" fill="hold" grpId="0" nodeType="afterEffect">
                                   <p:stCondLst>
                                     <p:cond delay="0"/>
                                   </p:stCondLst>
                                   <p:childTnLst>
-                                    <p:animMotion origin="layout" path="M 1.5668 -1.54328 L -5E-6 3.33333E-6 " pathEditMode="relative" rAng="0" ptsTypes="AA">
+                                    <p:animMotion origin="layout" path="M 1.60456 -0.82662 L -0.28138 -0.82106 " pathEditMode="relative" rAng="0" ptsTypes="AA">
                                       <p:cBhvr>
                                         <p:cTn id="6" dur="2000" fill="hold"/>
                                         <p:tgtEl>
@@ -6865,7 +8318,7 @@
                                           <p:attrName>ppt_y</p:attrName>
                                         </p:attrNameLst>
                                       </p:cBhvr>
-                                      <p:rCtr x="-77253" y="71944"/>
+                                      <p:rCtr x="-94297" y="278"/>
                                     </p:animMotion>
                                   </p:childTnLst>
                                 </p:cTn>

</xml_diff>

<commit_message>
Vault backup: 30/01/24 20:15:24 XMG
Affected files:
.obsidian/workspace.json
WIR/Wirtschaft/Zeitungsartikel.pptx
</commit_message>
<xml_diff>
--- a/WIR/Wirtschaft/Zeitungsartikel.pptx
+++ b/WIR/Wirtschaft/Zeitungsartikel.pptx
@@ -4141,6 +4141,208 @@
   <p:clrMapOvr>
     <a:masterClrMapping/>
   </p:clrMapOvr>
+  <p:timing>
+    <p:tnLst>
+      <p:par>
+        <p:cTn id="1" dur="indefinite" restart="never" nodeType="tmRoot">
+          <p:childTnLst>
+            <p:seq concurrent="1" nextAc="seek">
+              <p:cTn id="2" dur="indefinite" nodeType="mainSeq">
+                <p:childTnLst>
+                  <p:par>
+                    <p:cTn id="3" fill="hold">
+                      <p:stCondLst>
+                        <p:cond delay="indefinite"/>
+                      </p:stCondLst>
+                      <p:childTnLst>
+                        <p:par>
+                          <p:cTn id="4" fill="hold">
+                            <p:stCondLst>
+                              <p:cond delay="0"/>
+                            </p:stCondLst>
+                            <p:childTnLst>
+                              <p:par>
+                                <p:cTn id="5" presetID="10" presetClass="exit" presetSubtype="0" fill="hold" grpId="0" nodeType="clickEffect">
+                                  <p:stCondLst>
+                                    <p:cond delay="0"/>
+                                  </p:stCondLst>
+                                  <p:childTnLst>
+                                    <p:animEffect transition="out" filter="fade">
+                                      <p:cBhvr>
+                                        <p:cTn id="6" dur="500"/>
+                                        <p:tgtEl>
+                                          <p:spTgt spid="1041"/>
+                                        </p:tgtEl>
+                                      </p:cBhvr>
+                                    </p:animEffect>
+                                    <p:set>
+                                      <p:cBhvr>
+                                        <p:cTn id="7" dur="1" fill="hold">
+                                          <p:stCondLst>
+                                            <p:cond delay="499"/>
+                                          </p:stCondLst>
+                                        </p:cTn>
+                                        <p:tgtEl>
+                                          <p:spTgt spid="1041"/>
+                                        </p:tgtEl>
+                                        <p:attrNameLst>
+                                          <p:attrName>style.visibility</p:attrName>
+                                        </p:attrNameLst>
+                                      </p:cBhvr>
+                                      <p:to>
+                                        <p:strVal val="hidden"/>
+                                      </p:to>
+                                    </p:set>
+                                  </p:childTnLst>
+                                </p:cTn>
+                              </p:par>
+                              <p:par>
+                                <p:cTn id="8" presetID="10" presetClass="exit" presetSubtype="0" fill="hold" grpId="0" nodeType="withEffect">
+                                  <p:stCondLst>
+                                    <p:cond delay="0"/>
+                                  </p:stCondLst>
+                                  <p:childTnLst>
+                                    <p:animEffect transition="out" filter="fade">
+                                      <p:cBhvr>
+                                        <p:cTn id="9" dur="500"/>
+                                        <p:tgtEl>
+                                          <p:spTgt spid="1043"/>
+                                        </p:tgtEl>
+                                      </p:cBhvr>
+                                    </p:animEffect>
+                                    <p:set>
+                                      <p:cBhvr>
+                                        <p:cTn id="10" dur="1" fill="hold">
+                                          <p:stCondLst>
+                                            <p:cond delay="499"/>
+                                          </p:stCondLst>
+                                        </p:cTn>
+                                        <p:tgtEl>
+                                          <p:spTgt spid="1043"/>
+                                        </p:tgtEl>
+                                        <p:attrNameLst>
+                                          <p:attrName>style.visibility</p:attrName>
+                                        </p:attrNameLst>
+                                      </p:cBhvr>
+                                      <p:to>
+                                        <p:strVal val="hidden"/>
+                                      </p:to>
+                                    </p:set>
+                                  </p:childTnLst>
+                                </p:cTn>
+                              </p:par>
+                              <p:par>
+                                <p:cTn id="11" presetID="10" presetClass="exit" presetSubtype="0" fill="hold" grpId="0" nodeType="withEffect">
+                                  <p:stCondLst>
+                                    <p:cond delay="0"/>
+                                  </p:stCondLst>
+                                  <p:childTnLst>
+                                    <p:animEffect transition="out" filter="fade">
+                                      <p:cBhvr>
+                                        <p:cTn id="12" dur="500"/>
+                                        <p:tgtEl>
+                                          <p:spTgt spid="2"/>
+                                        </p:tgtEl>
+                                      </p:cBhvr>
+                                    </p:animEffect>
+                                    <p:set>
+                                      <p:cBhvr>
+                                        <p:cTn id="13" dur="1" fill="hold">
+                                          <p:stCondLst>
+                                            <p:cond delay="499"/>
+                                          </p:stCondLst>
+                                        </p:cTn>
+                                        <p:tgtEl>
+                                          <p:spTgt spid="2"/>
+                                        </p:tgtEl>
+                                        <p:attrNameLst>
+                                          <p:attrName>style.visibility</p:attrName>
+                                        </p:attrNameLst>
+                                      </p:cBhvr>
+                                      <p:to>
+                                        <p:strVal val="hidden"/>
+                                      </p:to>
+                                    </p:set>
+                                  </p:childTnLst>
+                                </p:cTn>
+                              </p:par>
+                              <p:par>
+                                <p:cTn id="14" presetID="10" presetClass="exit" presetSubtype="0" fill="hold" grpId="0" nodeType="withEffect">
+                                  <p:stCondLst>
+                                    <p:cond delay="0"/>
+                                  </p:stCondLst>
+                                  <p:childTnLst>
+                                    <p:animEffect transition="out" filter="fade">
+                                      <p:cBhvr>
+                                        <p:cTn id="15" dur="500"/>
+                                        <p:tgtEl>
+                                          <p:spTgt spid="3">
+                                            <p:txEl>
+                                              <p:pRg st="0" end="0"/>
+                                            </p:txEl>
+                                          </p:spTgt>
+                                        </p:tgtEl>
+                                      </p:cBhvr>
+                                    </p:animEffect>
+                                    <p:set>
+                                      <p:cBhvr>
+                                        <p:cTn id="16" dur="1" fill="hold">
+                                          <p:stCondLst>
+                                            <p:cond delay="499"/>
+                                          </p:stCondLst>
+                                        </p:cTn>
+                                        <p:tgtEl>
+                                          <p:spTgt spid="3">
+                                            <p:txEl>
+                                              <p:pRg st="0" end="0"/>
+                                            </p:txEl>
+                                          </p:spTgt>
+                                        </p:tgtEl>
+                                        <p:attrNameLst>
+                                          <p:attrName>style.visibility</p:attrName>
+                                        </p:attrNameLst>
+                                      </p:cBhvr>
+                                      <p:to>
+                                        <p:strVal val="hidden"/>
+                                      </p:to>
+                                    </p:set>
+                                  </p:childTnLst>
+                                </p:cTn>
+                              </p:par>
+                            </p:childTnLst>
+                          </p:cTn>
+                        </p:par>
+                      </p:childTnLst>
+                    </p:cTn>
+                  </p:par>
+                </p:childTnLst>
+              </p:cTn>
+              <p:prevCondLst>
+                <p:cond evt="onPrev" delay="0">
+                  <p:tgtEl>
+                    <p:sldTgt/>
+                  </p:tgtEl>
+                </p:cond>
+              </p:prevCondLst>
+              <p:nextCondLst>
+                <p:cond evt="onNext" delay="0">
+                  <p:tgtEl>
+                    <p:sldTgt/>
+                  </p:tgtEl>
+                </p:cond>
+              </p:nextCondLst>
+            </p:seq>
+          </p:childTnLst>
+        </p:cTn>
+      </p:par>
+    </p:tnLst>
+    <p:bldLst>
+      <p:bldP spid="1041" grpId="0" animBg="1"/>
+      <p:bldP spid="1043" grpId="0" animBg="1"/>
+      <p:bldP spid="2" grpId="0"/>
+      <p:bldP spid="3" grpId="0" build="p"/>
+    </p:bldLst>
+  </p:timing>
 </p:sld>
 </file>
 

</xml_diff>

<commit_message>
Vault backup: 14/02/24 09:37:21 XMG
Affected files:
.obsidian/workspace.json
SYT/Arduino-Code/MQTT/src/main.cpp
WIR/Wirtschaft/Zeitungsartikel.pptx
</commit_message>
<xml_diff>
--- a/WIR/Wirtschaft/Zeitungsartikel.pptx
+++ b/WIR/Wirtschaft/Zeitungsartikel.pptx
@@ -202,7 +202,7 @@
           <a:p>
             <a:fld id="{1A0E60E8-6D16-4AF2-82C7-F3560A7839F6}" type="datetimeFigureOut">
               <a:rPr lang="de-AT" smtClean="0"/>
-              <a:t>30.01.2024</a:t>
+              <a:t>14.02.2024</a:t>
             </a:fld>
             <a:endParaRPr lang="de-AT"/>
           </a:p>
@@ -723,7 +723,7 @@
           <a:p>
             <a:fld id="{1AFA06BB-4104-4307-946B-E81C1DB31FA5}" type="datetimeFigureOut">
               <a:rPr lang="en-AU" smtClean="0"/>
-              <a:t>30/01/2024</a:t>
+              <a:t>14/02/2024</a:t>
             </a:fld>
             <a:endParaRPr lang="en-AU"/>
           </a:p>
@@ -923,7 +923,7 @@
           <a:p>
             <a:fld id="{1AFA06BB-4104-4307-946B-E81C1DB31FA5}" type="datetimeFigureOut">
               <a:rPr lang="en-AU" smtClean="0"/>
-              <a:t>30/01/2024</a:t>
+              <a:t>14/02/2024</a:t>
             </a:fld>
             <a:endParaRPr lang="en-AU"/>
           </a:p>
@@ -1133,7 +1133,7 @@
           <a:p>
             <a:fld id="{1AFA06BB-4104-4307-946B-E81C1DB31FA5}" type="datetimeFigureOut">
               <a:rPr lang="en-AU" smtClean="0"/>
-              <a:t>30/01/2024</a:t>
+              <a:t>14/02/2024</a:t>
             </a:fld>
             <a:endParaRPr lang="en-AU"/>
           </a:p>
@@ -1333,7 +1333,7 @@
           <a:p>
             <a:fld id="{1AFA06BB-4104-4307-946B-E81C1DB31FA5}" type="datetimeFigureOut">
               <a:rPr lang="en-AU" smtClean="0"/>
-              <a:t>30/01/2024</a:t>
+              <a:t>14/02/2024</a:t>
             </a:fld>
             <a:endParaRPr lang="en-AU"/>
           </a:p>
@@ -1609,7 +1609,7 @@
           <a:p>
             <a:fld id="{1AFA06BB-4104-4307-946B-E81C1DB31FA5}" type="datetimeFigureOut">
               <a:rPr lang="en-AU" smtClean="0"/>
-              <a:t>30/01/2024</a:t>
+              <a:t>14/02/2024</a:t>
             </a:fld>
             <a:endParaRPr lang="en-AU"/>
           </a:p>
@@ -1877,7 +1877,7 @@
           <a:p>
             <a:fld id="{1AFA06BB-4104-4307-946B-E81C1DB31FA5}" type="datetimeFigureOut">
               <a:rPr lang="en-AU" smtClean="0"/>
-              <a:t>30/01/2024</a:t>
+              <a:t>14/02/2024</a:t>
             </a:fld>
             <a:endParaRPr lang="en-AU"/>
           </a:p>
@@ -2292,7 +2292,7 @@
           <a:p>
             <a:fld id="{1AFA06BB-4104-4307-946B-E81C1DB31FA5}" type="datetimeFigureOut">
               <a:rPr lang="en-AU" smtClean="0"/>
-              <a:t>30/01/2024</a:t>
+              <a:t>14/02/2024</a:t>
             </a:fld>
             <a:endParaRPr lang="en-AU"/>
           </a:p>
@@ -2434,7 +2434,7 @@
           <a:p>
             <a:fld id="{1AFA06BB-4104-4307-946B-E81C1DB31FA5}" type="datetimeFigureOut">
               <a:rPr lang="en-AU" smtClean="0"/>
-              <a:t>30/01/2024</a:t>
+              <a:t>14/02/2024</a:t>
             </a:fld>
             <a:endParaRPr lang="en-AU"/>
           </a:p>
@@ -2547,7 +2547,7 @@
           <a:p>
             <a:fld id="{1AFA06BB-4104-4307-946B-E81C1DB31FA5}" type="datetimeFigureOut">
               <a:rPr lang="en-AU" smtClean="0"/>
-              <a:t>30/01/2024</a:t>
+              <a:t>14/02/2024</a:t>
             </a:fld>
             <a:endParaRPr lang="en-AU"/>
           </a:p>
@@ -2860,7 +2860,7 @@
           <a:p>
             <a:fld id="{1AFA06BB-4104-4307-946B-E81C1DB31FA5}" type="datetimeFigureOut">
               <a:rPr lang="en-AU" smtClean="0"/>
-              <a:t>30/01/2024</a:t>
+              <a:t>14/02/2024</a:t>
             </a:fld>
             <a:endParaRPr lang="en-AU"/>
           </a:p>
@@ -3149,7 +3149,7 @@
           <a:p>
             <a:fld id="{1AFA06BB-4104-4307-946B-E81C1DB31FA5}" type="datetimeFigureOut">
               <a:rPr lang="en-AU" smtClean="0"/>
-              <a:t>30/01/2024</a:t>
+              <a:t>14/02/2024</a:t>
             </a:fld>
             <a:endParaRPr lang="en-AU"/>
           </a:p>
@@ -3392,7 +3392,7 @@
           <a:p>
             <a:fld id="{1AFA06BB-4104-4307-946B-E81C1DB31FA5}" type="datetimeFigureOut">
               <a:rPr lang="en-AU" smtClean="0"/>
-              <a:t>30/01/2024</a:t>
+              <a:t>14/02/2024</a:t>
             </a:fld>
             <a:endParaRPr lang="en-AU"/>
           </a:p>
@@ -4111,23 +4111,8 @@
                 </a:solidFill>
                 <a:latin typeface="Carbon Bold" panose="02000806020000020003" pitchFamily="2" charset="0"/>
               </a:rPr>
-              <a:t>Hrbek &amp; </a:t>
+              <a:t>Thienel / Pollak / Hrbek</a:t>
             </a:r>
-            <a:r>
-              <a:rPr lang="en-AU" dirty="0" err="1">
-                <a:solidFill>
-                  <a:srgbClr val="FFFFFF"/>
-                </a:solidFill>
-                <a:latin typeface="Carbon Bold" panose="02000806020000020003" pitchFamily="2" charset="0"/>
-              </a:rPr>
-              <a:t>Thienel</a:t>
-            </a:r>
-            <a:endParaRPr lang="en-AU" dirty="0">
-              <a:solidFill>
-                <a:srgbClr val="FFFFFF"/>
-              </a:solidFill>
-              <a:latin typeface="Carbon Bold" panose="02000806020000020003" pitchFamily="2" charset="0"/>
-            </a:endParaRPr>
           </a:p>
         </p:txBody>
       </p:sp>

</xml_diff>

<commit_message>
Vault backup: 09/04/24 23:27:48 XMG-MAZ SHUTDOWN
</commit_message>
<xml_diff>
--- a/WIR/Wirtschaft/Zeitungsartikel.pptx
+++ b/WIR/Wirtschaft/Zeitungsartikel.pptx
@@ -2,18 +2,18 @@
 <file path=ppt/presentation.xml><?xml version="1.0" encoding="utf-8"?>
 <p:presentation xmlns:a="http://schemas.openxmlformats.org/drawingml/2006/main" xmlns:r="http://schemas.openxmlformats.org/officeDocument/2006/relationships" xmlns:p="http://schemas.openxmlformats.org/presentationml/2006/main" saveSubsetFonts="1">
   <p:sldMasterIdLst>
-    <p:sldMasterId id="2147483648" r:id="rId1"/>
+    <p:sldMasterId id="2147483648" r:id="rId4"/>
   </p:sldMasterIdLst>
   <p:notesMasterIdLst>
-    <p:notesMasterId r:id="rId8"/>
+    <p:notesMasterId r:id="rId11"/>
   </p:notesMasterIdLst>
   <p:sldIdLst>
-    <p:sldId id="256" r:id="rId2"/>
-    <p:sldId id="257" r:id="rId3"/>
-    <p:sldId id="258" r:id="rId4"/>
-    <p:sldId id="259" r:id="rId5"/>
-    <p:sldId id="261" r:id="rId6"/>
-    <p:sldId id="260" r:id="rId7"/>
+    <p:sldId id="256" r:id="rId5"/>
+    <p:sldId id="257" r:id="rId6"/>
+    <p:sldId id="258" r:id="rId7"/>
+    <p:sldId id="259" r:id="rId8"/>
+    <p:sldId id="261" r:id="rId9"/>
+    <p:sldId id="260" r:id="rId10"/>
   </p:sldIdLst>
   <p:sldSz cx="12192000" cy="6858000"/>
   <p:notesSz cx="6858000" cy="9144000"/>
@@ -120,6 +120,14 @@
 </p:presentation>
 </file>
 
+<file path=ppt/revisionInfo.xml><?xml version="1.0" encoding="utf-8"?>
+<p1510:revInfo xmlns:a="http://schemas.openxmlformats.org/drawingml/2006/main" xmlns:r="http://schemas.openxmlformats.org/officeDocument/2006/relationships" xmlns:p1510="http://schemas.microsoft.com/office/powerpoint/2015/10/main">
+  <p1510:revLst>
+    <p1510:client id="{C183F6DB-4EAD-4344-92CD-C58F696C998A}" v="603" dt="2024-04-09T21:23:13.714"/>
+  </p1510:revLst>
+</p1510:revInfo>
+</file>
+
 <file path=ppt/notesMasters/notesMaster1.xml><?xml version="1.0" encoding="utf-8"?>
 <p:notesMaster xmlns:a="http://schemas.openxmlformats.org/drawingml/2006/main" xmlns:r="http://schemas.openxmlformats.org/officeDocument/2006/relationships" xmlns:p="http://schemas.openxmlformats.org/presentationml/2006/main">
   <p:cSld>
@@ -202,7 +210,7 @@
           <a:p>
             <a:fld id="{1A0E60E8-6D16-4AF2-82C7-F3560A7839F6}" type="datetimeFigureOut">
               <a:rPr lang="de-AT" smtClean="0"/>
-              <a:t>14.02.2024</a:t>
+              <a:t>09.04.2024</a:t>
             </a:fld>
             <a:endParaRPr lang="de-AT"/>
           </a:p>
@@ -516,23 +524,36 @@
           <a:p>
             <a:r>
               <a:rPr lang="de-AT" dirty="0"/>
+              <a:t>Wenn es zu einem Konflikt kommen würde, gäbe es ein massives Versorgungsproblem von Mikrochips</a:t>
+            </a:r>
+          </a:p>
+          <a:p>
+            <a:r>
+              <a:rPr lang="de-AT" dirty="0"/>
+              <a:t>Wirtschaft würde signifikant einbrechen</a:t>
+            </a:r>
+          </a:p>
+          <a:p>
+            <a:endParaRPr lang="de-AT" dirty="0"/>
+          </a:p>
+          <a:p>
+            <a:r>
+              <a:rPr lang="de-AT" dirty="0"/>
               <a:t>Tuvalu = Pazifischer Inselstaat</a:t>
             </a:r>
-            <a:br>
-              <a:rPr lang="de-AT" dirty="0"/>
-            </a:br>
-            <a:br>
-              <a:rPr lang="de-AT" dirty="0"/>
-            </a:br>
+          </a:p>
+          <a:p>
             <a:r>
-              <a:rPr lang="de-AT" b="0" i="0" dirty="0">
-                <a:solidFill>
-                  <a:srgbClr val="212121"/>
-                </a:solidFill>
-                <a:effectLst/>
-                <a:latin typeface="STMatilda Text Variable"/>
-              </a:rPr>
-              <a:t>pro-taiwanesische Regierungschef Kausea Natano NICHT wieder ins Parlament gewählt wurde</a:t>
+              <a:rPr lang="de-DE" dirty="0"/>
+              <a:t>Taiwan könnte seine diplomatischen Beziehungen zu </a:t>
+            </a:r>
+            <a:r>
+              <a:rPr lang="de-DE"/>
+              <a:t>Tuvalu verlieren, </a:t>
+            </a:r>
+            <a:r>
+              <a:rPr lang="de-DE" dirty="0"/>
+              <a:t>nachdem der pro-taiwanesische Regierungschef nicht wiedergewählt wurde. Dies deutet auf eine mögliche Verschiebung hin, die Taiwans Einfluss in der Region schwächen könnte. Zudem spielt das geplante Unterseekabel eine wichtige Rolle für die digitale Infrastruktur und die wirtschaftliche Entwicklung Tuvalus.</a:t>
             </a:r>
             <a:endParaRPr lang="de-AT" dirty="0"/>
           </a:p>
@@ -565,6 +586,90 @@
     <p:extLst>
       <p:ext uri="{BB962C8B-B14F-4D97-AF65-F5344CB8AC3E}">
         <p14:creationId xmlns:p14="http://schemas.microsoft.com/office/powerpoint/2010/main" val="3125964008"/>
+      </p:ext>
+    </p:extLst>
+  </p:cSld>
+  <p:clrMapOvr>
+    <a:masterClrMapping/>
+  </p:clrMapOvr>
+</p:notes>
+</file>
+
+<file path=ppt/notesSlides/notesSlide2.xml><?xml version="1.0" encoding="utf-8"?>
+<p:notes xmlns:a="http://schemas.openxmlformats.org/drawingml/2006/main" xmlns:r="http://schemas.openxmlformats.org/officeDocument/2006/relationships" xmlns:p="http://schemas.openxmlformats.org/presentationml/2006/main">
+  <p:cSld>
+    <p:spTree>
+      <p:nvGrpSpPr>
+        <p:cNvPr id="1" name=""/>
+        <p:cNvGrpSpPr/>
+        <p:nvPr/>
+      </p:nvGrpSpPr>
+      <p:grpSpPr>
+        <a:xfrm>
+          <a:off x="0" y="0"/>
+          <a:ext cx="0" cy="0"/>
+          <a:chOff x="0" y="0"/>
+          <a:chExt cx="0" cy="0"/>
+        </a:xfrm>
+      </p:grpSpPr>
+      <p:sp>
+        <p:nvSpPr>
+          <p:cNvPr id="2" name="Folienbildplatzhalter 1"/>
+          <p:cNvSpPr>
+            <a:spLocks noGrp="1" noRot="1" noChangeAspect="1"/>
+          </p:cNvSpPr>
+          <p:nvPr>
+            <p:ph type="sldImg"/>
+          </p:nvPr>
+        </p:nvSpPr>
+        <p:spPr/>
+      </p:sp>
+      <p:sp>
+        <p:nvSpPr>
+          <p:cNvPr id="3" name="Notizenplatzhalter 2"/>
+          <p:cNvSpPr>
+            <a:spLocks noGrp="1"/>
+          </p:cNvSpPr>
+          <p:nvPr>
+            <p:ph type="body" idx="1"/>
+          </p:nvPr>
+        </p:nvSpPr>
+        <p:spPr/>
+        <p:txBody>
+          <a:bodyPr/>
+          <a:lstStyle/>
+          <a:p>
+            <a:endParaRPr lang="en-GB" dirty="0"/>
+          </a:p>
+        </p:txBody>
+      </p:sp>
+      <p:sp>
+        <p:nvSpPr>
+          <p:cNvPr id="4" name="Foliennummernplatzhalter 3"/>
+          <p:cNvSpPr>
+            <a:spLocks noGrp="1"/>
+          </p:cNvSpPr>
+          <p:nvPr>
+            <p:ph type="sldNum" sz="quarter" idx="5"/>
+          </p:nvPr>
+        </p:nvSpPr>
+        <p:spPr/>
+        <p:txBody>
+          <a:bodyPr/>
+          <a:lstStyle/>
+          <a:p>
+            <a:fld id="{E3149BBE-474E-4122-8657-31F7BB1071B1}" type="slidenum">
+              <a:rPr lang="de-AT" smtClean="0"/>
+              <a:t>4</a:t>
+            </a:fld>
+            <a:endParaRPr lang="de-AT"/>
+          </a:p>
+        </p:txBody>
+      </p:sp>
+    </p:spTree>
+    <p:extLst>
+      <p:ext uri="{BB962C8B-B14F-4D97-AF65-F5344CB8AC3E}">
+        <p14:creationId xmlns:p14="http://schemas.microsoft.com/office/powerpoint/2010/main" val="3739763428"/>
       </p:ext>
     </p:extLst>
   </p:cSld>
@@ -723,7 +828,7 @@
           <a:p>
             <a:fld id="{1AFA06BB-4104-4307-946B-E81C1DB31FA5}" type="datetimeFigureOut">
               <a:rPr lang="en-AU" smtClean="0"/>
-              <a:t>14/02/2024</a:t>
+              <a:t>9/04/2024</a:t>
             </a:fld>
             <a:endParaRPr lang="en-AU"/>
           </a:p>
@@ -923,7 +1028,7 @@
           <a:p>
             <a:fld id="{1AFA06BB-4104-4307-946B-E81C1DB31FA5}" type="datetimeFigureOut">
               <a:rPr lang="en-AU" smtClean="0"/>
-              <a:t>14/02/2024</a:t>
+              <a:t>9/04/2024</a:t>
             </a:fld>
             <a:endParaRPr lang="en-AU"/>
           </a:p>
@@ -1133,7 +1238,7 @@
           <a:p>
             <a:fld id="{1AFA06BB-4104-4307-946B-E81C1DB31FA5}" type="datetimeFigureOut">
               <a:rPr lang="en-AU" smtClean="0"/>
-              <a:t>14/02/2024</a:t>
+              <a:t>9/04/2024</a:t>
             </a:fld>
             <a:endParaRPr lang="en-AU"/>
           </a:p>
@@ -1333,7 +1438,7 @@
           <a:p>
             <a:fld id="{1AFA06BB-4104-4307-946B-E81C1DB31FA5}" type="datetimeFigureOut">
               <a:rPr lang="en-AU" smtClean="0"/>
-              <a:t>14/02/2024</a:t>
+              <a:t>9/04/2024</a:t>
             </a:fld>
             <a:endParaRPr lang="en-AU"/>
           </a:p>
@@ -1609,7 +1714,7 @@
           <a:p>
             <a:fld id="{1AFA06BB-4104-4307-946B-E81C1DB31FA5}" type="datetimeFigureOut">
               <a:rPr lang="en-AU" smtClean="0"/>
-              <a:t>14/02/2024</a:t>
+              <a:t>9/04/2024</a:t>
             </a:fld>
             <a:endParaRPr lang="en-AU"/>
           </a:p>
@@ -1877,7 +1982,7 @@
           <a:p>
             <a:fld id="{1AFA06BB-4104-4307-946B-E81C1DB31FA5}" type="datetimeFigureOut">
               <a:rPr lang="en-AU" smtClean="0"/>
-              <a:t>14/02/2024</a:t>
+              <a:t>9/04/2024</a:t>
             </a:fld>
             <a:endParaRPr lang="en-AU"/>
           </a:p>
@@ -2292,7 +2397,7 @@
           <a:p>
             <a:fld id="{1AFA06BB-4104-4307-946B-E81C1DB31FA5}" type="datetimeFigureOut">
               <a:rPr lang="en-AU" smtClean="0"/>
-              <a:t>14/02/2024</a:t>
+              <a:t>9/04/2024</a:t>
             </a:fld>
             <a:endParaRPr lang="en-AU"/>
           </a:p>
@@ -2434,7 +2539,7 @@
           <a:p>
             <a:fld id="{1AFA06BB-4104-4307-946B-E81C1DB31FA5}" type="datetimeFigureOut">
               <a:rPr lang="en-AU" smtClean="0"/>
-              <a:t>14/02/2024</a:t>
+              <a:t>9/04/2024</a:t>
             </a:fld>
             <a:endParaRPr lang="en-AU"/>
           </a:p>
@@ -2547,7 +2652,7 @@
           <a:p>
             <a:fld id="{1AFA06BB-4104-4307-946B-E81C1DB31FA5}" type="datetimeFigureOut">
               <a:rPr lang="en-AU" smtClean="0"/>
-              <a:t>14/02/2024</a:t>
+              <a:t>9/04/2024</a:t>
             </a:fld>
             <a:endParaRPr lang="en-AU"/>
           </a:p>
@@ -2860,7 +2965,7 @@
           <a:p>
             <a:fld id="{1AFA06BB-4104-4307-946B-E81C1DB31FA5}" type="datetimeFigureOut">
               <a:rPr lang="en-AU" smtClean="0"/>
-              <a:t>14/02/2024</a:t>
+              <a:t>9/04/2024</a:t>
             </a:fld>
             <a:endParaRPr lang="en-AU"/>
           </a:p>
@@ -3149,7 +3254,7 @@
           <a:p>
             <a:fld id="{1AFA06BB-4104-4307-946B-E81C1DB31FA5}" type="datetimeFigureOut">
               <a:rPr lang="en-AU" smtClean="0"/>
-              <a:t>14/02/2024</a:t>
+              <a:t>9/04/2024</a:t>
             </a:fld>
             <a:endParaRPr lang="en-AU"/>
           </a:p>
@@ -3392,7 +3497,7 @@
           <a:p>
             <a:fld id="{1AFA06BB-4104-4307-946B-E81C1DB31FA5}" type="datetimeFigureOut">
               <a:rPr lang="en-AU" smtClean="0"/>
-              <a:t>14/02/2024</a:t>
+              <a:t>9/04/2024</a:t>
             </a:fld>
             <a:endParaRPr lang="en-AU"/>
           </a:p>
@@ -4058,7 +4163,7 @@
           <a:lstStyle/>
           <a:p>
             <a:r>
-              <a:rPr lang="de-AT" sz="5200" dirty="0">
+              <a:rPr lang="de-AT" sz="5200">
                 <a:solidFill>
                   <a:srgbClr val="FFFFFF"/>
                 </a:solidFill>
@@ -4105,13 +4210,22 @@
           <a:lstStyle/>
           <a:p>
             <a:r>
+              <a:rPr lang="en-AU" dirty="0" err="1">
+                <a:solidFill>
+                  <a:srgbClr val="FFFFFF"/>
+                </a:solidFill>
+                <a:latin typeface="Carbon Bold" panose="02000806020000020003" pitchFamily="2" charset="0"/>
+              </a:rPr>
+              <a:t>Thienel</a:t>
+            </a:r>
+            <a:r>
               <a:rPr lang="en-AU" dirty="0">
                 <a:solidFill>
                   <a:srgbClr val="FFFFFF"/>
                 </a:solidFill>
                 <a:latin typeface="Carbon Bold" panose="02000806020000020003" pitchFamily="2" charset="0"/>
               </a:rPr>
-              <a:t>Thienel / Pollak / Hrbek</a:t>
+              <a:t> &amp; Hrbek</a:t>
             </a:r>
           </a:p>
         </p:txBody>
@@ -4471,7 +4585,7 @@
             <a:lstStyle/>
             <a:p>
               <a:pPr algn="ctr"/>
-              <a:endParaRPr lang="de-AT" dirty="0"/>
+              <a:endParaRPr lang="de-AT"/>
             </a:p>
           </p:txBody>
         </p:sp>
@@ -4504,7 +4618,7 @@
             <a:lstStyle/>
             <a:p>
               <a:r>
-                <a:rPr lang="de-DE" sz="3200" b="1" i="0" dirty="0">
+                <a:rPr lang="de-DE" sz="3200" b="1" i="0">
                   <a:solidFill>
                     <a:schemeClr val="bg1"/>
                   </a:solidFill>
@@ -4515,7 +4629,7 @@
               </a:r>
             </a:p>
             <a:p>
-              <a:endParaRPr lang="en-AU" dirty="0"/>
+              <a:endParaRPr lang="en-AU"/>
             </a:p>
           </p:txBody>
         </p:sp>
@@ -4590,7 +4704,7 @@
           <a:lstStyle/>
           <a:p>
             <a:pPr algn="ctr"/>
-            <a:endParaRPr lang="en-AU" dirty="0"/>
+            <a:endParaRPr lang="en-AU"/>
           </a:p>
         </p:txBody>
       </p:sp>
@@ -5148,7 +5262,7 @@
             <a:lstStyle/>
             <a:p>
               <a:r>
-                <a:rPr lang="en-AU" sz="4400" dirty="0" err="1">
+                <a:rPr lang="en-AU" sz="4400" err="1">
                   <a:solidFill>
                     <a:schemeClr val="bg1"/>
                   </a:solidFill>
@@ -5157,7 +5271,7 @@
                 <a:t>Fakten</a:t>
               </a:r>
               <a:r>
-                <a:rPr lang="en-AU" sz="4400" dirty="0">
+                <a:rPr lang="en-AU" sz="4400">
                   <a:solidFill>
                     <a:schemeClr val="bg1"/>
                   </a:solidFill>
@@ -5165,7 +5279,7 @@
                 </a:rPr>
                 <a:t>:</a:t>
               </a:r>
-              <a:endParaRPr lang="en-AU" dirty="0">
+              <a:endParaRPr lang="en-AU">
                 <a:solidFill>
                   <a:schemeClr val="bg1"/>
                 </a:solidFill>
@@ -5207,7 +5321,7 @@
                 <a:buChar char="•"/>
               </a:pPr>
               <a:r>
-                <a:rPr lang="en-AU" dirty="0">
+                <a:rPr lang="en-AU">
                   <a:solidFill>
                     <a:schemeClr val="bg1"/>
                   </a:solidFill>
@@ -5222,7 +5336,7 @@
                 <a:buChar char="•"/>
               </a:pPr>
               <a:r>
-                <a:rPr lang="en-AU" dirty="0">
+                <a:rPr lang="en-AU">
                   <a:solidFill>
                     <a:schemeClr val="bg1"/>
                   </a:solidFill>
@@ -5231,7 +5345,7 @@
                 <a:t>27. </a:t>
               </a:r>
               <a:r>
-                <a:rPr lang="en-AU" dirty="0" err="1">
+                <a:rPr lang="en-AU" err="1">
                   <a:solidFill>
                     <a:schemeClr val="bg1"/>
                   </a:solidFill>
@@ -5240,7 +5354,7 @@
                 <a:t>Jänner</a:t>
               </a:r>
               <a:r>
-                <a:rPr lang="en-AU" dirty="0">
+                <a:rPr lang="en-AU">
                   <a:solidFill>
                     <a:schemeClr val="bg1"/>
                   </a:solidFill>
@@ -5254,7 +5368,7 @@
                 <a:buFont typeface="Arial" panose="020B0604020202020204" pitchFamily="34" charset="0"/>
                 <a:buChar char="•"/>
               </a:pPr>
-              <a:endParaRPr lang="en-AU" dirty="0">
+              <a:endParaRPr lang="en-AU">
                 <a:solidFill>
                   <a:schemeClr val="bg1"/>
                 </a:solidFill>
@@ -5267,7 +5381,7 @@
                 <a:buChar char="•"/>
               </a:pPr>
               <a:r>
-                <a:rPr lang="en-AU" dirty="0" err="1">
+                <a:rPr lang="en-AU" err="1">
                   <a:solidFill>
                     <a:schemeClr val="bg1"/>
                   </a:solidFill>
@@ -5276,7 +5390,7 @@
                 <a:t>Warum</a:t>
               </a:r>
               <a:r>
-                <a:rPr lang="en-AU" dirty="0">
+                <a:rPr lang="en-AU">
                   <a:solidFill>
                     <a:schemeClr val="bg1"/>
                   </a:solidFill>
@@ -5285,7 +5399,7 @@
                 <a:t> </a:t>
               </a:r>
               <a:r>
-                <a:rPr lang="en-AU" dirty="0" err="1">
+                <a:rPr lang="en-AU" err="1">
                   <a:solidFill>
                     <a:schemeClr val="bg1"/>
                   </a:solidFill>
@@ -5294,7 +5408,7 @@
                 <a:t>gewählt</a:t>
               </a:r>
               <a:r>
-                <a:rPr lang="en-AU" dirty="0">
+                <a:rPr lang="en-AU">
                   <a:solidFill>
                     <a:schemeClr val="bg1"/>
                   </a:solidFill>
@@ -5309,7 +5423,7 @@
                 <a:buChar char="•"/>
               </a:pPr>
               <a:r>
-                <a:rPr lang="en-AU" dirty="0" err="1">
+                <a:rPr lang="en-AU" err="1">
                   <a:solidFill>
                     <a:schemeClr val="bg1"/>
                   </a:solidFill>
@@ -5318,7 +5432,7 @@
                 <a:t>Aktuelles</a:t>
               </a:r>
               <a:r>
-                <a:rPr lang="en-AU" dirty="0">
+                <a:rPr lang="en-AU">
                   <a:solidFill>
                     <a:schemeClr val="bg1"/>
                   </a:solidFill>
@@ -5333,7 +5447,7 @@
                 <a:buChar char="•"/>
               </a:pPr>
               <a:r>
-                <a:rPr lang="de-AT" dirty="0">
+                <a:rPr lang="de-AT">
                   <a:solidFill>
                     <a:schemeClr val="bg1"/>
                   </a:solidFill>
@@ -5344,7 +5458,7 @@
             </a:p>
             <a:p>
               <a:pPr lvl="1" algn="ctr"/>
-              <a:endParaRPr lang="de-AT" dirty="0">
+              <a:endParaRPr lang="de-AT">
                 <a:solidFill>
                   <a:schemeClr val="bg1"/>
                 </a:solidFill>
@@ -5354,7 +5468,7 @@
             <a:p>
               <a:pPr algn="ctr"/>
               <a:r>
-                <a:rPr lang="de-DE" dirty="0">
+                <a:rPr lang="de-DE">
                   <a:solidFill>
                     <a:schemeClr val="bg1"/>
                   </a:solidFill>
@@ -5362,7 +5476,7 @@
                 </a:rPr>
                 <a:t>Es ist die größte Machtdemonstration Chinas seit der Präsidentenwahl. Im Streit mit Peking um diplomatische Anerkennung droht Taiwan eine weitere Schlappe nach Wahlen in Tuvalu</a:t>
               </a:r>
-              <a:endParaRPr lang="de-AT" dirty="0">
+              <a:endParaRPr lang="de-AT">
                 <a:solidFill>
                   <a:schemeClr val="bg1"/>
                 </a:solidFill>
@@ -5808,12 +5922,12 @@
           <p:nvPr/>
         </p:nvPicPr>
         <p:blipFill rotWithShape="1">
-          <a:blip r:embed="rId2">
+          <a:blip r:embed="rId3">
             <a:alphaModFix/>
             <a:extLst>
               <a:ext uri="{BEBA8EAE-BF5A-486C-A8C5-ECC9F3942E4B}">
                 <a14:imgProps xmlns:a14="http://schemas.microsoft.com/office/drawing/2010/main">
-                  <a14:imgLayer r:embed="rId3">
+                  <a14:imgLayer r:embed="rId4">
                     <a14:imgEffect>
                       <a14:brightnessContrast bright="-40000" contrast="-40000"/>
                     </a14:imgEffect>
@@ -5900,12 +6014,12 @@
           <a:p>
             <a:pPr algn="ctr"/>
             <a:r>
-              <a:rPr lang="de-DE" sz="2000" u="sng" dirty="0">
+              <a:rPr lang="de-DE" sz="2000" u="sng">
                 <a:latin typeface="Carbon Bold" panose="02000806020000020003" pitchFamily="2" charset="0"/>
               </a:rPr>
               <a:t>Als was betrachtet China Taiwan?</a:t>
             </a:r>
-            <a:endParaRPr lang="de-AT" sz="2000" u="sng" dirty="0">
+            <a:endParaRPr lang="de-AT" sz="2000" u="sng">
               <a:latin typeface="Carbon Bold" panose="02000806020000020003" pitchFamily="2" charset="0"/>
             </a:endParaRPr>
           </a:p>
@@ -5963,12 +6077,12 @@
           <a:p>
             <a:pPr algn="ctr"/>
             <a:r>
-              <a:rPr lang="de-DE" sz="2000" dirty="0">
+              <a:rPr lang="de-DE" sz="2000">
                 <a:latin typeface="Carbon Bold" panose="02000806020000020003" pitchFamily="2" charset="0"/>
               </a:rPr>
               <a:t>"als abtrünnige Provinz, die wieder mit dem Festland vereinigt werden soll - notfalls mit militärischer Gewalt."</a:t>
             </a:r>
-            <a:endParaRPr lang="de-AT" sz="2000" dirty="0">
+            <a:endParaRPr lang="de-AT" sz="2000">
               <a:latin typeface="Carbon Bold" panose="02000806020000020003" pitchFamily="2" charset="0"/>
             </a:endParaRPr>
           </a:p>
@@ -6029,7 +6143,7 @@
               <a:rPr lang="de-DE" sz="2000" u="sng" dirty="0">
                 <a:latin typeface="Carbon Bold" panose="02000806020000020003" pitchFamily="2" charset="0"/>
               </a:rPr>
-              <a:t>Wieso ist die Abstimmung in Tuvalu so wichtig?</a:t>
+              <a:t>Inwiefern könnte ein Konflikt die Wirtschaft beeinträchtigen?</a:t>
             </a:r>
             <a:endParaRPr lang="de-AT" sz="2000" u="sng" dirty="0">
               <a:latin typeface="Carbon Bold" panose="02000806020000020003" pitchFamily="2" charset="0"/>
@@ -6092,7 +6206,7 @@
               <a:rPr lang="de-DE" sz="2000" dirty="0">
                 <a:latin typeface="Carbon Bold" panose="02000806020000020003" pitchFamily="2" charset="0"/>
               </a:rPr>
-              <a:t>"China und die mit Taiwan verbündeten USA um Einfluss in der pazifischen Region ringen..."</a:t>
+              <a:t>„Könnte zu internationalen Handelshemmnissen führen da Taiwan Weltmarktführer in der Chipherstellung ist“</a:t>
             </a:r>
             <a:endParaRPr lang="de-AT" sz="2000" dirty="0">
               <a:latin typeface="Carbon Bold" panose="02000806020000020003" pitchFamily="2" charset="0"/>
@@ -6160,7 +6274,7 @@
               <a:rPr lang="de-DE" sz="2000" u="sng" dirty="0">
                 <a:latin typeface="Carbon Bold" panose="02000806020000020003" pitchFamily="2" charset="0"/>
               </a:rPr>
-              <a:t>Was macht China mit allen Staaten, die mit Taiwan im Vertag stehen?</a:t>
+              <a:t>Welche Rolle spielen digitale infrastrukturelle Entwicklungsprojekte in Tuvalu?</a:t>
             </a:r>
             <a:endParaRPr lang="de-AT" sz="2000" u="sng" dirty="0">
               <a:latin typeface="Carbon Bold" panose="02000806020000020003" pitchFamily="2" charset="0"/>
@@ -6223,7 +6337,7 @@
               <a:rPr lang="de-DE" sz="2000" dirty="0">
                 <a:latin typeface="Carbon Bold" panose="02000806020000020003" pitchFamily="2" charset="0"/>
               </a:rPr>
-              <a:t>"übt Druck auf alle Staaten aus, die Kontakte zu der Inselrepublik vor dem chinesischen Festland unterhalten."</a:t>
+              <a:t>„Die Wettbewerbsfähigkeit in der Region zu stärken und als Wirtschaftsdiplomatisches Werkzeug zu dienen“ </a:t>
             </a:r>
             <a:endParaRPr lang="de-AT" sz="2000" dirty="0">
               <a:latin typeface="Carbon Bold" panose="02000806020000020003" pitchFamily="2" charset="0"/>
@@ -7171,7 +7285,7 @@
           <a:p>
             <a:pPr algn="ctr"/>
             <a:r>
-              <a:rPr lang="de-AT" sz="2800" dirty="0">
+              <a:rPr lang="de-AT" sz="2800">
                 <a:latin typeface="Carbon Bold"/>
               </a:rPr>
               <a:t>Wie / Warum hat uns der Zeitungsartikel gefallen?</a:t>
@@ -7267,7 +7381,7 @@
           <a:p>
             <a:pPr algn="ctr"/>
             <a:r>
-              <a:rPr lang="de-AT" sz="2400" dirty="0">
+              <a:rPr lang="de-AT" sz="2400">
                 <a:latin typeface="Carbon Bold" panose="02000806020000020003" pitchFamily="2" charset="0"/>
               </a:rPr>
               <a:t>Kurz</a:t>
@@ -7327,7 +7441,7 @@
           <a:p>
             <a:pPr algn="ctr"/>
             <a:r>
-              <a:rPr lang="de-AT" sz="2400" dirty="0">
+              <a:rPr lang="de-AT" sz="2400">
                 <a:latin typeface="Carbon Bold" panose="02000806020000020003" pitchFamily="2" charset="0"/>
               </a:rPr>
               <a:t>Geht in die Tiefe</a:t>
@@ -7387,7 +7501,7 @@
           <a:p>
             <a:pPr algn="ctr"/>
             <a:r>
-              <a:rPr lang="de-AT" sz="2400" dirty="0">
+              <a:rPr lang="de-AT" sz="2400">
                 <a:latin typeface="Carbon Bold" panose="02000806020000020003" pitchFamily="2" charset="0"/>
               </a:rPr>
               <a:t>Tages-aktuell</a:t>
@@ -8363,7 +8477,7 @@
           <a:lstStyle/>
           <a:p>
             <a:r>
-              <a:rPr lang="de-AT" sz="4800" dirty="0">
+              <a:rPr lang="de-AT" sz="4800">
                 <a:solidFill>
                   <a:schemeClr val="bg1"/>
                 </a:solidFill>
@@ -8451,7 +8565,7 @@
           <a:lstStyle/>
           <a:p>
             <a:pPr algn="ctr"/>
-            <a:endParaRPr lang="en-AU" dirty="0"/>
+            <a:endParaRPr lang="en-AU"/>
           </a:p>
         </p:txBody>
       </p:sp>
@@ -9168,4 +9282,213 @@
     </a:ext>
   </a:extLst>
 </a:theme>
+</file>
+
+<file path=customXml/item1.xml><?xml version="1.0" encoding="utf-8"?>
+<?mso-contentType ?>
+<FormTemplates xmlns="http://schemas.microsoft.com/sharepoint/v3/contenttype/forms">
+  <Display>DocumentLibraryForm</Display>
+  <Edit>DocumentLibraryForm</Edit>
+  <New>DocumentLibraryForm</New>
+</FormTemplates>
+</file>
+
+<file path=customXml/item2.xml><?xml version="1.0" encoding="utf-8"?>
+<ct:contentTypeSchema xmlns:ct="http://schemas.microsoft.com/office/2006/metadata/contentType" xmlns:ma="http://schemas.microsoft.com/office/2006/metadata/properties/metaAttributes" ct:_="" ma:_="" ma:contentTypeName="Document" ma:contentTypeID="0x010100AAEC8ABFF22ACE4A848C6C6C16C08ADB" ma:contentTypeVersion="5" ma:contentTypeDescription="Create a new document." ma:contentTypeScope="" ma:versionID="15ad1246118ff1d0a5f8d70a58140003">
+  <xsd:schema xmlns:xsd="http://www.w3.org/2001/XMLSchema" xmlns:xs="http://www.w3.org/2001/XMLSchema" xmlns:p="http://schemas.microsoft.com/office/2006/metadata/properties" xmlns:ns2="04c86231-d0c3-43d3-a7e1-005ccf6271ae" targetNamespace="http://schemas.microsoft.com/office/2006/metadata/properties" ma:root="true" ma:fieldsID="97e83a5937707bd804816aff615993e5" ns2:_="">
+    <xsd:import namespace="04c86231-d0c3-43d3-a7e1-005ccf6271ae"/>
+    <xsd:element name="properties">
+      <xsd:complexType>
+        <xsd:sequence>
+          <xsd:element name="documentManagement">
+            <xsd:complexType>
+              <xsd:all>
+                <xsd:element ref="ns2:ReferenceId" minOccurs="0"/>
+                <xsd:element ref="ns2:MediaServiceMetadata" minOccurs="0"/>
+                <xsd:element ref="ns2:MediaServiceFastMetadata" minOccurs="0"/>
+                <xsd:element ref="ns2:MediaServiceObjectDetectorVersions" minOccurs="0"/>
+                <xsd:element ref="ns2:MediaServiceSearchProperties" minOccurs="0"/>
+              </xsd:all>
+            </xsd:complexType>
+          </xsd:element>
+        </xsd:sequence>
+      </xsd:complexType>
+    </xsd:element>
+  </xsd:schema>
+  <xsd:schema xmlns:xsd="http://www.w3.org/2001/XMLSchema" xmlns:xs="http://www.w3.org/2001/XMLSchema" xmlns:dms="http://schemas.microsoft.com/office/2006/documentManagement/types" xmlns:pc="http://schemas.microsoft.com/office/infopath/2007/PartnerControls" targetNamespace="04c86231-d0c3-43d3-a7e1-005ccf6271ae" elementFormDefault="qualified">
+    <xsd:import namespace="http://schemas.microsoft.com/office/2006/documentManagement/types"/>
+    <xsd:import namespace="http://schemas.microsoft.com/office/infopath/2007/PartnerControls"/>
+    <xsd:element name="ReferenceId" ma:index="8" nillable="true" ma:displayName="ReferenceId" ma:indexed="true" ma:internalName="ReferenceId">
+      <xsd:simpleType>
+        <xsd:restriction base="dms:Text"/>
+      </xsd:simpleType>
+    </xsd:element>
+    <xsd:element name="MediaServiceMetadata" ma:index="9" nillable="true" ma:displayName="MediaServiceMetadata" ma:hidden="true" ma:internalName="MediaServiceMetadata" ma:readOnly="true">
+      <xsd:simpleType>
+        <xsd:restriction base="dms:Note"/>
+      </xsd:simpleType>
+    </xsd:element>
+    <xsd:element name="MediaServiceFastMetadata" ma:index="10" nillable="true" ma:displayName="MediaServiceFastMetadata" ma:hidden="true" ma:internalName="MediaServiceFastMetadata" ma:readOnly="true">
+      <xsd:simpleType>
+        <xsd:restriction base="dms:Note"/>
+      </xsd:simpleType>
+    </xsd:element>
+    <xsd:element name="MediaServiceObjectDetectorVersions" ma:index="11" nillable="true" ma:displayName="MediaServiceObjectDetectorVersions" ma:hidden="true" ma:indexed="true" ma:internalName="MediaServiceObjectDetectorVersions" ma:readOnly="true">
+      <xsd:simpleType>
+        <xsd:restriction base="dms:Text"/>
+      </xsd:simpleType>
+    </xsd:element>
+    <xsd:element name="MediaServiceSearchProperties" ma:index="12" nillable="true" ma:displayName="MediaServiceSearchProperties" ma:hidden="true" ma:internalName="MediaServiceSearchProperties" ma:readOnly="true">
+      <xsd:simpleType>
+        <xsd:restriction base="dms:Note"/>
+      </xsd:simpleType>
+    </xsd:element>
+  </xsd:schema>
+  <xsd:schema xmlns="http://schemas.openxmlformats.org/package/2006/metadata/core-properties" xmlns:xsd="http://www.w3.org/2001/XMLSchema" xmlns:xsi="http://www.w3.org/2001/XMLSchema-instance" xmlns:dc="http://purl.org/dc/elements/1.1/" xmlns:dcterms="http://purl.org/dc/terms/" xmlns:odoc="http://schemas.microsoft.com/internal/obd" targetNamespace="http://schemas.openxmlformats.org/package/2006/metadata/core-properties" elementFormDefault="qualified" attributeFormDefault="unqualified" blockDefault="#all">
+    <xsd:import namespace="http://purl.org/dc/elements/1.1/" schemaLocation="http://dublincore.org/schemas/xmls/qdc/2003/04/02/dc.xsd"/>
+    <xsd:import namespace="http://purl.org/dc/terms/" schemaLocation="http://dublincore.org/schemas/xmls/qdc/2003/04/02/dcterms.xsd"/>
+    <xsd:element name="coreProperties" type="CT_coreProperties"/>
+    <xsd:complexType name="CT_coreProperties">
+      <xsd:all>
+        <xsd:element ref="dc:creator" minOccurs="0" maxOccurs="1"/>
+        <xsd:element ref="dcterms:created" minOccurs="0" maxOccurs="1"/>
+        <xsd:element ref="dc:identifier" minOccurs="0" maxOccurs="1"/>
+        <xsd:element name="contentType" minOccurs="0" maxOccurs="1" type="xsd:string" ma:index="0" ma:displayName="Content Type"/>
+        <xsd:element ref="dc:title" minOccurs="0" maxOccurs="1" ma:index="4" ma:displayName="Title"/>
+        <xsd:element ref="dc:subject" minOccurs="0" maxOccurs="1"/>
+        <xsd:element ref="dc:description" minOccurs="0" maxOccurs="1"/>
+        <xsd:element name="keywords" minOccurs="0" maxOccurs="1" type="xsd:string"/>
+        <xsd:element ref="dc:language" minOccurs="0" maxOccurs="1"/>
+        <xsd:element name="category" minOccurs="0" maxOccurs="1" type="xsd:string"/>
+        <xsd:element name="version" minOccurs="0" maxOccurs="1" type="xsd:string"/>
+        <xsd:element name="revision" minOccurs="0" maxOccurs="1" type="xsd:string">
+          <xsd:annotation>
+            <xsd:documentation>
+                        This value indicates the number of saves or revisions. The application is responsible for updating this value after each revision.
+                    </xsd:documentation>
+          </xsd:annotation>
+        </xsd:element>
+        <xsd:element name="lastModifiedBy" minOccurs="0" maxOccurs="1" type="xsd:string"/>
+        <xsd:element ref="dcterms:modified" minOccurs="0" maxOccurs="1"/>
+        <xsd:element name="contentStatus" minOccurs="0" maxOccurs="1" type="xsd:string"/>
+      </xsd:all>
+    </xsd:complexType>
+  </xsd:schema>
+  <xs:schema xmlns:pc="http://schemas.microsoft.com/office/infopath/2007/PartnerControls" xmlns:xs="http://www.w3.org/2001/XMLSchema" targetNamespace="http://schemas.microsoft.com/office/infopath/2007/PartnerControls" elementFormDefault="qualified" attributeFormDefault="unqualified">
+    <xs:element name="Person">
+      <xs:complexType>
+        <xs:sequence>
+          <xs:element ref="pc:DisplayName" minOccurs="0"/>
+          <xs:element ref="pc:AccountId" minOccurs="0"/>
+          <xs:element ref="pc:AccountType" minOccurs="0"/>
+        </xs:sequence>
+      </xs:complexType>
+    </xs:element>
+    <xs:element name="DisplayName" type="xs:string"/>
+    <xs:element name="AccountId" type="xs:string"/>
+    <xs:element name="AccountType" type="xs:string"/>
+    <xs:element name="BDCAssociatedEntity">
+      <xs:complexType>
+        <xs:sequence>
+          <xs:element ref="pc:BDCEntity" minOccurs="0" maxOccurs="unbounded"/>
+        </xs:sequence>
+        <xs:attribute ref="pc:EntityNamespace"/>
+        <xs:attribute ref="pc:EntityName"/>
+        <xs:attribute ref="pc:SystemInstanceName"/>
+        <xs:attribute ref="pc:AssociationName"/>
+      </xs:complexType>
+    </xs:element>
+    <xs:attribute name="EntityNamespace" type="xs:string"/>
+    <xs:attribute name="EntityName" type="xs:string"/>
+    <xs:attribute name="SystemInstanceName" type="xs:string"/>
+    <xs:attribute name="AssociationName" type="xs:string"/>
+    <xs:element name="BDCEntity">
+      <xs:complexType>
+        <xs:sequence>
+          <xs:element ref="pc:EntityDisplayName" minOccurs="0"/>
+          <xs:element ref="pc:EntityInstanceReference" minOccurs="0"/>
+          <xs:element ref="pc:EntityId1" minOccurs="0"/>
+          <xs:element ref="pc:EntityId2" minOccurs="0"/>
+          <xs:element ref="pc:EntityId3" minOccurs="0"/>
+          <xs:element ref="pc:EntityId4" minOccurs="0"/>
+          <xs:element ref="pc:EntityId5" minOccurs="0"/>
+        </xs:sequence>
+      </xs:complexType>
+    </xs:element>
+    <xs:element name="EntityDisplayName" type="xs:string"/>
+    <xs:element name="EntityInstanceReference" type="xs:string"/>
+    <xs:element name="EntityId1" type="xs:string"/>
+    <xs:element name="EntityId2" type="xs:string"/>
+    <xs:element name="EntityId3" type="xs:string"/>
+    <xs:element name="EntityId4" type="xs:string"/>
+    <xs:element name="EntityId5" type="xs:string"/>
+    <xs:element name="Terms">
+      <xs:complexType>
+        <xs:sequence>
+          <xs:element ref="pc:TermInfo" minOccurs="0" maxOccurs="unbounded"/>
+        </xs:sequence>
+      </xs:complexType>
+    </xs:element>
+    <xs:element name="TermInfo">
+      <xs:complexType>
+        <xs:sequence>
+          <xs:element ref="pc:TermName" minOccurs="0"/>
+          <xs:element ref="pc:TermId" minOccurs="0"/>
+        </xs:sequence>
+      </xs:complexType>
+    </xs:element>
+    <xs:element name="TermName" type="xs:string"/>
+    <xs:element name="TermId" type="xs:string"/>
+  </xs:schema>
+</ct:contentTypeSchema>
+</file>
+
+<file path=customXml/item3.xml><?xml version="1.0" encoding="utf-8"?>
+<p:properties xmlns:p="http://schemas.microsoft.com/office/2006/metadata/properties" xmlns:xsi="http://www.w3.org/2001/XMLSchema-instance" xmlns:pc="http://schemas.microsoft.com/office/infopath/2007/PartnerControls">
+  <documentManagement>
+    <ReferenceId xmlns="04c86231-d0c3-43d3-a7e1-005ccf6271ae" xsi:nil="true"/>
+  </documentManagement>
+</p:properties>
+</file>
+
+<file path=customXml/itemProps1.xml><?xml version="1.0" encoding="utf-8"?>
+<ds:datastoreItem xmlns:ds="http://schemas.openxmlformats.org/officeDocument/2006/customXml" ds:itemID="{A7B06754-0A70-4AC7-A042-66A01F47E017}">
+  <ds:schemaRefs>
+    <ds:schemaRef ds:uri="http://schemas.microsoft.com/sharepoint/v3/contenttype/forms"/>
+  </ds:schemaRefs>
+</ds:datastoreItem>
+</file>
+
+<file path=customXml/itemProps2.xml><?xml version="1.0" encoding="utf-8"?>
+<ds:datastoreItem xmlns:ds="http://schemas.openxmlformats.org/officeDocument/2006/customXml" ds:itemID="{E618BE56-E4C8-4B81-972C-2A79F6A7F2BE}">
+  <ds:schemaRefs>
+    <ds:schemaRef ds:uri="http://schemas.microsoft.com/office/2006/metadata/contentType"/>
+    <ds:schemaRef ds:uri="http://schemas.microsoft.com/office/2006/metadata/properties/metaAttributes"/>
+    <ds:schemaRef ds:uri="http://www.w3.org/2001/XMLSchema"/>
+    <ds:schemaRef ds:uri="http://schemas.microsoft.com/office/2006/metadata/properties"/>
+    <ds:schemaRef ds:uri="04c86231-d0c3-43d3-a7e1-005ccf6271ae"/>
+    <ds:schemaRef ds:uri="http://schemas.microsoft.com/office/2006/documentManagement/types"/>
+    <ds:schemaRef ds:uri="http://schemas.microsoft.com/office/infopath/2007/PartnerControls"/>
+    <ds:schemaRef ds:uri="http://schemas.openxmlformats.org/package/2006/metadata/core-properties"/>
+    <ds:schemaRef ds:uri="http://purl.org/dc/elements/1.1/"/>
+    <ds:schemaRef ds:uri="http://purl.org/dc/terms/"/>
+    <ds:schemaRef ds:uri="http://schemas.microsoft.com/internal/obd"/>
+  </ds:schemaRefs>
+</ds:datastoreItem>
+</file>
+
+<file path=customXml/itemProps3.xml><?xml version="1.0" encoding="utf-8"?>
+<ds:datastoreItem xmlns:ds="http://schemas.openxmlformats.org/officeDocument/2006/customXml" ds:itemID="{94C752D5-6715-4AB1-A73C-807B8EED102E}">
+  <ds:schemaRefs>
+    <ds:schemaRef ds:uri="http://schemas.microsoft.com/office/2006/metadata/properties"/>
+    <ds:schemaRef ds:uri="http://schemas.microsoft.com/office/infopath/2007/PartnerControls"/>
+    <ds:schemaRef ds:uri="http://schemas.openxmlformats.org/package/2006/metadata/core-properties"/>
+    <ds:schemaRef ds:uri="http://www.w3.org/XML/1998/namespace"/>
+    <ds:schemaRef ds:uri="04c86231-d0c3-43d3-a7e1-005ccf6271ae"/>
+    <ds:schemaRef ds:uri="http://schemas.microsoft.com/office/2006/documentManagement/types"/>
+    <ds:schemaRef ds:uri="http://purl.org/dc/terms/"/>
+    <ds:schemaRef ds:uri="http://purl.org/dc/dcmitype/"/>
+    <ds:schemaRef ds:uri="http://purl.org/dc/elements/1.1/"/>
+  </ds:schemaRefs>
+</ds:datastoreItem>
 </file>
</xml_diff>